<commit_message>
calculator taxe & pdf added
</commit_message>
<xml_diff>
--- a/Organigrama.pptx
+++ b/Organigrama.pptx
@@ -1610,17 +1610,17 @@
       </dgm:t>
     </dgm:pt>
     <dgm:pt modelId="{0E7DEADE-BF26-41B5-8328-486C5DB8DBAC}">
-      <dgm:prSet/>
+      <dgm:prSet custT="1"/>
       <dgm:spPr/>
       <dgm:t>
         <a:bodyPr/>
         <a:lstStyle/>
         <a:p>
           <a:r>
-            <a:rPr lang="ro-RO" dirty="0" smtClean="0"/>
+            <a:rPr lang="ro-RO" sz="1100" dirty="0" smtClean="0"/>
             <a:t>REGISTRATURĂ ŞI ARHIVĂ</a:t>
           </a:r>
-          <a:endParaRPr lang="en-US" dirty="0"/>
+          <a:endParaRPr lang="en-US" sz="1100" dirty="0"/>
         </a:p>
       </dgm:t>
     </dgm:pt>
@@ -1647,17 +1647,17 @@
       </dgm:t>
     </dgm:pt>
     <dgm:pt modelId="{B5DCF512-1AB7-4CD0-9D3F-BE0581B2CB49}">
-      <dgm:prSet/>
+      <dgm:prSet custT="1"/>
       <dgm:spPr/>
       <dgm:t>
         <a:bodyPr/>
         <a:lstStyle/>
         <a:p>
           <a:r>
-            <a:rPr lang="ro-RO" dirty="0" smtClean="0"/>
+            <a:rPr lang="ro-RO" sz="1100" dirty="0" smtClean="0"/>
             <a:t>PERSONAL CONEX</a:t>
           </a:r>
-          <a:endParaRPr lang="en-US" dirty="0"/>
+          <a:endParaRPr lang="en-US" sz="1100" dirty="0"/>
         </a:p>
       </dgm:t>
     </dgm:pt>
@@ -1770,21 +1770,21 @@
       </dgm:t>
     </dgm:pt>
     <dgm:pt modelId="{D93AFF9F-FC2A-430D-8A44-30757930CD97}">
-      <dgm:prSet/>
+      <dgm:prSet custT="1"/>
       <dgm:spPr/>
       <dgm:t>
         <a:bodyPr/>
         <a:lstStyle/>
         <a:p>
           <a:r>
-            <a:rPr lang="en-US" dirty="0" smtClean="0"/>
+            <a:rPr lang="en-US" sz="1100" dirty="0" smtClean="0"/>
             <a:t>STATISTIC</a:t>
           </a:r>
           <a:r>
-            <a:rPr lang="ro-RO" dirty="0" smtClean="0"/>
+            <a:rPr lang="ro-RO" sz="1100" dirty="0" smtClean="0"/>
             <a:t>Ă</a:t>
           </a:r>
-          <a:endParaRPr lang="en-US" dirty="0"/>
+          <a:endParaRPr lang="en-US" sz="1100" dirty="0"/>
         </a:p>
       </dgm:t>
     </dgm:pt>
@@ -2693,7 +2693,7 @@
       </dgm:t>
     </dgm:pt>
     <dgm:pt modelId="{1580DD9A-E07B-47E0-A6EF-9A43286CACDB}" type="pres">
-      <dgm:prSet presAssocID="{0E7DEADE-BF26-41B5-8328-486C5DB8DBAC}" presName="rootText" presStyleLbl="node4" presStyleIdx="4" presStyleCnt="10" custScaleX="258023" custLinFactX="103752" custLinFactNeighborX="200000" custLinFactNeighborY="8232">
+      <dgm:prSet presAssocID="{0E7DEADE-BF26-41B5-8328-486C5DB8DBAC}" presName="rootText" presStyleLbl="node4" presStyleIdx="4" presStyleCnt="10" custScaleX="258737" custLinFactX="103752" custLinFactY="33426" custLinFactNeighborX="200000" custLinFactNeighborY="100000">
         <dgm:presLayoutVars>
           <dgm:chPref val="3"/>
         </dgm:presLayoutVars>
@@ -2857,7 +2857,7 @@
       <dgm:spPr/>
     </dgm:pt>
     <dgm:pt modelId="{630FB1FE-1568-4E6E-A0E0-457118C98AEE}" type="pres">
-      <dgm:prSet presAssocID="{D93AFF9F-FC2A-430D-8A44-30757930CD97}" presName="rootText" presStyleLbl="node4" presStyleIdx="6" presStyleCnt="10" custScaleX="258654" custLinFactX="101380" custLinFactY="-48799" custLinFactNeighborX="200000" custLinFactNeighborY="-100000">
+      <dgm:prSet presAssocID="{D93AFF9F-FC2A-430D-8A44-30757930CD97}" presName="rootText" presStyleLbl="node4" presStyleIdx="6" presStyleCnt="10" custScaleX="258654" custLinFactX="105375" custLinFactY="-100000" custLinFactNeighborX="200000" custLinFactNeighborY="-173993">
         <dgm:presLayoutVars>
           <dgm:chPref val="3"/>
         </dgm:presLayoutVars>
@@ -3862,101 +3862,101 @@
     </dgm:pt>
   </dgm:ptLst>
   <dgm:cxnLst>
+    <dgm:cxn modelId="{0523E2FD-5CB6-4D0E-BC62-A67E313B3C02}" srcId="{DE4100C8-9BAD-414D-A8B3-EDB25C14EF90}" destId="{C132DD6E-C978-4D3A-9097-26E40C4A6B78}" srcOrd="0" destOrd="0" parTransId="{F768A012-F9CB-4338-A1C1-8C46044C9B84}" sibTransId="{73E6FDFD-DADE-4F4C-92D2-2EB726E48812}"/>
+    <dgm:cxn modelId="{6C392A1A-CF21-46BB-A922-B55CC4623054}" srcId="{C848FE92-463D-470D-BF1D-04ADA610834C}" destId="{0E7DEADE-BF26-41B5-8328-486C5DB8DBAC}" srcOrd="4" destOrd="0" parTransId="{893C8D60-FD51-4D36-BC40-F19AEA909325}" sibTransId="{38AFF0BB-C988-42A7-AEBC-6A5DB48BA721}"/>
+    <dgm:cxn modelId="{CBD3D9F6-B59B-4753-9F61-B7F2ECDCAB28}" srcId="{70387467-9469-4206-8E37-05F43AA08A2A}" destId="{CB53A11A-061D-4AE2-AB7E-ECAB65D1D1CE}" srcOrd="2" destOrd="0" parTransId="{69CDE423-D26D-40D6-8B92-2731C1D24B3F}" sibTransId="{F7B10986-3D3A-4585-99A3-FA4F25E72B9B}"/>
+    <dgm:cxn modelId="{D170A647-CD3D-4F37-851B-F78BE25ED540}" srcId="{6E9BC9EB-F429-40C4-AB41-3D32306E2060}" destId="{3C33D1E7-53E9-4F48-98B0-B03D4A07F390}" srcOrd="1" destOrd="0" parTransId="{3CE2639D-3C61-4B69-9A41-4E26F68EA67D}" sibTransId="{6202B589-853A-4664-BD08-47800EEA9A98}"/>
+    <dgm:cxn modelId="{A3205A72-8961-4674-9717-1EB8F0CC3325}" type="presOf" srcId="{C132DD6E-C978-4D3A-9097-26E40C4A6B78}" destId="{2C89911A-559B-4BFC-AA8C-BE3307F3F263}" srcOrd="0" destOrd="0" presId="urn:microsoft.com/office/officeart/2005/8/layout/orgChart1"/>
+    <dgm:cxn modelId="{F789A21E-7345-434F-9855-4F846D629779}" type="presOf" srcId="{69CDE423-D26D-40D6-8B92-2731C1D24B3F}" destId="{46BABAA7-E001-43D5-90DC-992E4068B713}" srcOrd="0" destOrd="0" presId="urn:microsoft.com/office/officeart/2005/8/layout/orgChart1"/>
+    <dgm:cxn modelId="{037E7708-389F-4734-B628-C72D4596C1AB}" srcId="{70387467-9469-4206-8E37-05F43AA08A2A}" destId="{72BEADBA-7002-4022-8823-1A071831A857}" srcOrd="5" destOrd="0" parTransId="{62C8414F-66B2-4760-BFF0-3DCCD5379EBF}" sibTransId="{51D0C412-15D0-48FC-84A2-48027B2EC0B4}"/>
+    <dgm:cxn modelId="{83A16CE3-884F-4928-8713-D168EE69381F}" type="presOf" srcId="{CB53A11A-061D-4AE2-AB7E-ECAB65D1D1CE}" destId="{BD9EEFF5-C9E2-40B4-8501-30865610934D}" srcOrd="0" destOrd="0" presId="urn:microsoft.com/office/officeart/2005/8/layout/orgChart1"/>
+    <dgm:cxn modelId="{42C997C6-BDE0-4F8B-9776-2E54207F752B}" type="presOf" srcId="{70387467-9469-4206-8E37-05F43AA08A2A}" destId="{6E110BFA-A299-4837-B09B-5069CD9CCA46}" srcOrd="0" destOrd="0" presId="urn:microsoft.com/office/officeart/2005/8/layout/orgChart1"/>
+    <dgm:cxn modelId="{929339D4-3643-4749-9647-C96129F1528B}" srcId="{402F2858-01CB-44CE-82CD-EE007210A1B1}" destId="{9077FE6A-CBB5-4A51-B3E0-8E41638AA831}" srcOrd="1" destOrd="0" parTransId="{25C53C84-C4D2-4EF6-9FE0-7BF969088FD8}" sibTransId="{EBF2BF22-245F-4F16-8BA3-6D89D3767B2F}"/>
+    <dgm:cxn modelId="{D1ED6821-D146-474D-B5EE-F3A71D6139DF}" srcId="{70387467-9469-4206-8E37-05F43AA08A2A}" destId="{9A84B3BF-D88B-4CB3-87E8-4F100CED8C27}" srcOrd="1" destOrd="0" parTransId="{A2AF496C-1D11-4C11-8E9E-17B961189C21}" sibTransId="{D8811D41-1520-4122-98DC-EE57AA63D4CF}"/>
+    <dgm:cxn modelId="{2D48A147-7839-4E10-A652-DF9BBEDA9723}" type="presOf" srcId="{6E9BC9EB-F429-40C4-AB41-3D32306E2060}" destId="{33A6DC25-4DEB-4F90-9E16-4D43C3569F99}" srcOrd="0" destOrd="0" presId="urn:microsoft.com/office/officeart/2005/8/layout/orgChart1"/>
+    <dgm:cxn modelId="{476AD122-5591-4B06-8A12-00925D3B35E9}" type="presOf" srcId="{62C8414F-66B2-4760-BFF0-3DCCD5379EBF}" destId="{ADC84BD5-BDA2-44D3-944A-23429540931E}" srcOrd="0" destOrd="0" presId="urn:microsoft.com/office/officeart/2005/8/layout/orgChart1"/>
+    <dgm:cxn modelId="{FE2F87C8-FF5E-47A4-B5F7-446B3BC7082A}" type="presOf" srcId="{F768A012-F9CB-4338-A1C1-8C46044C9B84}" destId="{62FDE803-F9E5-4655-A48A-92A3CF0C5573}" srcOrd="0" destOrd="0" presId="urn:microsoft.com/office/officeart/2005/8/layout/orgChart1"/>
+    <dgm:cxn modelId="{92104E9D-79E3-4F11-954D-295409B46501}" type="presOf" srcId="{3C33D1E7-53E9-4F48-98B0-B03D4A07F390}" destId="{437B21D8-99D7-4F78-A576-12278DF24217}" srcOrd="0" destOrd="0" presId="urn:microsoft.com/office/officeart/2005/8/layout/orgChart1"/>
     <dgm:cxn modelId="{607ABE7A-3AD0-4820-AE99-D30BC60A1394}" srcId="{9A84B3BF-D88B-4CB3-87E8-4F100CED8C27}" destId="{C848FE92-463D-470D-BF1D-04ADA610834C}" srcOrd="0" destOrd="0" parTransId="{FBD7E154-CFF9-4603-A93A-9AF2E8FCB4D7}" sibTransId="{14403D98-486F-47C3-9D1D-F8E96591E736}"/>
-    <dgm:cxn modelId="{287C2523-3180-46B4-902A-DB2BC33EAD0B}" type="presOf" srcId="{B7D72A91-0C7E-45B9-AACD-EB806607436E}" destId="{4F856AE7-E9CC-4459-AEC8-68DE9E4C0E2F}" srcOrd="1" destOrd="0" presId="urn:microsoft.com/office/officeart/2005/8/layout/orgChart1"/>
+    <dgm:cxn modelId="{C3DA0AE2-484C-41D8-BD16-7DA6C5288FB5}" type="presOf" srcId="{EDD26731-FE0D-4507-B02B-DFC75EEB244D}" destId="{D46E7BEF-C70C-4317-9836-5C7ACC38E3B3}" srcOrd="0" destOrd="0" presId="urn:microsoft.com/office/officeart/2005/8/layout/orgChart1"/>
+    <dgm:cxn modelId="{7B404FC7-0AA0-4B53-B1FA-53D12F6ADBF8}" srcId="{70387467-9469-4206-8E37-05F43AA08A2A}" destId="{DE4100C8-9BAD-414D-A8B3-EDB25C14EF90}" srcOrd="0" destOrd="0" parTransId="{07765CC6-0379-4A19-BB7B-26FA6EAF4C4E}" sibTransId="{36AA1A18-9698-4EB4-8451-D1C33571304D}"/>
+    <dgm:cxn modelId="{A715B411-2011-4EEE-B0ED-04BF6F6C4686}" type="presOf" srcId="{C132DD6E-C978-4D3A-9097-26E40C4A6B78}" destId="{3CD86AF3-F89E-4AEF-8B8D-C6C7982A19EB}" srcOrd="1" destOrd="0" presId="urn:microsoft.com/office/officeart/2005/8/layout/orgChart1"/>
+    <dgm:cxn modelId="{F1BB52F8-5A8B-45FB-BA33-3F1A59AC412B}" type="presOf" srcId="{8B70E0AE-105B-4655-8741-CDDE780F58D5}" destId="{FF723FAF-5914-42C7-AA55-7E21550CA385}" srcOrd="1" destOrd="0" presId="urn:microsoft.com/office/officeart/2005/8/layout/orgChart1"/>
+    <dgm:cxn modelId="{22B76D12-1A31-4821-B7E4-D7DA47E648A7}" type="presOf" srcId="{C9FCDA05-6AE7-4E3F-9782-92E7E3A0D1AE}" destId="{41268A2F-036D-4181-AA5A-D468DAC79392}" srcOrd="0" destOrd="0" presId="urn:microsoft.com/office/officeart/2005/8/layout/orgChart1"/>
+    <dgm:cxn modelId="{E00B8292-CE09-490B-BE89-C729C0FD196E}" type="presOf" srcId="{2B8D4C78-FF64-4ACF-93A1-FF2950411183}" destId="{1B173EF7-3CA3-427A-8727-A659BF3D3B97}" srcOrd="1" destOrd="0" presId="urn:microsoft.com/office/officeart/2005/8/layout/orgChart1"/>
+    <dgm:cxn modelId="{520A1B6E-D2A6-4CA7-8301-483829FA4B62}" type="presOf" srcId="{00BBE172-4AAC-46CF-BB0B-819CB810D615}" destId="{7A4A29C7-243B-425C-A348-CF9373CBF90A}" srcOrd="0" destOrd="0" presId="urn:microsoft.com/office/officeart/2005/8/layout/orgChart1"/>
+    <dgm:cxn modelId="{DAB2DEE9-1BA5-4FDB-8CC3-9425A2F4AD4E}" type="presOf" srcId="{70387467-9469-4206-8E37-05F43AA08A2A}" destId="{1E93D8A4-024A-4C20-83A6-DD56653D372A}" srcOrd="1" destOrd="0" presId="urn:microsoft.com/office/officeart/2005/8/layout/orgChart1"/>
+    <dgm:cxn modelId="{FD0938AB-F41C-4599-A595-BEB375C67F50}" type="presOf" srcId="{DE4100C8-9BAD-414D-A8B3-EDB25C14EF90}" destId="{49318898-FFE0-48FC-88B6-BA0FD1394A43}" srcOrd="1" destOrd="0" presId="urn:microsoft.com/office/officeart/2005/8/layout/orgChart1"/>
+    <dgm:cxn modelId="{D646FC28-3FE9-4844-A3AA-7AB80C399B5E}" type="presOf" srcId="{8B70E0AE-105B-4655-8741-CDDE780F58D5}" destId="{DC67B31A-26AA-4189-8A22-1889CEF361A4}" srcOrd="0" destOrd="0" presId="urn:microsoft.com/office/officeart/2005/8/layout/orgChart1"/>
+    <dgm:cxn modelId="{8B7D28C2-5C5E-4211-8C7B-49214A1D64B2}" type="presOf" srcId="{6EFD63C3-BBE7-44E5-A3D6-9B50F167D8B9}" destId="{A444900E-0076-4B1A-BC17-B35A2ECF1F33}" srcOrd="0" destOrd="0" presId="urn:microsoft.com/office/officeart/2005/8/layout/orgChart1"/>
+    <dgm:cxn modelId="{3EBDEAA3-B9C6-498F-9BE4-6896490179C0}" type="presOf" srcId="{D93AFF9F-FC2A-430D-8A44-30757930CD97}" destId="{630FB1FE-1568-4E6E-A0E0-457118C98AEE}" srcOrd="0" destOrd="0" presId="urn:microsoft.com/office/officeart/2005/8/layout/orgChart1"/>
     <dgm:cxn modelId="{DCF312B8-3E45-47C3-998D-FAE87B6C3AC4}" type="presOf" srcId="{871DF954-769D-4F88-86E9-4C8BBCEB4AED}" destId="{09585F77-2F31-4773-A1F2-D353731963BB}" srcOrd="0" destOrd="0" presId="urn:microsoft.com/office/officeart/2005/8/layout/orgChart1"/>
     <dgm:cxn modelId="{FF9327A2-8500-4EAF-B586-A8A9E925C2E5}" srcId="{6E9BC9EB-F429-40C4-AB41-3D32306E2060}" destId="{B7D72A91-0C7E-45B9-AACD-EB806607436E}" srcOrd="0" destOrd="0" parTransId="{6EFD63C3-BBE7-44E5-A3D6-9B50F167D8B9}" sibTransId="{E94A0D4E-0BF9-46CB-BF1A-956EA19FF862}"/>
+    <dgm:cxn modelId="{7C0B39DA-337C-42AE-A7E3-A1F511A67F89}" type="presOf" srcId="{BD80EE29-4101-461C-A2FA-251FF3AE40F5}" destId="{D382AD5D-81AD-4AC6-9E59-F29201543338}" srcOrd="0" destOrd="0" presId="urn:microsoft.com/office/officeart/2005/8/layout/orgChart1"/>
+    <dgm:cxn modelId="{287C2523-3180-46B4-902A-DB2BC33EAD0B}" type="presOf" srcId="{B7D72A91-0C7E-45B9-AACD-EB806607436E}" destId="{4F856AE7-E9CC-4459-AEC8-68DE9E4C0E2F}" srcOrd="1" destOrd="0" presId="urn:microsoft.com/office/officeart/2005/8/layout/orgChart1"/>
+    <dgm:cxn modelId="{1F6FA51C-0A64-4B40-8086-86B0ADF79D57}" type="presOf" srcId="{91038339-7E44-407D-8F41-830A9AC7139F}" destId="{BE05C31F-DF27-417A-9B03-58F2D293754F}" srcOrd="0" destOrd="0" presId="urn:microsoft.com/office/officeart/2005/8/layout/orgChart1"/>
+    <dgm:cxn modelId="{75CFC882-0004-4D6B-A827-295FA9B504A4}" type="presOf" srcId="{728F31A6-D1F3-4DEE-8A9B-9F51D17C553F}" destId="{6C222222-6606-476E-9437-D5DEBD9F6A62}" srcOrd="1" destOrd="0" presId="urn:microsoft.com/office/officeart/2005/8/layout/orgChart1"/>
+    <dgm:cxn modelId="{2573F99B-1F5A-43A2-AF78-B9D3BF0668EF}" type="presOf" srcId="{3CE2639D-3C61-4B69-9A41-4E26F68EA67D}" destId="{315673BE-5240-4669-A35C-00CBBABDF50A}" srcOrd="0" destOrd="0" presId="urn:microsoft.com/office/officeart/2005/8/layout/orgChart1"/>
+    <dgm:cxn modelId="{A22F35A7-82F0-4DA2-9306-BDD28B4DC4B1}" type="presOf" srcId="{07765CC6-0379-4A19-BB7B-26FA6EAF4C4E}" destId="{929FFC8C-93B3-4C2C-8A29-F6DEB3F4B432}" srcOrd="0" destOrd="0" presId="urn:microsoft.com/office/officeart/2005/8/layout/orgChart1"/>
+    <dgm:cxn modelId="{C3F67261-CEA3-4F23-825C-979BFD40E3BF}" srcId="{C848FE92-463D-470D-BF1D-04ADA610834C}" destId="{E0AEC5A1-9217-4F7F-8CC9-B4E3DBAC8132}" srcOrd="2" destOrd="0" parTransId="{871DF954-769D-4F88-86E9-4C8BBCEB4AED}" sibTransId="{44437E95-F69D-464C-AAE1-42D40BAA01C6}"/>
+    <dgm:cxn modelId="{3A96FE48-420B-499F-A3A9-B4B73112A551}" type="presOf" srcId="{402F2858-01CB-44CE-82CD-EE007210A1B1}" destId="{875BAD68-6674-44BE-ABFE-7F5E3F19A10D}" srcOrd="0" destOrd="0" presId="urn:microsoft.com/office/officeart/2005/8/layout/orgChart1"/>
+    <dgm:cxn modelId="{62F86BEE-6C4E-4DFA-B493-C03AAF805FDA}" type="presOf" srcId="{72BEADBA-7002-4022-8823-1A071831A857}" destId="{C696DC6B-2F99-47BF-8D94-C8BA55D71D9E}" srcOrd="1" destOrd="0" presId="urn:microsoft.com/office/officeart/2005/8/layout/orgChart1"/>
+    <dgm:cxn modelId="{69FA9F9A-DCA1-418D-937E-49BF1CB29C88}" type="presOf" srcId="{5C062E8D-7F59-4188-9E49-88730FD1D5F8}" destId="{7D114837-346D-4A12-88C3-1553C609DED8}" srcOrd="0" destOrd="0" presId="urn:microsoft.com/office/officeart/2005/8/layout/orgChart1"/>
+    <dgm:cxn modelId="{C8D8E5F3-2910-4FA4-B99D-E0056DDEB9D0}" type="presOf" srcId="{E0AEC5A1-9217-4F7F-8CC9-B4E3DBAC8132}" destId="{4D4D5C94-49C5-4B67-BEF3-8F860D410F15}" srcOrd="1" destOrd="0" presId="urn:microsoft.com/office/officeart/2005/8/layout/orgChart1"/>
+    <dgm:cxn modelId="{205D6A29-9740-4666-BDF7-4679933CFDB4}" type="presOf" srcId="{C848FE92-463D-470D-BF1D-04ADA610834C}" destId="{3AA664D6-AB72-4048-9FD3-F61832C3F2AC}" srcOrd="1" destOrd="0" presId="urn:microsoft.com/office/officeart/2005/8/layout/orgChart1"/>
+    <dgm:cxn modelId="{2C0CD4D4-B048-4D76-B6CE-FF03D081B514}" type="presOf" srcId="{CB53A11A-061D-4AE2-AB7E-ECAB65D1D1CE}" destId="{C170A22D-0CFC-41E3-BFF2-C8043C638EF7}" srcOrd="1" destOrd="0" presId="urn:microsoft.com/office/officeart/2005/8/layout/orgChart1"/>
+    <dgm:cxn modelId="{49AFE0A2-0F37-4237-8D1F-7E81C74526A5}" srcId="{70387467-9469-4206-8E37-05F43AA08A2A}" destId="{B21F075C-07CF-4E94-8A08-FCC582F20775}" srcOrd="4" destOrd="0" parTransId="{9DEC245C-5EB8-4B55-9BFA-23D615C3DC8D}" sibTransId="{25A9CB95-2B4A-49A4-BB64-EF641A8617CC}"/>
+    <dgm:cxn modelId="{1B724CEF-C48D-4BBB-9D82-9D18410CADD4}" type="presOf" srcId="{9A84B3BF-D88B-4CB3-87E8-4F100CED8C27}" destId="{7EC0BC3D-ED4D-42E6-82F2-9672178A5531}" srcOrd="0" destOrd="0" presId="urn:microsoft.com/office/officeart/2005/8/layout/orgChart1"/>
+    <dgm:cxn modelId="{AF19BD81-7EFE-4928-B09E-D14F25BA44D8}" type="presOf" srcId="{BD80EE29-4101-461C-A2FA-251FF3AE40F5}" destId="{0FDF530A-5B68-46B1-8CFE-11FDA64DE391}" srcOrd="1" destOrd="0" presId="urn:microsoft.com/office/officeart/2005/8/layout/orgChart1"/>
+    <dgm:cxn modelId="{4CECFBFD-CFFB-467E-9664-8FABEEEF24B8}" srcId="{C848FE92-463D-470D-BF1D-04ADA610834C}" destId="{91038339-7E44-407D-8F41-830A9AC7139F}" srcOrd="3" destOrd="0" parTransId="{5C062E8D-7F59-4188-9E49-88730FD1D5F8}" sibTransId="{63641D8B-AA92-4836-8C70-7F744622D479}"/>
+    <dgm:cxn modelId="{8E3C4AA8-5518-4F10-928C-A2CD41D31302}" srcId="{1F78CE57-8592-4FB8-B04D-E8D3187B18EE}" destId="{BD80EE29-4101-461C-A2FA-251FF3AE40F5}" srcOrd="0" destOrd="0" parTransId="{85871013-2EE5-4C5F-9A07-B950065F6046}" sibTransId="{C35126B6-3E49-4C7A-A7B7-4B52DC261818}"/>
+    <dgm:cxn modelId="{9B3806F4-058B-4A2B-8663-38547B76530E}" type="presOf" srcId="{B2661689-1F1F-4E0F-A2E1-5887BA18094D}" destId="{E55EDA56-BBD3-4D8A-A274-B9F591143EBF}" srcOrd="0" destOrd="0" presId="urn:microsoft.com/office/officeart/2005/8/layout/orgChart1"/>
+    <dgm:cxn modelId="{BD8D81D1-9F24-483E-9785-174EE0FDF760}" type="presOf" srcId="{E73FA78A-4C4A-46B5-A42E-587D72142E36}" destId="{A38C7A00-0F57-448B-B395-46EC701BA310}" srcOrd="1" destOrd="0" presId="urn:microsoft.com/office/officeart/2005/8/layout/orgChart1"/>
+    <dgm:cxn modelId="{BEB37929-9D49-481D-8CDC-1207A4AF1659}" srcId="{70387467-9469-4206-8E37-05F43AA08A2A}" destId="{1F78CE57-8592-4FB8-B04D-E8D3187B18EE}" srcOrd="6" destOrd="0" parTransId="{4AFCAEF2-5B21-4364-AF0D-421C27B6CA7C}" sibTransId="{E4F7C61B-6C5B-4E6F-81B4-10F0BBC50CB1}"/>
+    <dgm:cxn modelId="{775B086A-D63E-405E-AFE0-964F62B70284}" srcId="{402F2858-01CB-44CE-82CD-EE007210A1B1}" destId="{70387467-9469-4206-8E37-05F43AA08A2A}" srcOrd="0" destOrd="0" parTransId="{CB45B893-CCF8-4274-A974-3FA00CE24CDE}" sibTransId="{063EE879-2B9F-488E-83A9-ED0FB91B5A5E}"/>
+    <dgm:cxn modelId="{B8EF7ECD-2B3B-4478-836E-AED454264EC9}" srcId="{DE4100C8-9BAD-414D-A8B3-EDB25C14EF90}" destId="{C9F7C635-5B03-445C-863A-6F6D6F55A527}" srcOrd="1" destOrd="0" parTransId="{B2661689-1F1F-4E0F-A2E1-5887BA18094D}" sibTransId="{E2822F3F-B40E-4FF9-BC8D-7D44CF939779}"/>
+    <dgm:cxn modelId="{9B1EB5DA-6FD3-4009-A71B-56F0453E7B21}" type="presOf" srcId="{6E9BC9EB-F429-40C4-AB41-3D32306E2060}" destId="{92C165B2-BEB5-4F74-94EE-FD279DB49152}" srcOrd="1" destOrd="0" presId="urn:microsoft.com/office/officeart/2005/8/layout/orgChart1"/>
+    <dgm:cxn modelId="{9C4FE5F9-3C93-499E-BA2F-350329153EF0}" type="presOf" srcId="{A2AF496C-1D11-4C11-8E9E-17B961189C21}" destId="{F69D23B4-AFE8-409C-83FF-061A8ECAD086}" srcOrd="0" destOrd="0" presId="urn:microsoft.com/office/officeart/2005/8/layout/orgChart1"/>
     <dgm:cxn modelId="{01CE2FC8-FFF8-41C8-A513-54830B6B31F0}" type="presOf" srcId="{4AFCAEF2-5B21-4364-AF0D-421C27B6CA7C}" destId="{9949C934-C42B-450B-803C-7B8003F40FB8}" srcOrd="0" destOrd="0" presId="urn:microsoft.com/office/officeart/2005/8/layout/orgChart1"/>
+    <dgm:cxn modelId="{56678D34-59CD-4095-9095-EFCC24DC4979}" type="presOf" srcId="{1F78CE57-8592-4FB8-B04D-E8D3187B18EE}" destId="{E05BE627-023E-46E4-990E-E656BE1AC623}" srcOrd="1" destOrd="0" presId="urn:microsoft.com/office/officeart/2005/8/layout/orgChart1"/>
+    <dgm:cxn modelId="{063A70AC-85D8-4674-9BB2-A425BF885AB8}" type="presOf" srcId="{C848FE92-463D-470D-BF1D-04ADA610834C}" destId="{3E3AD66D-B7D7-4DCA-9EE3-EC4F50D31409}" srcOrd="0" destOrd="0" presId="urn:microsoft.com/office/officeart/2005/8/layout/orgChart1"/>
+    <dgm:cxn modelId="{BCB37436-C906-49F1-BAFD-22EB9000C62C}" type="presOf" srcId="{91038339-7E44-407D-8F41-830A9AC7139F}" destId="{75E2338A-6568-4ADE-AEE2-4765ECCACFF8}" srcOrd="1" destOrd="0" presId="urn:microsoft.com/office/officeart/2005/8/layout/orgChart1"/>
+    <dgm:cxn modelId="{EEB006D0-A595-4E62-8308-3519D9991061}" type="presOf" srcId="{B21F075C-07CF-4E94-8A08-FCC582F20775}" destId="{492BA640-7185-47A4-9297-C5663E3E3248}" srcOrd="0" destOrd="0" presId="urn:microsoft.com/office/officeart/2005/8/layout/orgChart1"/>
+    <dgm:cxn modelId="{5C8C1EDF-26F6-4925-A992-436DFB23B95F}" srcId="{C848FE92-463D-470D-BF1D-04ADA610834C}" destId="{8B70E0AE-105B-4655-8741-CDDE780F58D5}" srcOrd="0" destOrd="0" parTransId="{D8835952-A557-4A2A-9CE9-592B61ACC653}" sibTransId="{DA73697A-DD21-4731-8C3A-F840DE0D78DD}"/>
+    <dgm:cxn modelId="{8CFC2E95-9BDB-4643-B6AF-BEB34BFBDB52}" type="presOf" srcId="{2B8D4C78-FF64-4ACF-93A1-FF2950411183}" destId="{9DE9F66F-27C9-4DC2-B07D-7E6BBE00BC85}" srcOrd="0" destOrd="0" presId="urn:microsoft.com/office/officeart/2005/8/layout/orgChart1"/>
+    <dgm:cxn modelId="{1487DF9E-FB8E-44A8-89FA-3C1EE2988011}" type="presOf" srcId="{0E7DEADE-BF26-41B5-8328-486C5DB8DBAC}" destId="{DE1BA932-EB54-40AF-99CF-5C5119D5AFC2}" srcOrd="1" destOrd="0" presId="urn:microsoft.com/office/officeart/2005/8/layout/orgChart1"/>
+    <dgm:cxn modelId="{CFBE2095-859F-4DFA-91E8-12EC076594E2}" srcId="{CB53A11A-061D-4AE2-AB7E-ECAB65D1D1CE}" destId="{6E9BC9EB-F429-40C4-AB41-3D32306E2060}" srcOrd="0" destOrd="0" parTransId="{EDD26731-FE0D-4507-B02B-DFC75EEB244D}" sibTransId="{EF2A5223-B904-459B-8FB8-DFB722EB3654}"/>
+    <dgm:cxn modelId="{347A065A-E365-486E-8254-A65AEFF58C57}" type="presOf" srcId="{D93AFF9F-FC2A-430D-8A44-30757930CD97}" destId="{0A47EE92-B9C5-4742-9497-60986CBC5621}" srcOrd="1" destOrd="0" presId="urn:microsoft.com/office/officeart/2005/8/layout/orgChart1"/>
+    <dgm:cxn modelId="{2CE3F964-0644-44DA-AD07-FB7D4ACC3F78}" type="presOf" srcId="{893C8D60-FD51-4D36-BC40-F19AEA909325}" destId="{C003FAF0-1647-4685-8444-5FC3D138E987}" srcOrd="0" destOrd="0" presId="urn:microsoft.com/office/officeart/2005/8/layout/orgChart1"/>
+    <dgm:cxn modelId="{33652C1B-47AC-403B-A9E6-BFE7C7637A50}" type="presOf" srcId="{E73FA78A-4C4A-46B5-A42E-587D72142E36}" destId="{BBE7B26F-7841-4591-92A4-A426F6588D0B}" srcOrd="0" destOrd="0" presId="urn:microsoft.com/office/officeart/2005/8/layout/orgChart1"/>
+    <dgm:cxn modelId="{1792CA98-0F5C-44BF-AA4C-4EC9DD968ED6}" srcId="{C848FE92-463D-470D-BF1D-04ADA610834C}" destId="{B5DCF512-1AB7-4CD0-9D3F-BE0581B2CB49}" srcOrd="5" destOrd="0" parTransId="{57ACBF68-6D43-43F9-9CEA-15DE04FC1019}" sibTransId="{99E374DF-BF1C-4A17-8544-055EABD0C1F3}"/>
+    <dgm:cxn modelId="{850213D9-5700-4D33-9E55-DDDB24C772ED}" type="presOf" srcId="{728F31A6-D1F3-4DEE-8A9B-9F51D17C553F}" destId="{4D8B1969-F22B-4A5B-994C-1CD8F886EC40}" srcOrd="0" destOrd="0" presId="urn:microsoft.com/office/officeart/2005/8/layout/orgChart1"/>
+    <dgm:cxn modelId="{D87FFB86-1B0A-4785-95BA-6A4A239209FD}" type="presOf" srcId="{9BDADB4E-6332-43C2-9DF5-DFD2D48F4CC3}" destId="{B1454F82-4F97-4669-9A4E-028ED468EEF1}" srcOrd="0" destOrd="0" presId="urn:microsoft.com/office/officeart/2005/8/layout/orgChart1"/>
+    <dgm:cxn modelId="{4E345769-B193-4484-9F98-38254BC93F15}" type="presOf" srcId="{DE4100C8-9BAD-414D-A8B3-EDB25C14EF90}" destId="{ADA5F25E-E5A7-4A74-ABAF-CED9575A8918}" srcOrd="0" destOrd="0" presId="urn:microsoft.com/office/officeart/2005/8/layout/orgChart1"/>
+    <dgm:cxn modelId="{8756457B-5084-49ED-9EED-68869B20BAF8}" type="presOf" srcId="{9DEC245C-5EB8-4B55-9BFA-23D615C3DC8D}" destId="{3CD0C661-C45E-415E-9492-7B4237B233EE}" srcOrd="0" destOrd="0" presId="urn:microsoft.com/office/officeart/2005/8/layout/orgChart1"/>
+    <dgm:cxn modelId="{E2FEB81D-441F-443A-8E0B-614086D71DEB}" type="presOf" srcId="{B21F075C-07CF-4E94-8A08-FCC582F20775}" destId="{1E26C50A-C283-4C1E-B27D-AF9692F99DDF}" srcOrd="1" destOrd="0" presId="urn:microsoft.com/office/officeart/2005/8/layout/orgChart1"/>
+    <dgm:cxn modelId="{DAB52814-9190-480B-8696-95F11AAFFC5F}" srcId="{70387467-9469-4206-8E37-05F43AA08A2A}" destId="{E73FA78A-4C4A-46B5-A42E-587D72142E36}" srcOrd="3" destOrd="0" parTransId="{07EF54CB-A086-4649-8EB1-0FC20D877F22}" sibTransId="{06DD3A08-A9B7-4CDF-B29A-1D6C1C07C491}"/>
+    <dgm:cxn modelId="{F62F681E-E9DA-45D9-BF6C-03FD4683270B}" type="presOf" srcId="{0E7DEADE-BF26-41B5-8328-486C5DB8DBAC}" destId="{1580DD9A-E07B-47E0-A6EF-9A43286CACDB}" srcOrd="0" destOrd="0" presId="urn:microsoft.com/office/officeart/2005/8/layout/orgChart1"/>
+    <dgm:cxn modelId="{5E87B0D9-22EC-4CBE-9615-9880733CC80A}" type="presOf" srcId="{FBD7E154-CFF9-4603-A93A-9AF2E8FCB4D7}" destId="{303DDAE2-27BE-4D5F-B380-2F55F54A80C0}" srcOrd="0" destOrd="0" presId="urn:microsoft.com/office/officeart/2005/8/layout/orgChart1"/>
+    <dgm:cxn modelId="{EFF6A4B2-F8F5-412A-8D6B-EC919C95398D}" type="presOf" srcId="{B5DCF512-1AB7-4CD0-9D3F-BE0581B2CB49}" destId="{0D9F12AB-C58C-43CE-842B-D1F6B81EF42C}" srcOrd="1" destOrd="0" presId="urn:microsoft.com/office/officeart/2005/8/layout/orgChart1"/>
+    <dgm:cxn modelId="{3C074AC2-EC28-4971-B743-99AD9662F1F0}" type="presOf" srcId="{72BEADBA-7002-4022-8823-1A071831A857}" destId="{EE1CF7FD-FFFB-48A0-BAE1-DA9FC25CBA32}" srcOrd="0" destOrd="0" presId="urn:microsoft.com/office/officeart/2005/8/layout/orgChart1"/>
+    <dgm:cxn modelId="{3E072829-EF6D-4033-8CF5-946D5CD87870}" type="presOf" srcId="{9A84B3BF-D88B-4CB3-87E8-4F100CED8C27}" destId="{8A4A9DD9-10DC-48FF-9EA8-06219AA420AE}" srcOrd="1" destOrd="0" presId="urn:microsoft.com/office/officeart/2005/8/layout/orgChart1"/>
+    <dgm:cxn modelId="{57B500DF-E857-4A3E-9657-56D23095AC32}" type="presOf" srcId="{E0AEC5A1-9217-4F7F-8CC9-B4E3DBAC8132}" destId="{0C714DD9-24C9-4E5B-B485-44A250CD8C35}" srcOrd="0" destOrd="0" presId="urn:microsoft.com/office/officeart/2005/8/layout/orgChart1"/>
+    <dgm:cxn modelId="{E146CBC5-D5FF-4063-82CB-467E195EC35C}" type="presOf" srcId="{3C33D1E7-53E9-4F48-98B0-B03D4A07F390}" destId="{2FDD7524-38F6-46AD-8AD8-E54C9C8D0A58}" srcOrd="1" destOrd="0" presId="urn:microsoft.com/office/officeart/2005/8/layout/orgChart1"/>
+    <dgm:cxn modelId="{9B920F71-206A-47E5-B26E-08ED36D82881}" srcId="{6E9BC9EB-F429-40C4-AB41-3D32306E2060}" destId="{2B8D4C78-FF64-4ACF-93A1-FF2950411183}" srcOrd="2" destOrd="0" parTransId="{00BBE172-4AAC-46CF-BB0B-819CB810D615}" sibTransId="{944FCFB1-9D54-42A8-BFE0-62D818A4C5F7}"/>
     <dgm:cxn modelId="{FE8707F5-365A-42E1-884F-EED4EBDB86EC}" type="presOf" srcId="{D8835952-A557-4A2A-9CE9-592B61ACC653}" destId="{F64743E4-6F4F-4ACD-9A9E-383DC668EF91}" srcOrd="0" destOrd="0" presId="urn:microsoft.com/office/officeart/2005/8/layout/orgChart1"/>
-    <dgm:cxn modelId="{FE2F87C8-FF5E-47A4-B5F7-446B3BC7082A}" type="presOf" srcId="{F768A012-F9CB-4338-A1C1-8C46044C9B84}" destId="{62FDE803-F9E5-4655-A48A-92A3CF0C5573}" srcOrd="0" destOrd="0" presId="urn:microsoft.com/office/officeart/2005/8/layout/orgChart1"/>
-    <dgm:cxn modelId="{8E3C4AA8-5518-4F10-928C-A2CD41D31302}" srcId="{1F78CE57-8592-4FB8-B04D-E8D3187B18EE}" destId="{BD80EE29-4101-461C-A2FA-251FF3AE40F5}" srcOrd="0" destOrd="0" parTransId="{85871013-2EE5-4C5F-9A07-B950065F6046}" sibTransId="{C35126B6-3E49-4C7A-A7B7-4B52DC261818}"/>
+    <dgm:cxn modelId="{53CA1CA2-0221-4D86-9D65-3EC480E8EE60}" type="presOf" srcId="{9077FE6A-CBB5-4A51-B3E0-8E41638AA831}" destId="{94382F0D-8693-42D1-A624-AEE4D694E906}" srcOrd="1" destOrd="0" presId="urn:microsoft.com/office/officeart/2005/8/layout/orgChart1"/>
+    <dgm:cxn modelId="{94B3A22D-7F13-4E90-AD72-4C4DB7A8B194}" type="presOf" srcId="{57ACBF68-6D43-43F9-9CEA-15DE04FC1019}" destId="{4D202710-25BA-44D1-B3F0-58EFA03CBBAE}" srcOrd="0" destOrd="0" presId="urn:microsoft.com/office/officeart/2005/8/layout/orgChart1"/>
+    <dgm:cxn modelId="{DB740E3D-DA01-4423-8E08-DC430F5892AA}" type="presOf" srcId="{B7D72A91-0C7E-45B9-AACD-EB806607436E}" destId="{C6823A04-DDB7-4314-BEFD-6A30ADD7A6C7}" srcOrd="0" destOrd="0" presId="urn:microsoft.com/office/officeart/2005/8/layout/orgChart1"/>
+    <dgm:cxn modelId="{29890899-3C1B-4C10-86C4-DE1194BC923C}" type="presOf" srcId="{C9F7C635-5B03-445C-863A-6F6D6F55A527}" destId="{A24B6A51-1C15-4708-80C5-06E8A2353F31}" srcOrd="1" destOrd="0" presId="urn:microsoft.com/office/officeart/2005/8/layout/orgChart1"/>
     <dgm:cxn modelId="{EBD5B7B4-FED5-4CE9-9F89-938630DE627D}" type="presOf" srcId="{1F78CE57-8592-4FB8-B04D-E8D3187B18EE}" destId="{3369F1D2-F051-43DD-9F81-DCE1DB8DD909}" srcOrd="0" destOrd="0" presId="urn:microsoft.com/office/officeart/2005/8/layout/orgChart1"/>
+    <dgm:cxn modelId="{45CDC0A3-334E-4BE4-9510-4198E2F81354}" type="presOf" srcId="{9077FE6A-CBB5-4A51-B3E0-8E41638AA831}" destId="{E48E1750-FD00-46D8-B773-5B48261A443A}" srcOrd="0" destOrd="0" presId="urn:microsoft.com/office/officeart/2005/8/layout/orgChart1"/>
+    <dgm:cxn modelId="{07893050-6BEF-4D16-9B7F-68801196BBD1}" type="presOf" srcId="{85871013-2EE5-4C5F-9A07-B950065F6046}" destId="{0D692004-6B64-409A-B340-6A8BEBCD083F}" srcOrd="0" destOrd="0" presId="urn:microsoft.com/office/officeart/2005/8/layout/orgChart1"/>
+    <dgm:cxn modelId="{A6D8989D-846A-471D-A315-C4A8D9533E01}" type="presOf" srcId="{07EF54CB-A086-4649-8EB1-0FC20D877F22}" destId="{71017FC9-5A4F-4D82-BC88-E649C7AC0B9F}" srcOrd="0" destOrd="0" presId="urn:microsoft.com/office/officeart/2005/8/layout/orgChart1"/>
     <dgm:cxn modelId="{40243BB7-1CC6-4EC0-9E75-466D62E11041}" srcId="{C848FE92-463D-470D-BF1D-04ADA610834C}" destId="{D93AFF9F-FC2A-430D-8A44-30757930CD97}" srcOrd="6" destOrd="0" parTransId="{C9FCDA05-6AE7-4E3F-9782-92E7E3A0D1AE}" sibTransId="{E19D99CE-5663-49EC-BC54-63AA0B502EB2}"/>
-    <dgm:cxn modelId="{F789A21E-7345-434F-9855-4F846D629779}" type="presOf" srcId="{69CDE423-D26D-40D6-8B92-2731C1D24B3F}" destId="{46BABAA7-E001-43D5-90DC-992E4068B713}" srcOrd="0" destOrd="0" presId="urn:microsoft.com/office/officeart/2005/8/layout/orgChart1"/>
-    <dgm:cxn modelId="{D170A647-CD3D-4F37-851B-F78BE25ED540}" srcId="{6E9BC9EB-F429-40C4-AB41-3D32306E2060}" destId="{3C33D1E7-53E9-4F48-98B0-B03D4A07F390}" srcOrd="1" destOrd="0" parTransId="{3CE2639D-3C61-4B69-9A41-4E26F68EA67D}" sibTransId="{6202B589-853A-4664-BD08-47800EEA9A98}"/>
-    <dgm:cxn modelId="{C8D8E5F3-2910-4FA4-B99D-E0056DDEB9D0}" type="presOf" srcId="{E0AEC5A1-9217-4F7F-8CC9-B4E3DBAC8132}" destId="{4D4D5C94-49C5-4B67-BEF3-8F860D410F15}" srcOrd="1" destOrd="0" presId="urn:microsoft.com/office/officeart/2005/8/layout/orgChart1"/>
-    <dgm:cxn modelId="{9B1EB5DA-6FD3-4009-A71B-56F0453E7B21}" type="presOf" srcId="{6E9BC9EB-F429-40C4-AB41-3D32306E2060}" destId="{92C165B2-BEB5-4F74-94EE-FD279DB49152}" srcOrd="1" destOrd="0" presId="urn:microsoft.com/office/officeart/2005/8/layout/orgChart1"/>
-    <dgm:cxn modelId="{E146CBC5-D5FF-4063-82CB-467E195EC35C}" type="presOf" srcId="{3C33D1E7-53E9-4F48-98B0-B03D4A07F390}" destId="{2FDD7524-38F6-46AD-8AD8-E54C9C8D0A58}" srcOrd="1" destOrd="0" presId="urn:microsoft.com/office/officeart/2005/8/layout/orgChart1"/>
-    <dgm:cxn modelId="{A3205A72-8961-4674-9717-1EB8F0CC3325}" type="presOf" srcId="{C132DD6E-C978-4D3A-9097-26E40C4A6B78}" destId="{2C89911A-559B-4BFC-AA8C-BE3307F3F263}" srcOrd="0" destOrd="0" presId="urn:microsoft.com/office/officeart/2005/8/layout/orgChart1"/>
-    <dgm:cxn modelId="{2573F99B-1F5A-43A2-AF78-B9D3BF0668EF}" type="presOf" srcId="{3CE2639D-3C61-4B69-9A41-4E26F68EA67D}" destId="{315673BE-5240-4669-A35C-00CBBABDF50A}" srcOrd="0" destOrd="0" presId="urn:microsoft.com/office/officeart/2005/8/layout/orgChart1"/>
-    <dgm:cxn modelId="{9B920F71-206A-47E5-B26E-08ED36D82881}" srcId="{6E9BC9EB-F429-40C4-AB41-3D32306E2060}" destId="{2B8D4C78-FF64-4ACF-93A1-FF2950411183}" srcOrd="2" destOrd="0" parTransId="{00BBE172-4AAC-46CF-BB0B-819CB810D615}" sibTransId="{944FCFB1-9D54-42A8-BFE0-62D818A4C5F7}"/>
-    <dgm:cxn modelId="{476AD122-5591-4B06-8A12-00925D3B35E9}" type="presOf" srcId="{62C8414F-66B2-4760-BFF0-3DCCD5379EBF}" destId="{ADC84BD5-BDA2-44D3-944A-23429540931E}" srcOrd="0" destOrd="0" presId="urn:microsoft.com/office/officeart/2005/8/layout/orgChart1"/>
-    <dgm:cxn modelId="{BD8D81D1-9F24-483E-9785-174EE0FDF760}" type="presOf" srcId="{E73FA78A-4C4A-46B5-A42E-587D72142E36}" destId="{A38C7A00-0F57-448B-B395-46EC701BA310}" srcOrd="1" destOrd="0" presId="urn:microsoft.com/office/officeart/2005/8/layout/orgChart1"/>
-    <dgm:cxn modelId="{FD0938AB-F41C-4599-A595-BEB375C67F50}" type="presOf" srcId="{DE4100C8-9BAD-414D-A8B3-EDB25C14EF90}" destId="{49318898-FFE0-48FC-88B6-BA0FD1394A43}" srcOrd="1" destOrd="0" presId="urn:microsoft.com/office/officeart/2005/8/layout/orgChart1"/>
     <dgm:cxn modelId="{08008EAA-C5B4-4AE5-8CA6-F8DFF640F8F8}" srcId="{C848FE92-463D-470D-BF1D-04ADA610834C}" destId="{728F31A6-D1F3-4DEE-8A9B-9F51D17C553F}" srcOrd="1" destOrd="0" parTransId="{9BDADB4E-6332-43C2-9DF5-DFD2D48F4CC3}" sibTransId="{EC1A9083-FCD5-48A2-9551-579AFC9D1C20}"/>
+    <dgm:cxn modelId="{66AF5C80-F57D-4537-B23A-89F08559477D}" type="presOf" srcId="{B5DCF512-1AB7-4CD0-9D3F-BE0581B2CB49}" destId="{E847BB21-2BE7-4387-85A1-738AFFD84E75}" srcOrd="0" destOrd="0" presId="urn:microsoft.com/office/officeart/2005/8/layout/orgChart1"/>
     <dgm:cxn modelId="{3F3BFF5D-3F9F-4D37-BE90-F07D83626B0C}" type="presOf" srcId="{C9F7C635-5B03-445C-863A-6F6D6F55A527}" destId="{C5D44253-2C4B-4687-BE85-E35CDA49FA38}" srcOrd="0" destOrd="0" presId="urn:microsoft.com/office/officeart/2005/8/layout/orgChart1"/>
-    <dgm:cxn modelId="{29890899-3C1B-4C10-86C4-DE1194BC923C}" type="presOf" srcId="{C9F7C635-5B03-445C-863A-6F6D6F55A527}" destId="{A24B6A51-1C15-4708-80C5-06E8A2353F31}" srcOrd="1" destOrd="0" presId="urn:microsoft.com/office/officeart/2005/8/layout/orgChart1"/>
-    <dgm:cxn modelId="{92104E9D-79E3-4F11-954D-295409B46501}" type="presOf" srcId="{3C33D1E7-53E9-4F48-98B0-B03D4A07F390}" destId="{437B21D8-99D7-4F78-A576-12278DF24217}" srcOrd="0" destOrd="0" presId="urn:microsoft.com/office/officeart/2005/8/layout/orgChart1"/>
-    <dgm:cxn modelId="{2C0CD4D4-B048-4D76-B6CE-FF03D081B514}" type="presOf" srcId="{CB53A11A-061D-4AE2-AB7E-ECAB65D1D1CE}" destId="{C170A22D-0CFC-41E3-BFF2-C8043C638EF7}" srcOrd="1" destOrd="0" presId="urn:microsoft.com/office/officeart/2005/8/layout/orgChart1"/>
-    <dgm:cxn modelId="{2CE3F964-0644-44DA-AD07-FB7D4ACC3F78}" type="presOf" srcId="{893C8D60-FD51-4D36-BC40-F19AEA909325}" destId="{C003FAF0-1647-4685-8444-5FC3D138E987}" srcOrd="0" destOrd="0" presId="urn:microsoft.com/office/officeart/2005/8/layout/orgChart1"/>
-    <dgm:cxn modelId="{F1BB52F8-5A8B-45FB-BA33-3F1A59AC412B}" type="presOf" srcId="{8B70E0AE-105B-4655-8741-CDDE780F58D5}" destId="{FF723FAF-5914-42C7-AA55-7E21550CA385}" srcOrd="1" destOrd="0" presId="urn:microsoft.com/office/officeart/2005/8/layout/orgChart1"/>
-    <dgm:cxn modelId="{83A16CE3-884F-4928-8713-D168EE69381F}" type="presOf" srcId="{CB53A11A-061D-4AE2-AB7E-ECAB65D1D1CE}" destId="{BD9EEFF5-C9E2-40B4-8501-30865610934D}" srcOrd="0" destOrd="0" presId="urn:microsoft.com/office/officeart/2005/8/layout/orgChart1"/>
-    <dgm:cxn modelId="{3E072829-EF6D-4033-8CF5-946D5CD87870}" type="presOf" srcId="{9A84B3BF-D88B-4CB3-87E8-4F100CED8C27}" destId="{8A4A9DD9-10DC-48FF-9EA8-06219AA420AE}" srcOrd="1" destOrd="0" presId="urn:microsoft.com/office/officeart/2005/8/layout/orgChart1"/>
-    <dgm:cxn modelId="{347A065A-E365-486E-8254-A65AEFF58C57}" type="presOf" srcId="{D93AFF9F-FC2A-430D-8A44-30757930CD97}" destId="{0A47EE92-B9C5-4742-9497-60986CBC5621}" srcOrd="1" destOrd="0" presId="urn:microsoft.com/office/officeart/2005/8/layout/orgChart1"/>
-    <dgm:cxn modelId="{9C4FE5F9-3C93-499E-BA2F-350329153EF0}" type="presOf" srcId="{A2AF496C-1D11-4C11-8E9E-17B961189C21}" destId="{F69D23B4-AFE8-409C-83FF-061A8ECAD086}" srcOrd="0" destOrd="0" presId="urn:microsoft.com/office/officeart/2005/8/layout/orgChart1"/>
-    <dgm:cxn modelId="{3C074AC2-EC28-4971-B743-99AD9662F1F0}" type="presOf" srcId="{72BEADBA-7002-4022-8823-1A071831A857}" destId="{EE1CF7FD-FFFB-48A0-BAE1-DA9FC25CBA32}" srcOrd="0" destOrd="0" presId="urn:microsoft.com/office/officeart/2005/8/layout/orgChart1"/>
-    <dgm:cxn modelId="{0523E2FD-5CB6-4D0E-BC62-A67E313B3C02}" srcId="{DE4100C8-9BAD-414D-A8B3-EDB25C14EF90}" destId="{C132DD6E-C978-4D3A-9097-26E40C4A6B78}" srcOrd="0" destOrd="0" parTransId="{F768A012-F9CB-4338-A1C1-8C46044C9B84}" sibTransId="{73E6FDFD-DADE-4F4C-92D2-2EB726E48812}"/>
-    <dgm:cxn modelId="{E00B8292-CE09-490B-BE89-C729C0FD196E}" type="presOf" srcId="{2B8D4C78-FF64-4ACF-93A1-FF2950411183}" destId="{1B173EF7-3CA3-427A-8727-A659BF3D3B97}" srcOrd="1" destOrd="0" presId="urn:microsoft.com/office/officeart/2005/8/layout/orgChart1"/>
-    <dgm:cxn modelId="{07893050-6BEF-4D16-9B7F-68801196BBD1}" type="presOf" srcId="{85871013-2EE5-4C5F-9A07-B950065F6046}" destId="{0D692004-6B64-409A-B340-6A8BEBCD083F}" srcOrd="0" destOrd="0" presId="urn:microsoft.com/office/officeart/2005/8/layout/orgChart1"/>
-    <dgm:cxn modelId="{1F6FA51C-0A64-4B40-8086-86B0ADF79D57}" type="presOf" srcId="{91038339-7E44-407D-8F41-830A9AC7139F}" destId="{BE05C31F-DF27-417A-9B03-58F2D293754F}" srcOrd="0" destOrd="0" presId="urn:microsoft.com/office/officeart/2005/8/layout/orgChart1"/>
-    <dgm:cxn modelId="{F62F681E-E9DA-45D9-BF6C-03FD4683270B}" type="presOf" srcId="{0E7DEADE-BF26-41B5-8328-486C5DB8DBAC}" destId="{1580DD9A-E07B-47E0-A6EF-9A43286CACDB}" srcOrd="0" destOrd="0" presId="urn:microsoft.com/office/officeart/2005/8/layout/orgChart1"/>
-    <dgm:cxn modelId="{520A1B6E-D2A6-4CA7-8301-483829FA4B62}" type="presOf" srcId="{00BBE172-4AAC-46CF-BB0B-819CB810D615}" destId="{7A4A29C7-243B-425C-A348-CF9373CBF90A}" srcOrd="0" destOrd="0" presId="urn:microsoft.com/office/officeart/2005/8/layout/orgChart1"/>
-    <dgm:cxn modelId="{A715B411-2011-4EEE-B0ED-04BF6F6C4686}" type="presOf" srcId="{C132DD6E-C978-4D3A-9097-26E40C4A6B78}" destId="{3CD86AF3-F89E-4AEF-8B8D-C6C7982A19EB}" srcOrd="1" destOrd="0" presId="urn:microsoft.com/office/officeart/2005/8/layout/orgChart1"/>
-    <dgm:cxn modelId="{D1ED6821-D146-474D-B5EE-F3A71D6139DF}" srcId="{70387467-9469-4206-8E37-05F43AA08A2A}" destId="{9A84B3BF-D88B-4CB3-87E8-4F100CED8C27}" srcOrd="1" destOrd="0" parTransId="{A2AF496C-1D11-4C11-8E9E-17B961189C21}" sibTransId="{D8811D41-1520-4122-98DC-EE57AA63D4CF}"/>
-    <dgm:cxn modelId="{45CDC0A3-334E-4BE4-9510-4198E2F81354}" type="presOf" srcId="{9077FE6A-CBB5-4A51-B3E0-8E41638AA831}" destId="{E48E1750-FD00-46D8-B773-5B48261A443A}" srcOrd="0" destOrd="0" presId="urn:microsoft.com/office/officeart/2005/8/layout/orgChart1"/>
-    <dgm:cxn modelId="{22B76D12-1A31-4821-B7E4-D7DA47E648A7}" type="presOf" srcId="{C9FCDA05-6AE7-4E3F-9782-92E7E3A0D1AE}" destId="{41268A2F-036D-4181-AA5A-D468DAC79392}" srcOrd="0" destOrd="0" presId="urn:microsoft.com/office/officeart/2005/8/layout/orgChart1"/>
-    <dgm:cxn modelId="{DB740E3D-DA01-4423-8E08-DC430F5892AA}" type="presOf" srcId="{B7D72A91-0C7E-45B9-AACD-EB806607436E}" destId="{C6823A04-DDB7-4314-BEFD-6A30ADD7A6C7}" srcOrd="0" destOrd="0" presId="urn:microsoft.com/office/officeart/2005/8/layout/orgChart1"/>
-    <dgm:cxn modelId="{C3F67261-CEA3-4F23-825C-979BFD40E3BF}" srcId="{C848FE92-463D-470D-BF1D-04ADA610834C}" destId="{E0AEC5A1-9217-4F7F-8CC9-B4E3DBAC8132}" srcOrd="2" destOrd="0" parTransId="{871DF954-769D-4F88-86E9-4C8BBCEB4AED}" sibTransId="{44437E95-F69D-464C-AAE1-42D40BAA01C6}"/>
-    <dgm:cxn modelId="{B8EF7ECD-2B3B-4478-836E-AED454264EC9}" srcId="{DE4100C8-9BAD-414D-A8B3-EDB25C14EF90}" destId="{C9F7C635-5B03-445C-863A-6F6D6F55A527}" srcOrd="1" destOrd="0" parTransId="{B2661689-1F1F-4E0F-A2E1-5887BA18094D}" sibTransId="{E2822F3F-B40E-4FF9-BC8D-7D44CF939779}"/>
-    <dgm:cxn modelId="{AF19BD81-7EFE-4928-B09E-D14F25BA44D8}" type="presOf" srcId="{BD80EE29-4101-461C-A2FA-251FF3AE40F5}" destId="{0FDF530A-5B68-46B1-8CFE-11FDA64DE391}" srcOrd="1" destOrd="0" presId="urn:microsoft.com/office/officeart/2005/8/layout/orgChart1"/>
-    <dgm:cxn modelId="{1487DF9E-FB8E-44A8-89FA-3C1EE2988011}" type="presOf" srcId="{0E7DEADE-BF26-41B5-8328-486C5DB8DBAC}" destId="{DE1BA932-EB54-40AF-99CF-5C5119D5AFC2}" srcOrd="1" destOrd="0" presId="urn:microsoft.com/office/officeart/2005/8/layout/orgChart1"/>
-    <dgm:cxn modelId="{3EBDEAA3-B9C6-498F-9BE4-6896490179C0}" type="presOf" srcId="{D93AFF9F-FC2A-430D-8A44-30757930CD97}" destId="{630FB1FE-1568-4E6E-A0E0-457118C98AEE}" srcOrd="0" destOrd="0" presId="urn:microsoft.com/office/officeart/2005/8/layout/orgChart1"/>
-    <dgm:cxn modelId="{037E7708-389F-4734-B628-C72D4596C1AB}" srcId="{70387467-9469-4206-8E37-05F43AA08A2A}" destId="{72BEADBA-7002-4022-8823-1A071831A857}" srcOrd="5" destOrd="0" parTransId="{62C8414F-66B2-4760-BFF0-3DCCD5379EBF}" sibTransId="{51D0C412-15D0-48FC-84A2-48027B2EC0B4}"/>
-    <dgm:cxn modelId="{EFF6A4B2-F8F5-412A-8D6B-EC919C95398D}" type="presOf" srcId="{B5DCF512-1AB7-4CD0-9D3F-BE0581B2CB49}" destId="{0D9F12AB-C58C-43CE-842B-D1F6B81EF42C}" srcOrd="1" destOrd="0" presId="urn:microsoft.com/office/officeart/2005/8/layout/orgChart1"/>
-    <dgm:cxn modelId="{D646FC28-3FE9-4844-A3AA-7AB80C399B5E}" type="presOf" srcId="{8B70E0AE-105B-4655-8741-CDDE780F58D5}" destId="{DC67B31A-26AA-4189-8A22-1889CEF361A4}" srcOrd="0" destOrd="0" presId="urn:microsoft.com/office/officeart/2005/8/layout/orgChart1"/>
-    <dgm:cxn modelId="{62F86BEE-6C4E-4DFA-B493-C03AAF805FDA}" type="presOf" srcId="{72BEADBA-7002-4022-8823-1A071831A857}" destId="{C696DC6B-2F99-47BF-8D94-C8BA55D71D9E}" srcOrd="1" destOrd="0" presId="urn:microsoft.com/office/officeart/2005/8/layout/orgChart1"/>
-    <dgm:cxn modelId="{7C0B39DA-337C-42AE-A7E3-A1F511A67F89}" type="presOf" srcId="{BD80EE29-4101-461C-A2FA-251FF3AE40F5}" destId="{D382AD5D-81AD-4AC6-9E59-F29201543338}" srcOrd="0" destOrd="0" presId="urn:microsoft.com/office/officeart/2005/8/layout/orgChart1"/>
-    <dgm:cxn modelId="{775B086A-D63E-405E-AFE0-964F62B70284}" srcId="{402F2858-01CB-44CE-82CD-EE007210A1B1}" destId="{70387467-9469-4206-8E37-05F43AA08A2A}" srcOrd="0" destOrd="0" parTransId="{CB45B893-CCF8-4274-A974-3FA00CE24CDE}" sibTransId="{063EE879-2B9F-488E-83A9-ED0FB91B5A5E}"/>
-    <dgm:cxn modelId="{6C392A1A-CF21-46BB-A922-B55CC4623054}" srcId="{C848FE92-463D-470D-BF1D-04ADA610834C}" destId="{0E7DEADE-BF26-41B5-8328-486C5DB8DBAC}" srcOrd="4" destOrd="0" parTransId="{893C8D60-FD51-4D36-BC40-F19AEA909325}" sibTransId="{38AFF0BB-C988-42A7-AEBC-6A5DB48BA721}"/>
-    <dgm:cxn modelId="{2D48A147-7839-4E10-A652-DF9BBEDA9723}" type="presOf" srcId="{6E9BC9EB-F429-40C4-AB41-3D32306E2060}" destId="{33A6DC25-4DEB-4F90-9E16-4D43C3569F99}" srcOrd="0" destOrd="0" presId="urn:microsoft.com/office/officeart/2005/8/layout/orgChart1"/>
-    <dgm:cxn modelId="{49AFE0A2-0F37-4237-8D1F-7E81C74526A5}" srcId="{70387467-9469-4206-8E37-05F43AA08A2A}" destId="{B21F075C-07CF-4E94-8A08-FCC582F20775}" srcOrd="4" destOrd="0" parTransId="{9DEC245C-5EB8-4B55-9BFA-23D615C3DC8D}" sibTransId="{25A9CB95-2B4A-49A4-BB64-EF641A8617CC}"/>
-    <dgm:cxn modelId="{8CFC2E95-9BDB-4643-B6AF-BEB34BFBDB52}" type="presOf" srcId="{2B8D4C78-FF64-4ACF-93A1-FF2950411183}" destId="{9DE9F66F-27C9-4DC2-B07D-7E6BBE00BC85}" srcOrd="0" destOrd="0" presId="urn:microsoft.com/office/officeart/2005/8/layout/orgChart1"/>
-    <dgm:cxn modelId="{CBD3D9F6-B59B-4753-9F61-B7F2ECDCAB28}" srcId="{70387467-9469-4206-8E37-05F43AA08A2A}" destId="{CB53A11A-061D-4AE2-AB7E-ECAB65D1D1CE}" srcOrd="2" destOrd="0" parTransId="{69CDE423-D26D-40D6-8B92-2731C1D24B3F}" sibTransId="{F7B10986-3D3A-4585-99A3-FA4F25E72B9B}"/>
-    <dgm:cxn modelId="{57B500DF-E857-4A3E-9657-56D23095AC32}" type="presOf" srcId="{E0AEC5A1-9217-4F7F-8CC9-B4E3DBAC8132}" destId="{0C714DD9-24C9-4E5B-B485-44A250CD8C35}" srcOrd="0" destOrd="0" presId="urn:microsoft.com/office/officeart/2005/8/layout/orgChart1"/>
-    <dgm:cxn modelId="{4E345769-B193-4484-9F98-38254BC93F15}" type="presOf" srcId="{DE4100C8-9BAD-414D-A8B3-EDB25C14EF90}" destId="{ADA5F25E-E5A7-4A74-ABAF-CED9575A8918}" srcOrd="0" destOrd="0" presId="urn:microsoft.com/office/officeart/2005/8/layout/orgChart1"/>
-    <dgm:cxn modelId="{9B3806F4-058B-4A2B-8663-38547B76530E}" type="presOf" srcId="{B2661689-1F1F-4E0F-A2E1-5887BA18094D}" destId="{E55EDA56-BBD3-4D8A-A274-B9F591143EBF}" srcOrd="0" destOrd="0" presId="urn:microsoft.com/office/officeart/2005/8/layout/orgChart1"/>
-    <dgm:cxn modelId="{E2FEB81D-441F-443A-8E0B-614086D71DEB}" type="presOf" srcId="{B21F075C-07CF-4E94-8A08-FCC582F20775}" destId="{1E26C50A-C283-4C1E-B27D-AF9692F99DDF}" srcOrd="1" destOrd="0" presId="urn:microsoft.com/office/officeart/2005/8/layout/orgChart1"/>
-    <dgm:cxn modelId="{1B724CEF-C48D-4BBB-9D82-9D18410CADD4}" type="presOf" srcId="{9A84B3BF-D88B-4CB3-87E8-4F100CED8C27}" destId="{7EC0BC3D-ED4D-42E6-82F2-9672178A5531}" srcOrd="0" destOrd="0" presId="urn:microsoft.com/office/officeart/2005/8/layout/orgChart1"/>
-    <dgm:cxn modelId="{205D6A29-9740-4666-BDF7-4679933CFDB4}" type="presOf" srcId="{C848FE92-463D-470D-BF1D-04ADA610834C}" destId="{3AA664D6-AB72-4048-9FD3-F61832C3F2AC}" srcOrd="1" destOrd="0" presId="urn:microsoft.com/office/officeart/2005/8/layout/orgChart1"/>
-    <dgm:cxn modelId="{75CFC882-0004-4D6B-A827-295FA9B504A4}" type="presOf" srcId="{728F31A6-D1F3-4DEE-8A9B-9F51D17C553F}" destId="{6C222222-6606-476E-9437-D5DEBD9F6A62}" srcOrd="1" destOrd="0" presId="urn:microsoft.com/office/officeart/2005/8/layout/orgChart1"/>
-    <dgm:cxn modelId="{A6D8989D-846A-471D-A315-C4A8D9533E01}" type="presOf" srcId="{07EF54CB-A086-4649-8EB1-0FC20D877F22}" destId="{71017FC9-5A4F-4D82-BC88-E649C7AC0B9F}" srcOrd="0" destOrd="0" presId="urn:microsoft.com/office/officeart/2005/8/layout/orgChart1"/>
-    <dgm:cxn modelId="{8756457B-5084-49ED-9EED-68869B20BAF8}" type="presOf" srcId="{9DEC245C-5EB8-4B55-9BFA-23D615C3DC8D}" destId="{3CD0C661-C45E-415E-9492-7B4237B233EE}" srcOrd="0" destOrd="0" presId="urn:microsoft.com/office/officeart/2005/8/layout/orgChart1"/>
-    <dgm:cxn modelId="{A22F35A7-82F0-4DA2-9306-BDD28B4DC4B1}" type="presOf" srcId="{07765CC6-0379-4A19-BB7B-26FA6EAF4C4E}" destId="{929FFC8C-93B3-4C2C-8A29-F6DEB3F4B432}" srcOrd="0" destOrd="0" presId="urn:microsoft.com/office/officeart/2005/8/layout/orgChart1"/>
-    <dgm:cxn modelId="{42C997C6-BDE0-4F8B-9776-2E54207F752B}" type="presOf" srcId="{70387467-9469-4206-8E37-05F43AA08A2A}" destId="{6E110BFA-A299-4837-B09B-5069CD9CCA46}" srcOrd="0" destOrd="0" presId="urn:microsoft.com/office/officeart/2005/8/layout/orgChart1"/>
-    <dgm:cxn modelId="{CFBE2095-859F-4DFA-91E8-12EC076594E2}" srcId="{CB53A11A-061D-4AE2-AB7E-ECAB65D1D1CE}" destId="{6E9BC9EB-F429-40C4-AB41-3D32306E2060}" srcOrd="0" destOrd="0" parTransId="{EDD26731-FE0D-4507-B02B-DFC75EEB244D}" sibTransId="{EF2A5223-B904-459B-8FB8-DFB722EB3654}"/>
-    <dgm:cxn modelId="{D87FFB86-1B0A-4785-95BA-6A4A239209FD}" type="presOf" srcId="{9BDADB4E-6332-43C2-9DF5-DFD2D48F4CC3}" destId="{B1454F82-4F97-4669-9A4E-028ED468EEF1}" srcOrd="0" destOrd="0" presId="urn:microsoft.com/office/officeart/2005/8/layout/orgChart1"/>
-    <dgm:cxn modelId="{DAB52814-9190-480B-8696-95F11AAFFC5F}" srcId="{70387467-9469-4206-8E37-05F43AA08A2A}" destId="{E73FA78A-4C4A-46B5-A42E-587D72142E36}" srcOrd="3" destOrd="0" parTransId="{07EF54CB-A086-4649-8EB1-0FC20D877F22}" sibTransId="{06DD3A08-A9B7-4CDF-B29A-1D6C1C07C491}"/>
-    <dgm:cxn modelId="{94B3A22D-7F13-4E90-AD72-4C4DB7A8B194}" type="presOf" srcId="{57ACBF68-6D43-43F9-9CEA-15DE04FC1019}" destId="{4D202710-25BA-44D1-B3F0-58EFA03CBBAE}" srcOrd="0" destOrd="0" presId="urn:microsoft.com/office/officeart/2005/8/layout/orgChart1"/>
-    <dgm:cxn modelId="{5C8C1EDF-26F6-4925-A992-436DFB23B95F}" srcId="{C848FE92-463D-470D-BF1D-04ADA610834C}" destId="{8B70E0AE-105B-4655-8741-CDDE780F58D5}" srcOrd="0" destOrd="0" parTransId="{D8835952-A557-4A2A-9CE9-592B61ACC653}" sibTransId="{DA73697A-DD21-4731-8C3A-F840DE0D78DD}"/>
-    <dgm:cxn modelId="{DAB2DEE9-1BA5-4FDB-8CC3-9425A2F4AD4E}" type="presOf" srcId="{70387467-9469-4206-8E37-05F43AA08A2A}" destId="{1E93D8A4-024A-4C20-83A6-DD56653D372A}" srcOrd="1" destOrd="0" presId="urn:microsoft.com/office/officeart/2005/8/layout/orgChart1"/>
-    <dgm:cxn modelId="{3A96FE48-420B-499F-A3A9-B4B73112A551}" type="presOf" srcId="{402F2858-01CB-44CE-82CD-EE007210A1B1}" destId="{875BAD68-6674-44BE-ABFE-7F5E3F19A10D}" srcOrd="0" destOrd="0" presId="urn:microsoft.com/office/officeart/2005/8/layout/orgChart1"/>
-    <dgm:cxn modelId="{850213D9-5700-4D33-9E55-DDDB24C772ED}" type="presOf" srcId="{728F31A6-D1F3-4DEE-8A9B-9F51D17C553F}" destId="{4D8B1969-F22B-4A5B-994C-1CD8F886EC40}" srcOrd="0" destOrd="0" presId="urn:microsoft.com/office/officeart/2005/8/layout/orgChart1"/>
-    <dgm:cxn modelId="{8B7D28C2-5C5E-4211-8C7B-49214A1D64B2}" type="presOf" srcId="{6EFD63C3-BBE7-44E5-A3D6-9B50F167D8B9}" destId="{A444900E-0076-4B1A-BC17-B35A2ECF1F33}" srcOrd="0" destOrd="0" presId="urn:microsoft.com/office/officeart/2005/8/layout/orgChart1"/>
-    <dgm:cxn modelId="{929339D4-3643-4749-9647-C96129F1528B}" srcId="{402F2858-01CB-44CE-82CD-EE007210A1B1}" destId="{9077FE6A-CBB5-4A51-B3E0-8E41638AA831}" srcOrd="1" destOrd="0" parTransId="{25C53C84-C4D2-4EF6-9FE0-7BF969088FD8}" sibTransId="{EBF2BF22-245F-4F16-8BA3-6D89D3767B2F}"/>
-    <dgm:cxn modelId="{66AF5C80-F57D-4537-B23A-89F08559477D}" type="presOf" srcId="{B5DCF512-1AB7-4CD0-9D3F-BE0581B2CB49}" destId="{E847BB21-2BE7-4387-85A1-738AFFD84E75}" srcOrd="0" destOrd="0" presId="urn:microsoft.com/office/officeart/2005/8/layout/orgChart1"/>
-    <dgm:cxn modelId="{063A70AC-85D8-4674-9BB2-A425BF885AB8}" type="presOf" srcId="{C848FE92-463D-470D-BF1D-04ADA610834C}" destId="{3E3AD66D-B7D7-4DCA-9EE3-EC4F50D31409}" srcOrd="0" destOrd="0" presId="urn:microsoft.com/office/officeart/2005/8/layout/orgChart1"/>
-    <dgm:cxn modelId="{56678D34-59CD-4095-9095-EFCC24DC4979}" type="presOf" srcId="{1F78CE57-8592-4FB8-B04D-E8D3187B18EE}" destId="{E05BE627-023E-46E4-990E-E656BE1AC623}" srcOrd="1" destOrd="0" presId="urn:microsoft.com/office/officeart/2005/8/layout/orgChart1"/>
-    <dgm:cxn modelId="{BEB37929-9D49-481D-8CDC-1207A4AF1659}" srcId="{70387467-9469-4206-8E37-05F43AA08A2A}" destId="{1F78CE57-8592-4FB8-B04D-E8D3187B18EE}" srcOrd="6" destOrd="0" parTransId="{4AFCAEF2-5B21-4364-AF0D-421C27B6CA7C}" sibTransId="{E4F7C61B-6C5B-4E6F-81B4-10F0BBC50CB1}"/>
-    <dgm:cxn modelId="{1792CA98-0F5C-44BF-AA4C-4EC9DD968ED6}" srcId="{C848FE92-463D-470D-BF1D-04ADA610834C}" destId="{B5DCF512-1AB7-4CD0-9D3F-BE0581B2CB49}" srcOrd="5" destOrd="0" parTransId="{57ACBF68-6D43-43F9-9CEA-15DE04FC1019}" sibTransId="{99E374DF-BF1C-4A17-8544-055EABD0C1F3}"/>
-    <dgm:cxn modelId="{EEB006D0-A595-4E62-8308-3519D9991061}" type="presOf" srcId="{B21F075C-07CF-4E94-8A08-FCC582F20775}" destId="{492BA640-7185-47A4-9297-C5663E3E3248}" srcOrd="0" destOrd="0" presId="urn:microsoft.com/office/officeart/2005/8/layout/orgChart1"/>
-    <dgm:cxn modelId="{C3DA0AE2-484C-41D8-BD16-7DA6C5288FB5}" type="presOf" srcId="{EDD26731-FE0D-4507-B02B-DFC75EEB244D}" destId="{D46E7BEF-C70C-4317-9836-5C7ACC38E3B3}" srcOrd="0" destOrd="0" presId="urn:microsoft.com/office/officeart/2005/8/layout/orgChart1"/>
-    <dgm:cxn modelId="{4CECFBFD-CFFB-467E-9664-8FABEEEF24B8}" srcId="{C848FE92-463D-470D-BF1D-04ADA610834C}" destId="{91038339-7E44-407D-8F41-830A9AC7139F}" srcOrd="3" destOrd="0" parTransId="{5C062E8D-7F59-4188-9E49-88730FD1D5F8}" sibTransId="{63641D8B-AA92-4836-8C70-7F744622D479}"/>
-    <dgm:cxn modelId="{BCB37436-C906-49F1-BAFD-22EB9000C62C}" type="presOf" srcId="{91038339-7E44-407D-8F41-830A9AC7139F}" destId="{75E2338A-6568-4ADE-AEE2-4765ECCACFF8}" srcOrd="1" destOrd="0" presId="urn:microsoft.com/office/officeart/2005/8/layout/orgChart1"/>
-    <dgm:cxn modelId="{69FA9F9A-DCA1-418D-937E-49BF1CB29C88}" type="presOf" srcId="{5C062E8D-7F59-4188-9E49-88730FD1D5F8}" destId="{7D114837-346D-4A12-88C3-1553C609DED8}" srcOrd="0" destOrd="0" presId="urn:microsoft.com/office/officeart/2005/8/layout/orgChart1"/>
-    <dgm:cxn modelId="{7B404FC7-0AA0-4B53-B1FA-53D12F6ADBF8}" srcId="{70387467-9469-4206-8E37-05F43AA08A2A}" destId="{DE4100C8-9BAD-414D-A8B3-EDB25C14EF90}" srcOrd="0" destOrd="0" parTransId="{07765CC6-0379-4A19-BB7B-26FA6EAF4C4E}" sibTransId="{36AA1A18-9698-4EB4-8451-D1C33571304D}"/>
-    <dgm:cxn modelId="{5E87B0D9-22EC-4CBE-9615-9880733CC80A}" type="presOf" srcId="{FBD7E154-CFF9-4603-A93A-9AF2E8FCB4D7}" destId="{303DDAE2-27BE-4D5F-B380-2F55F54A80C0}" srcOrd="0" destOrd="0" presId="urn:microsoft.com/office/officeart/2005/8/layout/orgChart1"/>
-    <dgm:cxn modelId="{53CA1CA2-0221-4D86-9D65-3EC480E8EE60}" type="presOf" srcId="{9077FE6A-CBB5-4A51-B3E0-8E41638AA831}" destId="{94382F0D-8693-42D1-A624-AEE4D694E906}" srcOrd="1" destOrd="0" presId="urn:microsoft.com/office/officeart/2005/8/layout/orgChart1"/>
-    <dgm:cxn modelId="{33652C1B-47AC-403B-A9E6-BFE7C7637A50}" type="presOf" srcId="{E73FA78A-4C4A-46B5-A42E-587D72142E36}" destId="{BBE7B26F-7841-4591-92A4-A426F6588D0B}" srcOrd="0" destOrd="0" presId="urn:microsoft.com/office/officeart/2005/8/layout/orgChart1"/>
     <dgm:cxn modelId="{2250C770-4FEE-495D-B3E2-9C60C843ED0D}" type="presParOf" srcId="{875BAD68-6674-44BE-ABFE-7F5E3F19A10D}" destId="{51C57184-965C-4989-8185-727E92B989DB}" srcOrd="0" destOrd="0" presId="urn:microsoft.com/office/officeart/2005/8/layout/orgChart1"/>
     <dgm:cxn modelId="{15D35C25-2D54-4554-AFAB-33BD52448A7F}" type="presParOf" srcId="{51C57184-965C-4989-8185-727E92B989DB}" destId="{C6139A40-6B44-412F-8EEC-0DDD3D0436F0}" srcOrd="0" destOrd="0" presId="urn:microsoft.com/office/officeart/2005/8/layout/orgChart1"/>
     <dgm:cxn modelId="{88CD2784-0394-4DEA-9DC6-1947823E006F}" type="presParOf" srcId="{C6139A40-6B44-412F-8EEC-0DDD3D0436F0}" destId="{6E110BFA-A299-4837-B09B-5069CD9CCA46}" srcOrd="0" destOrd="0" presId="urn:microsoft.com/office/officeart/2005/8/layout/orgChart1"/>
@@ -4760,7 +4760,7 @@
       <dsp:spPr>
         <a:xfrm>
           <a:off x="3940675" y="2194475"/>
-          <a:ext cx="402237" cy="3250422"/>
+          <a:ext cx="427171" cy="2859724"/>
         </a:xfrm>
         <a:custGeom>
           <a:avLst/>
@@ -4774,10 +4774,10 @@
                 <a:pt x="0" y="0"/>
               </a:moveTo>
               <a:lnTo>
-                <a:pt x="0" y="3250422"/>
+                <a:pt x="0" y="2859724"/>
               </a:lnTo>
               <a:lnTo>
-                <a:pt x="402237" y="3250422"/>
+                <a:pt x="427171" y="2859724"/>
               </a:lnTo>
             </a:path>
           </a:pathLst>
@@ -4878,7 +4878,7 @@
       <dsp:spPr>
         <a:xfrm>
           <a:off x="3940675" y="2194475"/>
-          <a:ext cx="417041" cy="2854184"/>
+          <a:ext cx="417041" cy="3244882"/>
         </a:xfrm>
         <a:custGeom>
           <a:avLst/>
@@ -4892,10 +4892,10 @@
                 <a:pt x="0" y="0"/>
               </a:moveTo>
               <a:lnTo>
-                <a:pt x="0" y="2854184"/>
+                <a:pt x="0" y="3244882"/>
               </a:lnTo>
               <a:lnTo>
-                <a:pt x="417041" y="2854184"/>
+                <a:pt x="417041" y="3244882"/>
               </a:lnTo>
             </a:path>
           </a:pathLst>
@@ -6264,8 +6264,8 @@
       </dsp:nvSpPr>
       <dsp:spPr>
         <a:xfrm>
-          <a:off x="4357717" y="4892623"/>
-          <a:ext cx="1610445" cy="312073"/>
+          <a:off x="4357717" y="5283321"/>
+          <a:ext cx="1614901" cy="312073"/>
         </a:xfrm>
         <a:prstGeom prst="roundRect">
           <a:avLst/>
@@ -6307,12 +6307,12 @@
         </a:fontRef>
       </dsp:style>
       <dsp:txBody>
-        <a:bodyPr spcFirstLastPara="0" vert="horz" wrap="square" lIns="6350" tIns="6350" rIns="6350" bIns="6350" numCol="1" spcCol="1270" anchor="ctr" anchorCtr="0">
+        <a:bodyPr spcFirstLastPara="0" vert="horz" wrap="square" lIns="6985" tIns="6985" rIns="6985" bIns="6985" numCol="1" spcCol="1270" anchor="ctr" anchorCtr="0">
           <a:noAutofit/>
         </a:bodyPr>
         <a:lstStyle/>
         <a:p>
-          <a:pPr lvl="0" algn="ctr" defTabSz="444500">
+          <a:pPr lvl="0" algn="ctr" defTabSz="488950">
             <a:lnSpc>
               <a:spcPct val="90000"/>
             </a:lnSpc>
@@ -6324,15 +6324,15 @@
             </a:spcAft>
           </a:pPr>
           <a:r>
-            <a:rPr lang="ro-RO" sz="1000" kern="1200" dirty="0" smtClean="0"/>
+            <a:rPr lang="ro-RO" sz="1100" kern="1200" dirty="0" smtClean="0"/>
             <a:t>REGISTRATURĂ ŞI ARHIVĂ</a:t>
           </a:r>
-          <a:endParaRPr lang="en-US" sz="1000" kern="1200" dirty="0"/>
+          <a:endParaRPr lang="en-US" sz="1100" kern="1200" dirty="0"/>
         </a:p>
       </dsp:txBody>
       <dsp:txXfrm>
-        <a:off x="4372951" y="4907857"/>
-        <a:ext cx="1579977" cy="281605"/>
+        <a:off x="4372951" y="5298555"/>
+        <a:ext cx="1584433" cy="281605"/>
       </dsp:txXfrm>
     </dsp:sp>
     <dsp:sp modelId="{E847BB21-2BE7-4387-85A1-738AFFD84E75}">
@@ -6385,12 +6385,12 @@
         </a:fontRef>
       </dsp:style>
       <dsp:txBody>
-        <a:bodyPr spcFirstLastPara="0" vert="horz" wrap="square" lIns="6350" tIns="6350" rIns="6350" bIns="6350" numCol="1" spcCol="1270" anchor="ctr" anchorCtr="0">
+        <a:bodyPr spcFirstLastPara="0" vert="horz" wrap="square" lIns="6985" tIns="6985" rIns="6985" bIns="6985" numCol="1" spcCol="1270" anchor="ctr" anchorCtr="0">
           <a:noAutofit/>
         </a:bodyPr>
         <a:lstStyle/>
         <a:p>
-          <a:pPr lvl="0" algn="ctr" defTabSz="444500">
+          <a:pPr lvl="0" algn="ctr" defTabSz="488950">
             <a:lnSpc>
               <a:spcPct val="90000"/>
             </a:lnSpc>
@@ -6402,10 +6402,10 @@
             </a:spcAft>
           </a:pPr>
           <a:r>
-            <a:rPr lang="ro-RO" sz="1000" kern="1200" dirty="0" smtClean="0"/>
+            <a:rPr lang="ro-RO" sz="1100" kern="1200" dirty="0" smtClean="0"/>
             <a:t>PERSONAL CONEX</a:t>
           </a:r>
-          <a:endParaRPr lang="en-US" sz="1000" kern="1200" dirty="0"/>
+          <a:endParaRPr lang="en-US" sz="1100" kern="1200" dirty="0"/>
         </a:p>
       </dsp:txBody>
       <dsp:txXfrm>
@@ -6420,7 +6420,7 @@
       </dsp:nvSpPr>
       <dsp:spPr>
         <a:xfrm>
-          <a:off x="4342912" y="5288861"/>
+          <a:off x="4367847" y="4898163"/>
           <a:ext cx="1614383" cy="312073"/>
         </a:xfrm>
         <a:prstGeom prst="roundRect">
@@ -6463,12 +6463,12 @@
         </a:fontRef>
       </dsp:style>
       <dsp:txBody>
-        <a:bodyPr spcFirstLastPara="0" vert="horz" wrap="square" lIns="6350" tIns="6350" rIns="6350" bIns="6350" numCol="1" spcCol="1270" anchor="ctr" anchorCtr="0">
+        <a:bodyPr spcFirstLastPara="0" vert="horz" wrap="square" lIns="6985" tIns="6985" rIns="6985" bIns="6985" numCol="1" spcCol="1270" anchor="ctr" anchorCtr="0">
           <a:noAutofit/>
         </a:bodyPr>
         <a:lstStyle/>
         <a:p>
-          <a:pPr lvl="0" algn="ctr" defTabSz="444500">
+          <a:pPr lvl="0" algn="ctr" defTabSz="488950">
             <a:lnSpc>
               <a:spcPct val="90000"/>
             </a:lnSpc>
@@ -6480,18 +6480,18 @@
             </a:spcAft>
           </a:pPr>
           <a:r>
-            <a:rPr lang="en-US" sz="1000" kern="1200" dirty="0" smtClean="0"/>
+            <a:rPr lang="en-US" sz="1100" kern="1200" dirty="0" smtClean="0"/>
             <a:t>STATISTIC</a:t>
           </a:r>
           <a:r>
-            <a:rPr lang="ro-RO" sz="1000" kern="1200" dirty="0" smtClean="0"/>
+            <a:rPr lang="ro-RO" sz="1100" kern="1200" dirty="0" smtClean="0"/>
             <a:t>Ă</a:t>
           </a:r>
-          <a:endParaRPr lang="en-US" sz="1000" kern="1200" dirty="0"/>
+          <a:endParaRPr lang="en-US" sz="1100" kern="1200" dirty="0"/>
         </a:p>
       </dsp:txBody>
       <dsp:txXfrm>
-        <a:off x="4358146" y="5304095"/>
+        <a:off x="4383081" y="4913397"/>
         <a:ext cx="1583915" cy="281605"/>
       </dsp:txXfrm>
     </dsp:sp>
@@ -9691,7 +9691,7 @@
           <a:p>
             <a:fld id="{5E713CFB-EA3F-4FA9-B487-6657553D79E9}" type="datetimeFigureOut">
               <a:rPr lang="ro-RO" smtClean="0"/>
-              <a:t>27.03.2019</a:t>
+              <a:t>28.03.2019</a:t>
             </a:fld>
             <a:endParaRPr lang="ro-RO"/>
           </a:p>
@@ -9861,7 +9861,7 @@
           <a:p>
             <a:fld id="{5E713CFB-EA3F-4FA9-B487-6657553D79E9}" type="datetimeFigureOut">
               <a:rPr lang="ro-RO" smtClean="0"/>
-              <a:t>27.03.2019</a:t>
+              <a:t>28.03.2019</a:t>
             </a:fld>
             <a:endParaRPr lang="ro-RO"/>
           </a:p>
@@ -10041,7 +10041,7 @@
           <a:p>
             <a:fld id="{5E713CFB-EA3F-4FA9-B487-6657553D79E9}" type="datetimeFigureOut">
               <a:rPr lang="ro-RO" smtClean="0"/>
-              <a:t>27.03.2019</a:t>
+              <a:t>28.03.2019</a:t>
             </a:fld>
             <a:endParaRPr lang="ro-RO"/>
           </a:p>
@@ -10211,7 +10211,7 @@
           <a:p>
             <a:fld id="{5E713CFB-EA3F-4FA9-B487-6657553D79E9}" type="datetimeFigureOut">
               <a:rPr lang="ro-RO" smtClean="0"/>
-              <a:t>27.03.2019</a:t>
+              <a:t>28.03.2019</a:t>
             </a:fld>
             <a:endParaRPr lang="ro-RO"/>
           </a:p>
@@ -10457,7 +10457,7 @@
           <a:p>
             <a:fld id="{5E713CFB-EA3F-4FA9-B487-6657553D79E9}" type="datetimeFigureOut">
               <a:rPr lang="ro-RO" smtClean="0"/>
-              <a:t>27.03.2019</a:t>
+              <a:t>28.03.2019</a:t>
             </a:fld>
             <a:endParaRPr lang="ro-RO"/>
           </a:p>
@@ -10689,7 +10689,7 @@
           <a:p>
             <a:fld id="{5E713CFB-EA3F-4FA9-B487-6657553D79E9}" type="datetimeFigureOut">
               <a:rPr lang="ro-RO" smtClean="0"/>
-              <a:t>27.03.2019</a:t>
+              <a:t>28.03.2019</a:t>
             </a:fld>
             <a:endParaRPr lang="ro-RO"/>
           </a:p>
@@ -11056,7 +11056,7 @@
           <a:p>
             <a:fld id="{5E713CFB-EA3F-4FA9-B487-6657553D79E9}" type="datetimeFigureOut">
               <a:rPr lang="ro-RO" smtClean="0"/>
-              <a:t>27.03.2019</a:t>
+              <a:t>28.03.2019</a:t>
             </a:fld>
             <a:endParaRPr lang="ro-RO"/>
           </a:p>
@@ -11174,7 +11174,7 @@
           <a:p>
             <a:fld id="{5E713CFB-EA3F-4FA9-B487-6657553D79E9}" type="datetimeFigureOut">
               <a:rPr lang="ro-RO" smtClean="0"/>
-              <a:t>27.03.2019</a:t>
+              <a:t>28.03.2019</a:t>
             </a:fld>
             <a:endParaRPr lang="ro-RO"/>
           </a:p>
@@ -11269,7 +11269,7 @@
           <a:p>
             <a:fld id="{5E713CFB-EA3F-4FA9-B487-6657553D79E9}" type="datetimeFigureOut">
               <a:rPr lang="ro-RO" smtClean="0"/>
-              <a:t>27.03.2019</a:t>
+              <a:t>28.03.2019</a:t>
             </a:fld>
             <a:endParaRPr lang="ro-RO"/>
           </a:p>
@@ -11546,7 +11546,7 @@
           <a:p>
             <a:fld id="{5E713CFB-EA3F-4FA9-B487-6657553D79E9}" type="datetimeFigureOut">
               <a:rPr lang="ro-RO" smtClean="0"/>
-              <a:t>27.03.2019</a:t>
+              <a:t>28.03.2019</a:t>
             </a:fld>
             <a:endParaRPr lang="ro-RO"/>
           </a:p>
@@ -11799,7 +11799,7 @@
           <a:p>
             <a:fld id="{5E713CFB-EA3F-4FA9-B487-6657553D79E9}" type="datetimeFigureOut">
               <a:rPr lang="ro-RO" smtClean="0"/>
-              <a:t>27.03.2019</a:t>
+              <a:t>28.03.2019</a:t>
             </a:fld>
             <a:endParaRPr lang="ro-RO"/>
           </a:p>
@@ -12012,7 +12012,7 @@
           <a:p>
             <a:fld id="{5E713CFB-EA3F-4FA9-B487-6657553D79E9}" type="datetimeFigureOut">
               <a:rPr lang="ro-RO" smtClean="0"/>
-              <a:t>27.03.2019</a:t>
+              <a:t>28.03.2019</a:t>
             </a:fld>
             <a:endParaRPr lang="ro-RO"/>
           </a:p>
@@ -12435,7 +12435,7 @@
           <p:nvPr>
             <p:extLst>
               <p:ext uri="{D42A27DB-BD31-4B8C-83A1-F6EECF244321}">
-                <p14:modId xmlns:p14="http://schemas.microsoft.com/office/powerpoint/2010/main" val="3970587955"/>
+                <p14:modId xmlns:p14="http://schemas.microsoft.com/office/powerpoint/2010/main" val="560069510"/>
               </p:ext>
             </p:extLst>
           </p:nvPr>

</xml_diff>

<commit_message>
solved bugs for mobile (responsive) & pdf added
</commit_message>
<xml_diff>
--- a/Organigrama.pptx
+++ b/Organigrama.pptx
@@ -1935,7 +1935,7 @@
       </dgm:t>
     </dgm:pt>
     <dgm:pt modelId="{ADA5F25E-E5A7-4A74-ABAF-CED9575A8918}" type="pres">
-      <dgm:prSet presAssocID="{DE4100C8-9BAD-414D-A8B3-EDB25C14EF90}" presName="rootText" presStyleLbl="node2" presStyleIdx="0" presStyleCnt="7" custScaleX="272963" custScaleY="96716" custLinFactNeighborX="-787" custLinFactNeighborY="-21807">
+      <dgm:prSet presAssocID="{DE4100C8-9BAD-414D-A8B3-EDB25C14EF90}" presName="rootText" presStyleLbl="node2" presStyleIdx="0" presStyleCnt="7" custScaleX="246460" custScaleY="96716" custLinFactNeighborX="20624" custLinFactNeighborY="2169">
         <dgm:presLayoutVars>
           <dgm:chPref val="3"/>
         </dgm:presLayoutVars>
@@ -2013,7 +2013,7 @@
       </dgm:t>
     </dgm:pt>
     <dgm:pt modelId="{2C89911A-559B-4BFC-AA8C-BE3307F3F263}" type="pres">
-      <dgm:prSet presAssocID="{C132DD6E-C978-4D3A-9097-26E40C4A6B78}" presName="rootText" presStyleLbl="node3" presStyleIdx="0" presStyleCnt="5" custScaleX="222564" custScaleY="123903" custLinFactNeighborX="-16563" custLinFactNeighborY="7175">
+      <dgm:prSet presAssocID="{C132DD6E-C978-4D3A-9097-26E40C4A6B78}" presName="rootText" presStyleLbl="node3" presStyleIdx="0" presStyleCnt="5" custScaleX="222564" custScaleY="123903" custLinFactNeighborX="15306" custLinFactNeighborY="33808">
         <dgm:presLayoutVars>
           <dgm:chPref val="3"/>
         </dgm:presLayoutVars>
@@ -2102,7 +2102,7 @@
       </dgm:t>
     </dgm:pt>
     <dgm:pt modelId="{C5D44253-2C4B-4687-BE85-E35CDA49FA38}" type="pres">
-      <dgm:prSet presAssocID="{C9F7C635-5B03-445C-863A-6F6D6F55A527}" presName="rootText" presStyleLbl="node3" presStyleIdx="1" presStyleCnt="5" custScaleX="223852" custScaleY="246262" custLinFactNeighborX="-19070" custLinFactNeighborY="7783">
+      <dgm:prSet presAssocID="{C9F7C635-5B03-445C-863A-6F6D6F55A527}" presName="rootText" presStyleLbl="node3" presStyleIdx="1" presStyleCnt="5" custScaleX="223852" custScaleY="246262" custLinFactNeighborX="12799" custLinFactNeighborY="26447">
         <dgm:presLayoutVars>
           <dgm:chPref val="3"/>
         </dgm:presLayoutVars>
@@ -2188,7 +2188,7 @@
       <dgm:spPr/>
     </dgm:pt>
     <dgm:pt modelId="{7EC0BC3D-ED4D-42E6-82F2-9672178A5531}" type="pres">
-      <dgm:prSet presAssocID="{9A84B3BF-D88B-4CB3-87E8-4F100CED8C27}" presName="rootText" presStyleLbl="node2" presStyleIdx="1" presStyleCnt="7" custScaleX="336643" custLinFactX="100000" custLinFactNeighborX="186331" custLinFactNeighborY="-20977">
+      <dgm:prSet presAssocID="{9A84B3BF-D88B-4CB3-87E8-4F100CED8C27}" presName="rootText" presStyleLbl="node2" presStyleIdx="1" presStyleCnt="7" custScaleX="336643" custLinFactX="100000" custLinFactNeighborX="186331" custLinFactNeighborY="2999">
         <dgm:presLayoutVars>
           <dgm:chPref val="3"/>
         </dgm:presLayoutVars>
@@ -2259,7 +2259,7 @@
       </dgm:t>
     </dgm:pt>
     <dgm:pt modelId="{3E3AD66D-B7D7-4DCA-9EE3-EC4F50D31409}" type="pres">
-      <dgm:prSet presAssocID="{C848FE92-463D-470D-BF1D-04ADA610834C}" presName="rootText" presStyleLbl="node3" presStyleIdx="2" presStyleCnt="5" custScaleX="328032" custScaleY="102795" custLinFactX="100000" custLinFactNeighborX="186139" custLinFactNeighborY="16733">
+      <dgm:prSet presAssocID="{C848FE92-463D-470D-BF1D-04ADA610834C}" presName="rootText" presStyleLbl="node3" presStyleIdx="2" presStyleCnt="5" custScaleX="328032" custScaleY="102795" custLinFactX="100000" custLinFactNeighborX="186139" custLinFactNeighborY="40709">
         <dgm:presLayoutVars>
           <dgm:chPref val="3"/>
         </dgm:presLayoutVars>
@@ -2337,7 +2337,7 @@
       </dgm:t>
     </dgm:pt>
     <dgm:pt modelId="{DC67B31A-26AA-4189-8A22-1889CEF361A4}" type="pres">
-      <dgm:prSet presAssocID="{8B70E0AE-105B-4655-8741-CDDE780F58D5}" presName="rootText" presStyleLbl="node4" presStyleIdx="0" presStyleCnt="10" custScaleX="258437" custScaleY="246635" custLinFactX="105112" custLinFactY="200000" custLinFactNeighborX="200000" custLinFactNeighborY="201080">
+      <dgm:prSet presAssocID="{8B70E0AE-105B-4655-8741-CDDE780F58D5}" presName="rootText" presStyleLbl="node4" presStyleIdx="0" presStyleCnt="10" custScaleX="258437" custScaleY="246635" custLinFactX="105112" custLinFactY="200000" custLinFactNeighborX="200000" custLinFactNeighborY="225056">
         <dgm:presLayoutVars>
           <dgm:chPref val="3"/>
         </dgm:presLayoutVars>
@@ -2426,7 +2426,7 @@
       </dgm:t>
     </dgm:pt>
     <dgm:pt modelId="{4D8B1969-F22B-4A5B-994C-1CD8F886EC40}" type="pres">
-      <dgm:prSet presAssocID="{728F31A6-D1F3-4DEE-8A9B-9F51D17C553F}" presName="rootText" presStyleLbl="node4" presStyleIdx="1" presStyleCnt="10" custScaleX="256665" custScaleY="139416" custLinFactX="107410" custLinFactNeighborX="200000" custLinFactNeighborY="-49996">
+      <dgm:prSet presAssocID="{728F31A6-D1F3-4DEE-8A9B-9F51D17C553F}" presName="rootText" presStyleLbl="node4" presStyleIdx="1" presStyleCnt="10" custScaleX="256665" custScaleY="139416" custLinFactX="107410" custLinFactNeighborX="200000" custLinFactNeighborY="-26020">
         <dgm:presLayoutVars>
           <dgm:chPref val="3"/>
         </dgm:presLayoutVars>
@@ -2515,7 +2515,7 @@
       </dgm:t>
     </dgm:pt>
     <dgm:pt modelId="{0C714DD9-24C9-4E5B-B485-44A250CD8C35}" type="pres">
-      <dgm:prSet presAssocID="{E0AEC5A1-9217-4F7F-8CC9-B4E3DBAC8132}" presName="rootText" presStyleLbl="node4" presStyleIdx="2" presStyleCnt="10" custScaleX="256386" custScaleY="144894" custLinFactX="107550" custLinFactY="-200000" custLinFactNeighborX="200000" custLinFactNeighborY="-204253">
+      <dgm:prSet presAssocID="{E0AEC5A1-9217-4F7F-8CC9-B4E3DBAC8132}" presName="rootText" presStyleLbl="node4" presStyleIdx="2" presStyleCnt="10" custScaleX="256386" custScaleY="144894" custLinFactX="107550" custLinFactY="-180277" custLinFactNeighborX="200000" custLinFactNeighborY="-200000">
         <dgm:presLayoutVars>
           <dgm:chPref val="3"/>
         </dgm:presLayoutVars>
@@ -2604,7 +2604,7 @@
       </dgm:t>
     </dgm:pt>
     <dgm:pt modelId="{BE05C31F-DF27-417A-9B03-58F2D293754F}" type="pres">
-      <dgm:prSet presAssocID="{91038339-7E44-407D-8F41-830A9AC7139F}" presName="rootText" presStyleLbl="node4" presStyleIdx="3" presStyleCnt="10" custScaleX="255376" custScaleY="132142" custLinFactX="104909" custLinFactNeighborX="200000" custLinFactNeighborY="21828">
+      <dgm:prSet presAssocID="{91038339-7E44-407D-8F41-830A9AC7139F}" presName="rootText" presStyleLbl="node4" presStyleIdx="3" presStyleCnt="10" custScaleX="255376" custScaleY="132142" custLinFactX="104909" custLinFactNeighborX="200000" custLinFactNeighborY="45804">
         <dgm:presLayoutVars>
           <dgm:chPref val="3"/>
         </dgm:presLayoutVars>
@@ -2693,7 +2693,7 @@
       </dgm:t>
     </dgm:pt>
     <dgm:pt modelId="{1580DD9A-E07B-47E0-A6EF-9A43286CACDB}" type="pres">
-      <dgm:prSet presAssocID="{0E7DEADE-BF26-41B5-8328-486C5DB8DBAC}" presName="rootText" presStyleLbl="node4" presStyleIdx="4" presStyleCnt="10" custScaleX="258737" custLinFactX="103752" custLinFactY="33426" custLinFactNeighborX="200000" custLinFactNeighborY="100000">
+      <dgm:prSet presAssocID="{0E7DEADE-BF26-41B5-8328-486C5DB8DBAC}" presName="rootText" presStyleLbl="node4" presStyleIdx="4" presStyleCnt="10" custScaleX="258737" custLinFactX="103752" custLinFactY="57402" custLinFactNeighborX="200000" custLinFactNeighborY="100000">
         <dgm:presLayoutVars>
           <dgm:chPref val="3"/>
         </dgm:presLayoutVars>
@@ -2782,7 +2782,7 @@
       </dgm:t>
     </dgm:pt>
     <dgm:pt modelId="{E847BB21-2BE7-4387-85A1-738AFFD84E75}" type="pres">
-      <dgm:prSet presAssocID="{B5DCF512-1AB7-4CD0-9D3F-BE0581B2CB49}" presName="rootText" presStyleLbl="node4" presStyleIdx="5" presStyleCnt="10" custScaleX="256327" custLinFactX="103048" custLinFactY="17412" custLinFactNeighborX="200000" custLinFactNeighborY="100000">
+      <dgm:prSet presAssocID="{B5DCF512-1AB7-4CD0-9D3F-BE0581B2CB49}" presName="rootText" presStyleLbl="node4" presStyleIdx="5" presStyleCnt="10" custScaleX="256327" custLinFactX="103048" custLinFactY="41388" custLinFactNeighborX="200000" custLinFactNeighborY="100000">
         <dgm:presLayoutVars>
           <dgm:chPref val="3"/>
         </dgm:presLayoutVars>
@@ -2857,7 +2857,7 @@
       <dgm:spPr/>
     </dgm:pt>
     <dgm:pt modelId="{630FB1FE-1568-4E6E-A0E0-457118C98AEE}" type="pres">
-      <dgm:prSet presAssocID="{D93AFF9F-FC2A-430D-8A44-30757930CD97}" presName="rootText" presStyleLbl="node4" presStyleIdx="6" presStyleCnt="10" custScaleX="258654" custLinFactX="105375" custLinFactY="-100000" custLinFactNeighborX="200000" custLinFactNeighborY="-173993">
+      <dgm:prSet presAssocID="{D93AFF9F-FC2A-430D-8A44-30757930CD97}" presName="rootText" presStyleLbl="node4" presStyleIdx="6" presStyleCnt="10" custScaleX="258654" custLinFactX="105375" custLinFactY="-100000" custLinFactNeighborX="200000" custLinFactNeighborY="-150017">
         <dgm:presLayoutVars>
           <dgm:chPref val="3"/>
         </dgm:presLayoutVars>
@@ -2947,7 +2947,7 @@
       </dgm:t>
     </dgm:pt>
     <dgm:pt modelId="{BD9EEFF5-C9E2-40B4-8501-30865610934D}" type="pres">
-      <dgm:prSet presAssocID="{CB53A11A-061D-4AE2-AB7E-ECAB65D1D1CE}" presName="rootText" presStyleLbl="node2" presStyleIdx="2" presStyleCnt="7" custScaleX="346014" custScaleY="96220" custLinFactX="100000" custLinFactNeighborX="187836" custLinFactNeighborY="-20075">
+      <dgm:prSet presAssocID="{CB53A11A-061D-4AE2-AB7E-ECAB65D1D1CE}" presName="rootText" presStyleLbl="node2" presStyleIdx="2" presStyleCnt="7" custScaleX="346014" custScaleY="96220" custLinFactX="100000" custLinFactNeighborX="187836" custLinFactNeighborY="3901">
         <dgm:presLayoutVars>
           <dgm:chPref val="3"/>
         </dgm:presLayoutVars>
@@ -3025,7 +3025,7 @@
       </dgm:t>
     </dgm:pt>
     <dgm:pt modelId="{33A6DC25-4DEB-4F90-9E16-4D43C3569F99}" type="pres">
-      <dgm:prSet presAssocID="{6E9BC9EB-F429-40C4-AB41-3D32306E2060}" presName="rootText" presStyleLbl="node3" presStyleIdx="3" presStyleCnt="5" custScaleX="237205" custLinFactX="100000" custLinFactNeighborX="187807" custLinFactNeighborY="-29343">
+      <dgm:prSet presAssocID="{6E9BC9EB-F429-40C4-AB41-3D32306E2060}" presName="rootText" presStyleLbl="node3" presStyleIdx="3" presStyleCnt="5" custScaleX="237205" custLinFactX="100000" custLinFactNeighborX="187807" custLinFactNeighborY="7913">
         <dgm:presLayoutVars>
           <dgm:chPref val="3"/>
         </dgm:presLayoutVars>
@@ -3103,7 +3103,7 @@
       </dgm:t>
     </dgm:pt>
     <dgm:pt modelId="{C6823A04-DDB7-4314-BEFD-6A30ADD7A6C7}" type="pres">
-      <dgm:prSet presAssocID="{B7D72A91-0C7E-45B9-AACD-EB806607436E}" presName="rootText" presStyleLbl="node4" presStyleIdx="7" presStyleCnt="10" custScaleX="221042" custScaleY="111802" custLinFactX="120378" custLinFactY="66074" custLinFactNeighborX="200000" custLinFactNeighborY="100000">
+      <dgm:prSet presAssocID="{B7D72A91-0C7E-45B9-AACD-EB806607436E}" presName="rootText" presStyleLbl="node4" presStyleIdx="7" presStyleCnt="10" custScaleX="221042" custScaleY="111802" custLinFactX="120378" custLinFactY="90050" custLinFactNeighborX="200000" custLinFactNeighborY="100000">
         <dgm:presLayoutVars>
           <dgm:chPref val="3"/>
         </dgm:presLayoutVars>
@@ -3192,7 +3192,7 @@
       </dgm:t>
     </dgm:pt>
     <dgm:pt modelId="{437B21D8-99D7-4F78-A576-12278DF24217}" type="pres">
-      <dgm:prSet presAssocID="{3C33D1E7-53E9-4F48-98B0-B03D4A07F390}" presName="rootText" presStyleLbl="node4" presStyleIdx="8" presStyleCnt="10" custScaleX="223048" custScaleY="137807" custLinFactX="118100" custLinFactY="-73585" custLinFactNeighborX="200000" custLinFactNeighborY="-100000">
+      <dgm:prSet presAssocID="{3C33D1E7-53E9-4F48-98B0-B03D4A07F390}" presName="rootText" presStyleLbl="node4" presStyleIdx="8" presStyleCnt="10" custScaleX="223048" custScaleY="137807" custLinFactX="118100" custLinFactY="-49609" custLinFactNeighborX="200000" custLinFactNeighborY="-100000">
         <dgm:presLayoutVars>
           <dgm:chPref val="3"/>
         </dgm:presLayoutVars>
@@ -3281,7 +3281,7 @@
       </dgm:t>
     </dgm:pt>
     <dgm:pt modelId="{9DE9F66F-27C9-4DC2-B07D-7E6BBE00BC85}" type="pres">
-      <dgm:prSet presAssocID="{2B8D4C78-FF64-4ACF-93A1-FF2950411183}" presName="rootText" presStyleLbl="node4" presStyleIdx="9" presStyleCnt="10" custScaleX="218504" custScaleY="121116" custLinFactX="120065" custLinFactNeighborX="200000" custLinFactNeighborY="-17305">
+      <dgm:prSet presAssocID="{2B8D4C78-FF64-4ACF-93A1-FF2950411183}" presName="rootText" presStyleLbl="node4" presStyleIdx="9" presStyleCnt="10" custScaleX="218504" custScaleY="121116" custLinFactX="120065" custLinFactNeighborX="200000" custLinFactNeighborY="-1321">
         <dgm:presLayoutVars>
           <dgm:chPref val="3"/>
         </dgm:presLayoutVars>
@@ -3392,7 +3392,7 @@
       </dgm:t>
     </dgm:pt>
     <dgm:pt modelId="{BBE7B26F-7841-4591-92A4-A426F6588D0B}" type="pres">
-      <dgm:prSet presAssocID="{E73FA78A-4C4A-46B5-A42E-587D72142E36}" presName="rootText" presStyleLbl="node2" presStyleIdx="3" presStyleCnt="7" custScaleX="207336" custScaleY="212903" custLinFactX="100000" custLinFactNeighborX="182827" custLinFactNeighborY="-19542">
+      <dgm:prSet presAssocID="{E73FA78A-4C4A-46B5-A42E-587D72142E36}" presName="rootText" presStyleLbl="node2" presStyleIdx="3" presStyleCnt="7" custScaleX="207336" custScaleY="212903" custLinFactX="100000" custLinFactNeighborX="182827" custLinFactNeighborY="4434">
         <dgm:presLayoutVars>
           <dgm:chPref val="3"/>
         </dgm:presLayoutVars>
@@ -3481,7 +3481,7 @@
       </dgm:t>
     </dgm:pt>
     <dgm:pt modelId="{492BA640-7185-47A4-9297-C5663E3E3248}" type="pres">
-      <dgm:prSet presAssocID="{B21F075C-07CF-4E94-8A08-FCC582F20775}" presName="rootText" presStyleLbl="node2" presStyleIdx="4" presStyleCnt="7" custScaleX="185822" custScaleY="222887" custLinFactX="100000" custLinFactNeighborX="179228" custLinFactNeighborY="-21532">
+      <dgm:prSet presAssocID="{B21F075C-07CF-4E94-8A08-FCC582F20775}" presName="rootText" presStyleLbl="node2" presStyleIdx="4" presStyleCnt="7" custScaleX="185822" custScaleY="222887" custLinFactX="100000" custLinFactNeighborX="179228" custLinFactNeighborY="2444">
         <dgm:presLayoutVars>
           <dgm:chPref val="3"/>
         </dgm:presLayoutVars>
@@ -3570,7 +3570,7 @@
       </dgm:t>
     </dgm:pt>
     <dgm:pt modelId="{EE1CF7FD-FFFB-48A0-BAE1-DA9FC25CBA32}" type="pres">
-      <dgm:prSet presAssocID="{72BEADBA-7002-4022-8823-1A071831A857}" presName="rootText" presStyleLbl="node2" presStyleIdx="5" presStyleCnt="7" custScaleX="180379" custScaleY="224092" custLinFactX="100000" custLinFactNeighborX="180018" custLinFactNeighborY="-22508">
+      <dgm:prSet presAssocID="{72BEADBA-7002-4022-8823-1A071831A857}" presName="rootText" presStyleLbl="node2" presStyleIdx="5" presStyleCnt="7" custScaleX="180379" custScaleY="224092" custLinFactX="100000" custLinFactNeighborX="180018" custLinFactNeighborY="1468">
         <dgm:presLayoutVars>
           <dgm:chPref val="3"/>
         </dgm:presLayoutVars>
@@ -3659,7 +3659,7 @@
       </dgm:t>
     </dgm:pt>
     <dgm:pt modelId="{3369F1D2-F051-43DD-9F81-DCE1DB8DD909}" type="pres">
-      <dgm:prSet presAssocID="{1F78CE57-8592-4FB8-B04D-E8D3187B18EE}" presName="rootText" presStyleLbl="node2" presStyleIdx="6" presStyleCnt="7" custScaleX="283446" custLinFactX="-674405" custLinFactNeighborX="-700000" custLinFactNeighborY="-21212">
+      <dgm:prSet presAssocID="{1F78CE57-8592-4FB8-B04D-E8D3187B18EE}" presName="rootText" presStyleLbl="node2" presStyleIdx="6" presStyleCnt="7" custScaleX="283446" custLinFactX="-674405" custLinFactNeighborX="-700000" custLinFactNeighborY="2764">
         <dgm:presLayoutVars>
           <dgm:chPref val="3"/>
         </dgm:presLayoutVars>
@@ -3737,7 +3737,7 @@
       </dgm:t>
     </dgm:pt>
     <dgm:pt modelId="{D382AD5D-81AD-4AC6-9E59-F29201543338}" type="pres">
-      <dgm:prSet presAssocID="{BD80EE29-4101-461C-A2FA-251FF3AE40F5}" presName="rootText" presStyleLbl="node3" presStyleIdx="4" presStyleCnt="5" custAng="10800000" custFlipVert="1" custScaleX="200613" custScaleY="121521" custLinFactX="-676859" custLinFactNeighborX="-700000" custLinFactNeighborY="5644">
+      <dgm:prSet presAssocID="{BD80EE29-4101-461C-A2FA-251FF3AE40F5}" presName="rootText" presStyleLbl="node3" presStyleIdx="4" presStyleCnt="5" custAng="10800000" custFlipVert="1" custScaleX="200613" custScaleY="121521" custLinFactX="-676859" custLinFactNeighborX="-700000" custLinFactNeighborY="29620">
         <dgm:presLayoutVars>
           <dgm:chPref val="3"/>
         </dgm:presLayoutVars>
@@ -3862,101 +3862,101 @@
     </dgm:pt>
   </dgm:ptLst>
   <dgm:cxnLst>
-    <dgm:cxn modelId="{0523E2FD-5CB6-4D0E-BC62-A67E313B3C02}" srcId="{DE4100C8-9BAD-414D-A8B3-EDB25C14EF90}" destId="{C132DD6E-C978-4D3A-9097-26E40C4A6B78}" srcOrd="0" destOrd="0" parTransId="{F768A012-F9CB-4338-A1C1-8C46044C9B84}" sibTransId="{73E6FDFD-DADE-4F4C-92D2-2EB726E48812}"/>
-    <dgm:cxn modelId="{6C392A1A-CF21-46BB-A922-B55CC4623054}" srcId="{C848FE92-463D-470D-BF1D-04ADA610834C}" destId="{0E7DEADE-BF26-41B5-8328-486C5DB8DBAC}" srcOrd="4" destOrd="0" parTransId="{893C8D60-FD51-4D36-BC40-F19AEA909325}" sibTransId="{38AFF0BB-C988-42A7-AEBC-6A5DB48BA721}"/>
-    <dgm:cxn modelId="{CBD3D9F6-B59B-4753-9F61-B7F2ECDCAB28}" srcId="{70387467-9469-4206-8E37-05F43AA08A2A}" destId="{CB53A11A-061D-4AE2-AB7E-ECAB65D1D1CE}" srcOrd="2" destOrd="0" parTransId="{69CDE423-D26D-40D6-8B92-2731C1D24B3F}" sibTransId="{F7B10986-3D3A-4585-99A3-FA4F25E72B9B}"/>
-    <dgm:cxn modelId="{D170A647-CD3D-4F37-851B-F78BE25ED540}" srcId="{6E9BC9EB-F429-40C4-AB41-3D32306E2060}" destId="{3C33D1E7-53E9-4F48-98B0-B03D4A07F390}" srcOrd="1" destOrd="0" parTransId="{3CE2639D-3C61-4B69-9A41-4E26F68EA67D}" sibTransId="{6202B589-853A-4664-BD08-47800EEA9A98}"/>
-    <dgm:cxn modelId="{A3205A72-8961-4674-9717-1EB8F0CC3325}" type="presOf" srcId="{C132DD6E-C978-4D3A-9097-26E40C4A6B78}" destId="{2C89911A-559B-4BFC-AA8C-BE3307F3F263}" srcOrd="0" destOrd="0" presId="urn:microsoft.com/office/officeart/2005/8/layout/orgChart1"/>
-    <dgm:cxn modelId="{F789A21E-7345-434F-9855-4F846D629779}" type="presOf" srcId="{69CDE423-D26D-40D6-8B92-2731C1D24B3F}" destId="{46BABAA7-E001-43D5-90DC-992E4068B713}" srcOrd="0" destOrd="0" presId="urn:microsoft.com/office/officeart/2005/8/layout/orgChart1"/>
-    <dgm:cxn modelId="{037E7708-389F-4734-B628-C72D4596C1AB}" srcId="{70387467-9469-4206-8E37-05F43AA08A2A}" destId="{72BEADBA-7002-4022-8823-1A071831A857}" srcOrd="5" destOrd="0" parTransId="{62C8414F-66B2-4760-BFF0-3DCCD5379EBF}" sibTransId="{51D0C412-15D0-48FC-84A2-48027B2EC0B4}"/>
-    <dgm:cxn modelId="{83A16CE3-884F-4928-8713-D168EE69381F}" type="presOf" srcId="{CB53A11A-061D-4AE2-AB7E-ECAB65D1D1CE}" destId="{BD9EEFF5-C9E2-40B4-8501-30865610934D}" srcOrd="0" destOrd="0" presId="urn:microsoft.com/office/officeart/2005/8/layout/orgChart1"/>
-    <dgm:cxn modelId="{42C997C6-BDE0-4F8B-9776-2E54207F752B}" type="presOf" srcId="{70387467-9469-4206-8E37-05F43AA08A2A}" destId="{6E110BFA-A299-4837-B09B-5069CD9CCA46}" srcOrd="0" destOrd="0" presId="urn:microsoft.com/office/officeart/2005/8/layout/orgChart1"/>
-    <dgm:cxn modelId="{929339D4-3643-4749-9647-C96129F1528B}" srcId="{402F2858-01CB-44CE-82CD-EE007210A1B1}" destId="{9077FE6A-CBB5-4A51-B3E0-8E41638AA831}" srcOrd="1" destOrd="0" parTransId="{25C53C84-C4D2-4EF6-9FE0-7BF969088FD8}" sibTransId="{EBF2BF22-245F-4F16-8BA3-6D89D3767B2F}"/>
-    <dgm:cxn modelId="{D1ED6821-D146-474D-B5EE-F3A71D6139DF}" srcId="{70387467-9469-4206-8E37-05F43AA08A2A}" destId="{9A84B3BF-D88B-4CB3-87E8-4F100CED8C27}" srcOrd="1" destOrd="0" parTransId="{A2AF496C-1D11-4C11-8E9E-17B961189C21}" sibTransId="{D8811D41-1520-4122-98DC-EE57AA63D4CF}"/>
-    <dgm:cxn modelId="{2D48A147-7839-4E10-A652-DF9BBEDA9723}" type="presOf" srcId="{6E9BC9EB-F429-40C4-AB41-3D32306E2060}" destId="{33A6DC25-4DEB-4F90-9E16-4D43C3569F99}" srcOrd="0" destOrd="0" presId="urn:microsoft.com/office/officeart/2005/8/layout/orgChart1"/>
-    <dgm:cxn modelId="{476AD122-5591-4B06-8A12-00925D3B35E9}" type="presOf" srcId="{62C8414F-66B2-4760-BFF0-3DCCD5379EBF}" destId="{ADC84BD5-BDA2-44D3-944A-23429540931E}" srcOrd="0" destOrd="0" presId="urn:microsoft.com/office/officeart/2005/8/layout/orgChart1"/>
-    <dgm:cxn modelId="{FE2F87C8-FF5E-47A4-B5F7-446B3BC7082A}" type="presOf" srcId="{F768A012-F9CB-4338-A1C1-8C46044C9B84}" destId="{62FDE803-F9E5-4655-A48A-92A3CF0C5573}" srcOrd="0" destOrd="0" presId="urn:microsoft.com/office/officeart/2005/8/layout/orgChart1"/>
-    <dgm:cxn modelId="{92104E9D-79E3-4F11-954D-295409B46501}" type="presOf" srcId="{3C33D1E7-53E9-4F48-98B0-B03D4A07F390}" destId="{437B21D8-99D7-4F78-A576-12278DF24217}" srcOrd="0" destOrd="0" presId="urn:microsoft.com/office/officeart/2005/8/layout/orgChart1"/>
     <dgm:cxn modelId="{607ABE7A-3AD0-4820-AE99-D30BC60A1394}" srcId="{9A84B3BF-D88B-4CB3-87E8-4F100CED8C27}" destId="{C848FE92-463D-470D-BF1D-04ADA610834C}" srcOrd="0" destOrd="0" parTransId="{FBD7E154-CFF9-4603-A93A-9AF2E8FCB4D7}" sibTransId="{14403D98-486F-47C3-9D1D-F8E96591E736}"/>
-    <dgm:cxn modelId="{C3DA0AE2-484C-41D8-BD16-7DA6C5288FB5}" type="presOf" srcId="{EDD26731-FE0D-4507-B02B-DFC75EEB244D}" destId="{D46E7BEF-C70C-4317-9836-5C7ACC38E3B3}" srcOrd="0" destOrd="0" presId="urn:microsoft.com/office/officeart/2005/8/layout/orgChart1"/>
-    <dgm:cxn modelId="{7B404FC7-0AA0-4B53-B1FA-53D12F6ADBF8}" srcId="{70387467-9469-4206-8E37-05F43AA08A2A}" destId="{DE4100C8-9BAD-414D-A8B3-EDB25C14EF90}" srcOrd="0" destOrd="0" parTransId="{07765CC6-0379-4A19-BB7B-26FA6EAF4C4E}" sibTransId="{36AA1A18-9698-4EB4-8451-D1C33571304D}"/>
-    <dgm:cxn modelId="{A715B411-2011-4EEE-B0ED-04BF6F6C4686}" type="presOf" srcId="{C132DD6E-C978-4D3A-9097-26E40C4A6B78}" destId="{3CD86AF3-F89E-4AEF-8B8D-C6C7982A19EB}" srcOrd="1" destOrd="0" presId="urn:microsoft.com/office/officeart/2005/8/layout/orgChart1"/>
-    <dgm:cxn modelId="{F1BB52F8-5A8B-45FB-BA33-3F1A59AC412B}" type="presOf" srcId="{8B70E0AE-105B-4655-8741-CDDE780F58D5}" destId="{FF723FAF-5914-42C7-AA55-7E21550CA385}" srcOrd="1" destOrd="0" presId="urn:microsoft.com/office/officeart/2005/8/layout/orgChart1"/>
-    <dgm:cxn modelId="{22B76D12-1A31-4821-B7E4-D7DA47E648A7}" type="presOf" srcId="{C9FCDA05-6AE7-4E3F-9782-92E7E3A0D1AE}" destId="{41268A2F-036D-4181-AA5A-D468DAC79392}" srcOrd="0" destOrd="0" presId="urn:microsoft.com/office/officeart/2005/8/layout/orgChart1"/>
-    <dgm:cxn modelId="{E00B8292-CE09-490B-BE89-C729C0FD196E}" type="presOf" srcId="{2B8D4C78-FF64-4ACF-93A1-FF2950411183}" destId="{1B173EF7-3CA3-427A-8727-A659BF3D3B97}" srcOrd="1" destOrd="0" presId="urn:microsoft.com/office/officeart/2005/8/layout/orgChart1"/>
-    <dgm:cxn modelId="{520A1B6E-D2A6-4CA7-8301-483829FA4B62}" type="presOf" srcId="{00BBE172-4AAC-46CF-BB0B-819CB810D615}" destId="{7A4A29C7-243B-425C-A348-CF9373CBF90A}" srcOrd="0" destOrd="0" presId="urn:microsoft.com/office/officeart/2005/8/layout/orgChart1"/>
-    <dgm:cxn modelId="{DAB2DEE9-1BA5-4FDB-8CC3-9425A2F4AD4E}" type="presOf" srcId="{70387467-9469-4206-8E37-05F43AA08A2A}" destId="{1E93D8A4-024A-4C20-83A6-DD56653D372A}" srcOrd="1" destOrd="0" presId="urn:microsoft.com/office/officeart/2005/8/layout/orgChart1"/>
-    <dgm:cxn modelId="{FD0938AB-F41C-4599-A595-BEB375C67F50}" type="presOf" srcId="{DE4100C8-9BAD-414D-A8B3-EDB25C14EF90}" destId="{49318898-FFE0-48FC-88B6-BA0FD1394A43}" srcOrd="1" destOrd="0" presId="urn:microsoft.com/office/officeart/2005/8/layout/orgChart1"/>
-    <dgm:cxn modelId="{D646FC28-3FE9-4844-A3AA-7AB80C399B5E}" type="presOf" srcId="{8B70E0AE-105B-4655-8741-CDDE780F58D5}" destId="{DC67B31A-26AA-4189-8A22-1889CEF361A4}" srcOrd="0" destOrd="0" presId="urn:microsoft.com/office/officeart/2005/8/layout/orgChart1"/>
-    <dgm:cxn modelId="{8B7D28C2-5C5E-4211-8C7B-49214A1D64B2}" type="presOf" srcId="{6EFD63C3-BBE7-44E5-A3D6-9B50F167D8B9}" destId="{A444900E-0076-4B1A-BC17-B35A2ECF1F33}" srcOrd="0" destOrd="0" presId="urn:microsoft.com/office/officeart/2005/8/layout/orgChart1"/>
-    <dgm:cxn modelId="{3EBDEAA3-B9C6-498F-9BE4-6896490179C0}" type="presOf" srcId="{D93AFF9F-FC2A-430D-8A44-30757930CD97}" destId="{630FB1FE-1568-4E6E-A0E0-457118C98AEE}" srcOrd="0" destOrd="0" presId="urn:microsoft.com/office/officeart/2005/8/layout/orgChart1"/>
+    <dgm:cxn modelId="{287C2523-3180-46B4-902A-DB2BC33EAD0B}" type="presOf" srcId="{B7D72A91-0C7E-45B9-AACD-EB806607436E}" destId="{4F856AE7-E9CC-4459-AEC8-68DE9E4C0E2F}" srcOrd="1" destOrd="0" presId="urn:microsoft.com/office/officeart/2005/8/layout/orgChart1"/>
     <dgm:cxn modelId="{DCF312B8-3E45-47C3-998D-FAE87B6C3AC4}" type="presOf" srcId="{871DF954-769D-4F88-86E9-4C8BBCEB4AED}" destId="{09585F77-2F31-4773-A1F2-D353731963BB}" srcOrd="0" destOrd="0" presId="urn:microsoft.com/office/officeart/2005/8/layout/orgChart1"/>
     <dgm:cxn modelId="{FF9327A2-8500-4EAF-B586-A8A9E925C2E5}" srcId="{6E9BC9EB-F429-40C4-AB41-3D32306E2060}" destId="{B7D72A91-0C7E-45B9-AACD-EB806607436E}" srcOrd="0" destOrd="0" parTransId="{6EFD63C3-BBE7-44E5-A3D6-9B50F167D8B9}" sibTransId="{E94A0D4E-0BF9-46CB-BF1A-956EA19FF862}"/>
+    <dgm:cxn modelId="{01CE2FC8-FFF8-41C8-A513-54830B6B31F0}" type="presOf" srcId="{4AFCAEF2-5B21-4364-AF0D-421C27B6CA7C}" destId="{9949C934-C42B-450B-803C-7B8003F40FB8}" srcOrd="0" destOrd="0" presId="urn:microsoft.com/office/officeart/2005/8/layout/orgChart1"/>
+    <dgm:cxn modelId="{FE8707F5-365A-42E1-884F-EED4EBDB86EC}" type="presOf" srcId="{D8835952-A557-4A2A-9CE9-592B61ACC653}" destId="{F64743E4-6F4F-4ACD-9A9E-383DC668EF91}" srcOrd="0" destOrd="0" presId="urn:microsoft.com/office/officeart/2005/8/layout/orgChart1"/>
+    <dgm:cxn modelId="{FE2F87C8-FF5E-47A4-B5F7-446B3BC7082A}" type="presOf" srcId="{F768A012-F9CB-4338-A1C1-8C46044C9B84}" destId="{62FDE803-F9E5-4655-A48A-92A3CF0C5573}" srcOrd="0" destOrd="0" presId="urn:microsoft.com/office/officeart/2005/8/layout/orgChart1"/>
+    <dgm:cxn modelId="{8E3C4AA8-5518-4F10-928C-A2CD41D31302}" srcId="{1F78CE57-8592-4FB8-B04D-E8D3187B18EE}" destId="{BD80EE29-4101-461C-A2FA-251FF3AE40F5}" srcOrd="0" destOrd="0" parTransId="{85871013-2EE5-4C5F-9A07-B950065F6046}" sibTransId="{C35126B6-3E49-4C7A-A7B7-4B52DC261818}"/>
+    <dgm:cxn modelId="{EBD5B7B4-FED5-4CE9-9F89-938630DE627D}" type="presOf" srcId="{1F78CE57-8592-4FB8-B04D-E8D3187B18EE}" destId="{3369F1D2-F051-43DD-9F81-DCE1DB8DD909}" srcOrd="0" destOrd="0" presId="urn:microsoft.com/office/officeart/2005/8/layout/orgChart1"/>
+    <dgm:cxn modelId="{40243BB7-1CC6-4EC0-9E75-466D62E11041}" srcId="{C848FE92-463D-470D-BF1D-04ADA610834C}" destId="{D93AFF9F-FC2A-430D-8A44-30757930CD97}" srcOrd="6" destOrd="0" parTransId="{C9FCDA05-6AE7-4E3F-9782-92E7E3A0D1AE}" sibTransId="{E19D99CE-5663-49EC-BC54-63AA0B502EB2}"/>
+    <dgm:cxn modelId="{F789A21E-7345-434F-9855-4F846D629779}" type="presOf" srcId="{69CDE423-D26D-40D6-8B92-2731C1D24B3F}" destId="{46BABAA7-E001-43D5-90DC-992E4068B713}" srcOrd="0" destOrd="0" presId="urn:microsoft.com/office/officeart/2005/8/layout/orgChart1"/>
+    <dgm:cxn modelId="{D170A647-CD3D-4F37-851B-F78BE25ED540}" srcId="{6E9BC9EB-F429-40C4-AB41-3D32306E2060}" destId="{3C33D1E7-53E9-4F48-98B0-B03D4A07F390}" srcOrd="1" destOrd="0" parTransId="{3CE2639D-3C61-4B69-9A41-4E26F68EA67D}" sibTransId="{6202B589-853A-4664-BD08-47800EEA9A98}"/>
+    <dgm:cxn modelId="{C8D8E5F3-2910-4FA4-B99D-E0056DDEB9D0}" type="presOf" srcId="{E0AEC5A1-9217-4F7F-8CC9-B4E3DBAC8132}" destId="{4D4D5C94-49C5-4B67-BEF3-8F860D410F15}" srcOrd="1" destOrd="0" presId="urn:microsoft.com/office/officeart/2005/8/layout/orgChart1"/>
+    <dgm:cxn modelId="{9B1EB5DA-6FD3-4009-A71B-56F0453E7B21}" type="presOf" srcId="{6E9BC9EB-F429-40C4-AB41-3D32306E2060}" destId="{92C165B2-BEB5-4F74-94EE-FD279DB49152}" srcOrd="1" destOrd="0" presId="urn:microsoft.com/office/officeart/2005/8/layout/orgChart1"/>
+    <dgm:cxn modelId="{E146CBC5-D5FF-4063-82CB-467E195EC35C}" type="presOf" srcId="{3C33D1E7-53E9-4F48-98B0-B03D4A07F390}" destId="{2FDD7524-38F6-46AD-8AD8-E54C9C8D0A58}" srcOrd="1" destOrd="0" presId="urn:microsoft.com/office/officeart/2005/8/layout/orgChart1"/>
+    <dgm:cxn modelId="{A3205A72-8961-4674-9717-1EB8F0CC3325}" type="presOf" srcId="{C132DD6E-C978-4D3A-9097-26E40C4A6B78}" destId="{2C89911A-559B-4BFC-AA8C-BE3307F3F263}" srcOrd="0" destOrd="0" presId="urn:microsoft.com/office/officeart/2005/8/layout/orgChart1"/>
+    <dgm:cxn modelId="{2573F99B-1F5A-43A2-AF78-B9D3BF0668EF}" type="presOf" srcId="{3CE2639D-3C61-4B69-9A41-4E26F68EA67D}" destId="{315673BE-5240-4669-A35C-00CBBABDF50A}" srcOrd="0" destOrd="0" presId="urn:microsoft.com/office/officeart/2005/8/layout/orgChart1"/>
+    <dgm:cxn modelId="{9B920F71-206A-47E5-B26E-08ED36D82881}" srcId="{6E9BC9EB-F429-40C4-AB41-3D32306E2060}" destId="{2B8D4C78-FF64-4ACF-93A1-FF2950411183}" srcOrd="2" destOrd="0" parTransId="{00BBE172-4AAC-46CF-BB0B-819CB810D615}" sibTransId="{944FCFB1-9D54-42A8-BFE0-62D818A4C5F7}"/>
+    <dgm:cxn modelId="{476AD122-5591-4B06-8A12-00925D3B35E9}" type="presOf" srcId="{62C8414F-66B2-4760-BFF0-3DCCD5379EBF}" destId="{ADC84BD5-BDA2-44D3-944A-23429540931E}" srcOrd="0" destOrd="0" presId="urn:microsoft.com/office/officeart/2005/8/layout/orgChart1"/>
+    <dgm:cxn modelId="{BD8D81D1-9F24-483E-9785-174EE0FDF760}" type="presOf" srcId="{E73FA78A-4C4A-46B5-A42E-587D72142E36}" destId="{A38C7A00-0F57-448B-B395-46EC701BA310}" srcOrd="1" destOrd="0" presId="urn:microsoft.com/office/officeart/2005/8/layout/orgChart1"/>
+    <dgm:cxn modelId="{FD0938AB-F41C-4599-A595-BEB375C67F50}" type="presOf" srcId="{DE4100C8-9BAD-414D-A8B3-EDB25C14EF90}" destId="{49318898-FFE0-48FC-88B6-BA0FD1394A43}" srcOrd="1" destOrd="0" presId="urn:microsoft.com/office/officeart/2005/8/layout/orgChart1"/>
+    <dgm:cxn modelId="{08008EAA-C5B4-4AE5-8CA6-F8DFF640F8F8}" srcId="{C848FE92-463D-470D-BF1D-04ADA610834C}" destId="{728F31A6-D1F3-4DEE-8A9B-9F51D17C553F}" srcOrd="1" destOrd="0" parTransId="{9BDADB4E-6332-43C2-9DF5-DFD2D48F4CC3}" sibTransId="{EC1A9083-FCD5-48A2-9551-579AFC9D1C20}"/>
+    <dgm:cxn modelId="{3F3BFF5D-3F9F-4D37-BE90-F07D83626B0C}" type="presOf" srcId="{C9F7C635-5B03-445C-863A-6F6D6F55A527}" destId="{C5D44253-2C4B-4687-BE85-E35CDA49FA38}" srcOrd="0" destOrd="0" presId="urn:microsoft.com/office/officeart/2005/8/layout/orgChart1"/>
+    <dgm:cxn modelId="{29890899-3C1B-4C10-86C4-DE1194BC923C}" type="presOf" srcId="{C9F7C635-5B03-445C-863A-6F6D6F55A527}" destId="{A24B6A51-1C15-4708-80C5-06E8A2353F31}" srcOrd="1" destOrd="0" presId="urn:microsoft.com/office/officeart/2005/8/layout/orgChart1"/>
+    <dgm:cxn modelId="{92104E9D-79E3-4F11-954D-295409B46501}" type="presOf" srcId="{3C33D1E7-53E9-4F48-98B0-B03D4A07F390}" destId="{437B21D8-99D7-4F78-A576-12278DF24217}" srcOrd="0" destOrd="0" presId="urn:microsoft.com/office/officeart/2005/8/layout/orgChart1"/>
+    <dgm:cxn modelId="{2C0CD4D4-B048-4D76-B6CE-FF03D081B514}" type="presOf" srcId="{CB53A11A-061D-4AE2-AB7E-ECAB65D1D1CE}" destId="{C170A22D-0CFC-41E3-BFF2-C8043C638EF7}" srcOrd="1" destOrd="0" presId="urn:microsoft.com/office/officeart/2005/8/layout/orgChart1"/>
+    <dgm:cxn modelId="{2CE3F964-0644-44DA-AD07-FB7D4ACC3F78}" type="presOf" srcId="{893C8D60-FD51-4D36-BC40-F19AEA909325}" destId="{C003FAF0-1647-4685-8444-5FC3D138E987}" srcOrd="0" destOrd="0" presId="urn:microsoft.com/office/officeart/2005/8/layout/orgChart1"/>
+    <dgm:cxn modelId="{F1BB52F8-5A8B-45FB-BA33-3F1A59AC412B}" type="presOf" srcId="{8B70E0AE-105B-4655-8741-CDDE780F58D5}" destId="{FF723FAF-5914-42C7-AA55-7E21550CA385}" srcOrd="1" destOrd="0" presId="urn:microsoft.com/office/officeart/2005/8/layout/orgChart1"/>
+    <dgm:cxn modelId="{83A16CE3-884F-4928-8713-D168EE69381F}" type="presOf" srcId="{CB53A11A-061D-4AE2-AB7E-ECAB65D1D1CE}" destId="{BD9EEFF5-C9E2-40B4-8501-30865610934D}" srcOrd="0" destOrd="0" presId="urn:microsoft.com/office/officeart/2005/8/layout/orgChart1"/>
+    <dgm:cxn modelId="{3E072829-EF6D-4033-8CF5-946D5CD87870}" type="presOf" srcId="{9A84B3BF-D88B-4CB3-87E8-4F100CED8C27}" destId="{8A4A9DD9-10DC-48FF-9EA8-06219AA420AE}" srcOrd="1" destOrd="0" presId="urn:microsoft.com/office/officeart/2005/8/layout/orgChart1"/>
+    <dgm:cxn modelId="{347A065A-E365-486E-8254-A65AEFF58C57}" type="presOf" srcId="{D93AFF9F-FC2A-430D-8A44-30757930CD97}" destId="{0A47EE92-B9C5-4742-9497-60986CBC5621}" srcOrd="1" destOrd="0" presId="urn:microsoft.com/office/officeart/2005/8/layout/orgChart1"/>
+    <dgm:cxn modelId="{9C4FE5F9-3C93-499E-BA2F-350329153EF0}" type="presOf" srcId="{A2AF496C-1D11-4C11-8E9E-17B961189C21}" destId="{F69D23B4-AFE8-409C-83FF-061A8ECAD086}" srcOrd="0" destOrd="0" presId="urn:microsoft.com/office/officeart/2005/8/layout/orgChart1"/>
+    <dgm:cxn modelId="{3C074AC2-EC28-4971-B743-99AD9662F1F0}" type="presOf" srcId="{72BEADBA-7002-4022-8823-1A071831A857}" destId="{EE1CF7FD-FFFB-48A0-BAE1-DA9FC25CBA32}" srcOrd="0" destOrd="0" presId="urn:microsoft.com/office/officeart/2005/8/layout/orgChart1"/>
+    <dgm:cxn modelId="{0523E2FD-5CB6-4D0E-BC62-A67E313B3C02}" srcId="{DE4100C8-9BAD-414D-A8B3-EDB25C14EF90}" destId="{C132DD6E-C978-4D3A-9097-26E40C4A6B78}" srcOrd="0" destOrd="0" parTransId="{F768A012-F9CB-4338-A1C1-8C46044C9B84}" sibTransId="{73E6FDFD-DADE-4F4C-92D2-2EB726E48812}"/>
+    <dgm:cxn modelId="{E00B8292-CE09-490B-BE89-C729C0FD196E}" type="presOf" srcId="{2B8D4C78-FF64-4ACF-93A1-FF2950411183}" destId="{1B173EF7-3CA3-427A-8727-A659BF3D3B97}" srcOrd="1" destOrd="0" presId="urn:microsoft.com/office/officeart/2005/8/layout/orgChart1"/>
+    <dgm:cxn modelId="{07893050-6BEF-4D16-9B7F-68801196BBD1}" type="presOf" srcId="{85871013-2EE5-4C5F-9A07-B950065F6046}" destId="{0D692004-6B64-409A-B340-6A8BEBCD083F}" srcOrd="0" destOrd="0" presId="urn:microsoft.com/office/officeart/2005/8/layout/orgChart1"/>
+    <dgm:cxn modelId="{1F6FA51C-0A64-4B40-8086-86B0ADF79D57}" type="presOf" srcId="{91038339-7E44-407D-8F41-830A9AC7139F}" destId="{BE05C31F-DF27-417A-9B03-58F2D293754F}" srcOrd="0" destOrd="0" presId="urn:microsoft.com/office/officeart/2005/8/layout/orgChart1"/>
+    <dgm:cxn modelId="{F62F681E-E9DA-45D9-BF6C-03FD4683270B}" type="presOf" srcId="{0E7DEADE-BF26-41B5-8328-486C5DB8DBAC}" destId="{1580DD9A-E07B-47E0-A6EF-9A43286CACDB}" srcOrd="0" destOrd="0" presId="urn:microsoft.com/office/officeart/2005/8/layout/orgChart1"/>
+    <dgm:cxn modelId="{520A1B6E-D2A6-4CA7-8301-483829FA4B62}" type="presOf" srcId="{00BBE172-4AAC-46CF-BB0B-819CB810D615}" destId="{7A4A29C7-243B-425C-A348-CF9373CBF90A}" srcOrd="0" destOrd="0" presId="urn:microsoft.com/office/officeart/2005/8/layout/orgChart1"/>
+    <dgm:cxn modelId="{A715B411-2011-4EEE-B0ED-04BF6F6C4686}" type="presOf" srcId="{C132DD6E-C978-4D3A-9097-26E40C4A6B78}" destId="{3CD86AF3-F89E-4AEF-8B8D-C6C7982A19EB}" srcOrd="1" destOrd="0" presId="urn:microsoft.com/office/officeart/2005/8/layout/orgChart1"/>
+    <dgm:cxn modelId="{D1ED6821-D146-474D-B5EE-F3A71D6139DF}" srcId="{70387467-9469-4206-8E37-05F43AA08A2A}" destId="{9A84B3BF-D88B-4CB3-87E8-4F100CED8C27}" srcOrd="1" destOrd="0" parTransId="{A2AF496C-1D11-4C11-8E9E-17B961189C21}" sibTransId="{D8811D41-1520-4122-98DC-EE57AA63D4CF}"/>
+    <dgm:cxn modelId="{45CDC0A3-334E-4BE4-9510-4198E2F81354}" type="presOf" srcId="{9077FE6A-CBB5-4A51-B3E0-8E41638AA831}" destId="{E48E1750-FD00-46D8-B773-5B48261A443A}" srcOrd="0" destOrd="0" presId="urn:microsoft.com/office/officeart/2005/8/layout/orgChart1"/>
+    <dgm:cxn modelId="{22B76D12-1A31-4821-B7E4-D7DA47E648A7}" type="presOf" srcId="{C9FCDA05-6AE7-4E3F-9782-92E7E3A0D1AE}" destId="{41268A2F-036D-4181-AA5A-D468DAC79392}" srcOrd="0" destOrd="0" presId="urn:microsoft.com/office/officeart/2005/8/layout/orgChart1"/>
+    <dgm:cxn modelId="{DB740E3D-DA01-4423-8E08-DC430F5892AA}" type="presOf" srcId="{B7D72A91-0C7E-45B9-AACD-EB806607436E}" destId="{C6823A04-DDB7-4314-BEFD-6A30ADD7A6C7}" srcOrd="0" destOrd="0" presId="urn:microsoft.com/office/officeart/2005/8/layout/orgChart1"/>
+    <dgm:cxn modelId="{C3F67261-CEA3-4F23-825C-979BFD40E3BF}" srcId="{C848FE92-463D-470D-BF1D-04ADA610834C}" destId="{E0AEC5A1-9217-4F7F-8CC9-B4E3DBAC8132}" srcOrd="2" destOrd="0" parTransId="{871DF954-769D-4F88-86E9-4C8BBCEB4AED}" sibTransId="{44437E95-F69D-464C-AAE1-42D40BAA01C6}"/>
+    <dgm:cxn modelId="{B8EF7ECD-2B3B-4478-836E-AED454264EC9}" srcId="{DE4100C8-9BAD-414D-A8B3-EDB25C14EF90}" destId="{C9F7C635-5B03-445C-863A-6F6D6F55A527}" srcOrd="1" destOrd="0" parTransId="{B2661689-1F1F-4E0F-A2E1-5887BA18094D}" sibTransId="{E2822F3F-B40E-4FF9-BC8D-7D44CF939779}"/>
+    <dgm:cxn modelId="{AF19BD81-7EFE-4928-B09E-D14F25BA44D8}" type="presOf" srcId="{BD80EE29-4101-461C-A2FA-251FF3AE40F5}" destId="{0FDF530A-5B68-46B1-8CFE-11FDA64DE391}" srcOrd="1" destOrd="0" presId="urn:microsoft.com/office/officeart/2005/8/layout/orgChart1"/>
+    <dgm:cxn modelId="{1487DF9E-FB8E-44A8-89FA-3C1EE2988011}" type="presOf" srcId="{0E7DEADE-BF26-41B5-8328-486C5DB8DBAC}" destId="{DE1BA932-EB54-40AF-99CF-5C5119D5AFC2}" srcOrd="1" destOrd="0" presId="urn:microsoft.com/office/officeart/2005/8/layout/orgChart1"/>
+    <dgm:cxn modelId="{3EBDEAA3-B9C6-498F-9BE4-6896490179C0}" type="presOf" srcId="{D93AFF9F-FC2A-430D-8A44-30757930CD97}" destId="{630FB1FE-1568-4E6E-A0E0-457118C98AEE}" srcOrd="0" destOrd="0" presId="urn:microsoft.com/office/officeart/2005/8/layout/orgChart1"/>
+    <dgm:cxn modelId="{037E7708-389F-4734-B628-C72D4596C1AB}" srcId="{70387467-9469-4206-8E37-05F43AA08A2A}" destId="{72BEADBA-7002-4022-8823-1A071831A857}" srcOrd="5" destOrd="0" parTransId="{62C8414F-66B2-4760-BFF0-3DCCD5379EBF}" sibTransId="{51D0C412-15D0-48FC-84A2-48027B2EC0B4}"/>
+    <dgm:cxn modelId="{EFF6A4B2-F8F5-412A-8D6B-EC919C95398D}" type="presOf" srcId="{B5DCF512-1AB7-4CD0-9D3F-BE0581B2CB49}" destId="{0D9F12AB-C58C-43CE-842B-D1F6B81EF42C}" srcOrd="1" destOrd="0" presId="urn:microsoft.com/office/officeart/2005/8/layout/orgChart1"/>
+    <dgm:cxn modelId="{D646FC28-3FE9-4844-A3AA-7AB80C399B5E}" type="presOf" srcId="{8B70E0AE-105B-4655-8741-CDDE780F58D5}" destId="{DC67B31A-26AA-4189-8A22-1889CEF361A4}" srcOrd="0" destOrd="0" presId="urn:microsoft.com/office/officeart/2005/8/layout/orgChart1"/>
+    <dgm:cxn modelId="{62F86BEE-6C4E-4DFA-B493-C03AAF805FDA}" type="presOf" srcId="{72BEADBA-7002-4022-8823-1A071831A857}" destId="{C696DC6B-2F99-47BF-8D94-C8BA55D71D9E}" srcOrd="1" destOrd="0" presId="urn:microsoft.com/office/officeart/2005/8/layout/orgChart1"/>
     <dgm:cxn modelId="{7C0B39DA-337C-42AE-A7E3-A1F511A67F89}" type="presOf" srcId="{BD80EE29-4101-461C-A2FA-251FF3AE40F5}" destId="{D382AD5D-81AD-4AC6-9E59-F29201543338}" srcOrd="0" destOrd="0" presId="urn:microsoft.com/office/officeart/2005/8/layout/orgChart1"/>
-    <dgm:cxn modelId="{287C2523-3180-46B4-902A-DB2BC33EAD0B}" type="presOf" srcId="{B7D72A91-0C7E-45B9-AACD-EB806607436E}" destId="{4F856AE7-E9CC-4459-AEC8-68DE9E4C0E2F}" srcOrd="1" destOrd="0" presId="urn:microsoft.com/office/officeart/2005/8/layout/orgChart1"/>
-    <dgm:cxn modelId="{1F6FA51C-0A64-4B40-8086-86B0ADF79D57}" type="presOf" srcId="{91038339-7E44-407D-8F41-830A9AC7139F}" destId="{BE05C31F-DF27-417A-9B03-58F2D293754F}" srcOrd="0" destOrd="0" presId="urn:microsoft.com/office/officeart/2005/8/layout/orgChart1"/>
+    <dgm:cxn modelId="{775B086A-D63E-405E-AFE0-964F62B70284}" srcId="{402F2858-01CB-44CE-82CD-EE007210A1B1}" destId="{70387467-9469-4206-8E37-05F43AA08A2A}" srcOrd="0" destOrd="0" parTransId="{CB45B893-CCF8-4274-A974-3FA00CE24CDE}" sibTransId="{063EE879-2B9F-488E-83A9-ED0FB91B5A5E}"/>
+    <dgm:cxn modelId="{6C392A1A-CF21-46BB-A922-B55CC4623054}" srcId="{C848FE92-463D-470D-BF1D-04ADA610834C}" destId="{0E7DEADE-BF26-41B5-8328-486C5DB8DBAC}" srcOrd="4" destOrd="0" parTransId="{893C8D60-FD51-4D36-BC40-F19AEA909325}" sibTransId="{38AFF0BB-C988-42A7-AEBC-6A5DB48BA721}"/>
+    <dgm:cxn modelId="{2D48A147-7839-4E10-A652-DF9BBEDA9723}" type="presOf" srcId="{6E9BC9EB-F429-40C4-AB41-3D32306E2060}" destId="{33A6DC25-4DEB-4F90-9E16-4D43C3569F99}" srcOrd="0" destOrd="0" presId="urn:microsoft.com/office/officeart/2005/8/layout/orgChart1"/>
+    <dgm:cxn modelId="{49AFE0A2-0F37-4237-8D1F-7E81C74526A5}" srcId="{70387467-9469-4206-8E37-05F43AA08A2A}" destId="{B21F075C-07CF-4E94-8A08-FCC582F20775}" srcOrd="4" destOrd="0" parTransId="{9DEC245C-5EB8-4B55-9BFA-23D615C3DC8D}" sibTransId="{25A9CB95-2B4A-49A4-BB64-EF641A8617CC}"/>
+    <dgm:cxn modelId="{8CFC2E95-9BDB-4643-B6AF-BEB34BFBDB52}" type="presOf" srcId="{2B8D4C78-FF64-4ACF-93A1-FF2950411183}" destId="{9DE9F66F-27C9-4DC2-B07D-7E6BBE00BC85}" srcOrd="0" destOrd="0" presId="urn:microsoft.com/office/officeart/2005/8/layout/orgChart1"/>
+    <dgm:cxn modelId="{CBD3D9F6-B59B-4753-9F61-B7F2ECDCAB28}" srcId="{70387467-9469-4206-8E37-05F43AA08A2A}" destId="{CB53A11A-061D-4AE2-AB7E-ECAB65D1D1CE}" srcOrd="2" destOrd="0" parTransId="{69CDE423-D26D-40D6-8B92-2731C1D24B3F}" sibTransId="{F7B10986-3D3A-4585-99A3-FA4F25E72B9B}"/>
+    <dgm:cxn modelId="{57B500DF-E857-4A3E-9657-56D23095AC32}" type="presOf" srcId="{E0AEC5A1-9217-4F7F-8CC9-B4E3DBAC8132}" destId="{0C714DD9-24C9-4E5B-B485-44A250CD8C35}" srcOrd="0" destOrd="0" presId="urn:microsoft.com/office/officeart/2005/8/layout/orgChart1"/>
+    <dgm:cxn modelId="{4E345769-B193-4484-9F98-38254BC93F15}" type="presOf" srcId="{DE4100C8-9BAD-414D-A8B3-EDB25C14EF90}" destId="{ADA5F25E-E5A7-4A74-ABAF-CED9575A8918}" srcOrd="0" destOrd="0" presId="urn:microsoft.com/office/officeart/2005/8/layout/orgChart1"/>
+    <dgm:cxn modelId="{9B3806F4-058B-4A2B-8663-38547B76530E}" type="presOf" srcId="{B2661689-1F1F-4E0F-A2E1-5887BA18094D}" destId="{E55EDA56-BBD3-4D8A-A274-B9F591143EBF}" srcOrd="0" destOrd="0" presId="urn:microsoft.com/office/officeart/2005/8/layout/orgChart1"/>
+    <dgm:cxn modelId="{E2FEB81D-441F-443A-8E0B-614086D71DEB}" type="presOf" srcId="{B21F075C-07CF-4E94-8A08-FCC582F20775}" destId="{1E26C50A-C283-4C1E-B27D-AF9692F99DDF}" srcOrd="1" destOrd="0" presId="urn:microsoft.com/office/officeart/2005/8/layout/orgChart1"/>
+    <dgm:cxn modelId="{1B724CEF-C48D-4BBB-9D82-9D18410CADD4}" type="presOf" srcId="{9A84B3BF-D88B-4CB3-87E8-4F100CED8C27}" destId="{7EC0BC3D-ED4D-42E6-82F2-9672178A5531}" srcOrd="0" destOrd="0" presId="urn:microsoft.com/office/officeart/2005/8/layout/orgChart1"/>
+    <dgm:cxn modelId="{205D6A29-9740-4666-BDF7-4679933CFDB4}" type="presOf" srcId="{C848FE92-463D-470D-BF1D-04ADA610834C}" destId="{3AA664D6-AB72-4048-9FD3-F61832C3F2AC}" srcOrd="1" destOrd="0" presId="urn:microsoft.com/office/officeart/2005/8/layout/orgChart1"/>
     <dgm:cxn modelId="{75CFC882-0004-4D6B-A827-295FA9B504A4}" type="presOf" srcId="{728F31A6-D1F3-4DEE-8A9B-9F51D17C553F}" destId="{6C222222-6606-476E-9437-D5DEBD9F6A62}" srcOrd="1" destOrd="0" presId="urn:microsoft.com/office/officeart/2005/8/layout/orgChart1"/>
-    <dgm:cxn modelId="{2573F99B-1F5A-43A2-AF78-B9D3BF0668EF}" type="presOf" srcId="{3CE2639D-3C61-4B69-9A41-4E26F68EA67D}" destId="{315673BE-5240-4669-A35C-00CBBABDF50A}" srcOrd="0" destOrd="0" presId="urn:microsoft.com/office/officeart/2005/8/layout/orgChart1"/>
+    <dgm:cxn modelId="{A6D8989D-846A-471D-A315-C4A8D9533E01}" type="presOf" srcId="{07EF54CB-A086-4649-8EB1-0FC20D877F22}" destId="{71017FC9-5A4F-4D82-BC88-E649C7AC0B9F}" srcOrd="0" destOrd="0" presId="urn:microsoft.com/office/officeart/2005/8/layout/orgChart1"/>
+    <dgm:cxn modelId="{8756457B-5084-49ED-9EED-68869B20BAF8}" type="presOf" srcId="{9DEC245C-5EB8-4B55-9BFA-23D615C3DC8D}" destId="{3CD0C661-C45E-415E-9492-7B4237B233EE}" srcOrd="0" destOrd="0" presId="urn:microsoft.com/office/officeart/2005/8/layout/orgChart1"/>
     <dgm:cxn modelId="{A22F35A7-82F0-4DA2-9306-BDD28B4DC4B1}" type="presOf" srcId="{07765CC6-0379-4A19-BB7B-26FA6EAF4C4E}" destId="{929FFC8C-93B3-4C2C-8A29-F6DEB3F4B432}" srcOrd="0" destOrd="0" presId="urn:microsoft.com/office/officeart/2005/8/layout/orgChart1"/>
-    <dgm:cxn modelId="{C3F67261-CEA3-4F23-825C-979BFD40E3BF}" srcId="{C848FE92-463D-470D-BF1D-04ADA610834C}" destId="{E0AEC5A1-9217-4F7F-8CC9-B4E3DBAC8132}" srcOrd="2" destOrd="0" parTransId="{871DF954-769D-4F88-86E9-4C8BBCEB4AED}" sibTransId="{44437E95-F69D-464C-AAE1-42D40BAA01C6}"/>
+    <dgm:cxn modelId="{42C997C6-BDE0-4F8B-9776-2E54207F752B}" type="presOf" srcId="{70387467-9469-4206-8E37-05F43AA08A2A}" destId="{6E110BFA-A299-4837-B09B-5069CD9CCA46}" srcOrd="0" destOrd="0" presId="urn:microsoft.com/office/officeart/2005/8/layout/orgChart1"/>
+    <dgm:cxn modelId="{CFBE2095-859F-4DFA-91E8-12EC076594E2}" srcId="{CB53A11A-061D-4AE2-AB7E-ECAB65D1D1CE}" destId="{6E9BC9EB-F429-40C4-AB41-3D32306E2060}" srcOrd="0" destOrd="0" parTransId="{EDD26731-FE0D-4507-B02B-DFC75EEB244D}" sibTransId="{EF2A5223-B904-459B-8FB8-DFB722EB3654}"/>
+    <dgm:cxn modelId="{D87FFB86-1B0A-4785-95BA-6A4A239209FD}" type="presOf" srcId="{9BDADB4E-6332-43C2-9DF5-DFD2D48F4CC3}" destId="{B1454F82-4F97-4669-9A4E-028ED468EEF1}" srcOrd="0" destOrd="0" presId="urn:microsoft.com/office/officeart/2005/8/layout/orgChart1"/>
+    <dgm:cxn modelId="{DAB52814-9190-480B-8696-95F11AAFFC5F}" srcId="{70387467-9469-4206-8E37-05F43AA08A2A}" destId="{E73FA78A-4C4A-46B5-A42E-587D72142E36}" srcOrd="3" destOrd="0" parTransId="{07EF54CB-A086-4649-8EB1-0FC20D877F22}" sibTransId="{06DD3A08-A9B7-4CDF-B29A-1D6C1C07C491}"/>
+    <dgm:cxn modelId="{94B3A22D-7F13-4E90-AD72-4C4DB7A8B194}" type="presOf" srcId="{57ACBF68-6D43-43F9-9CEA-15DE04FC1019}" destId="{4D202710-25BA-44D1-B3F0-58EFA03CBBAE}" srcOrd="0" destOrd="0" presId="urn:microsoft.com/office/officeart/2005/8/layout/orgChart1"/>
+    <dgm:cxn modelId="{5C8C1EDF-26F6-4925-A992-436DFB23B95F}" srcId="{C848FE92-463D-470D-BF1D-04ADA610834C}" destId="{8B70E0AE-105B-4655-8741-CDDE780F58D5}" srcOrd="0" destOrd="0" parTransId="{D8835952-A557-4A2A-9CE9-592B61ACC653}" sibTransId="{DA73697A-DD21-4731-8C3A-F840DE0D78DD}"/>
+    <dgm:cxn modelId="{DAB2DEE9-1BA5-4FDB-8CC3-9425A2F4AD4E}" type="presOf" srcId="{70387467-9469-4206-8E37-05F43AA08A2A}" destId="{1E93D8A4-024A-4C20-83A6-DD56653D372A}" srcOrd="1" destOrd="0" presId="urn:microsoft.com/office/officeart/2005/8/layout/orgChart1"/>
     <dgm:cxn modelId="{3A96FE48-420B-499F-A3A9-B4B73112A551}" type="presOf" srcId="{402F2858-01CB-44CE-82CD-EE007210A1B1}" destId="{875BAD68-6674-44BE-ABFE-7F5E3F19A10D}" srcOrd="0" destOrd="0" presId="urn:microsoft.com/office/officeart/2005/8/layout/orgChart1"/>
-    <dgm:cxn modelId="{62F86BEE-6C4E-4DFA-B493-C03AAF805FDA}" type="presOf" srcId="{72BEADBA-7002-4022-8823-1A071831A857}" destId="{C696DC6B-2F99-47BF-8D94-C8BA55D71D9E}" srcOrd="1" destOrd="0" presId="urn:microsoft.com/office/officeart/2005/8/layout/orgChart1"/>
+    <dgm:cxn modelId="{850213D9-5700-4D33-9E55-DDDB24C772ED}" type="presOf" srcId="{728F31A6-D1F3-4DEE-8A9B-9F51D17C553F}" destId="{4D8B1969-F22B-4A5B-994C-1CD8F886EC40}" srcOrd="0" destOrd="0" presId="urn:microsoft.com/office/officeart/2005/8/layout/orgChart1"/>
+    <dgm:cxn modelId="{8B7D28C2-5C5E-4211-8C7B-49214A1D64B2}" type="presOf" srcId="{6EFD63C3-BBE7-44E5-A3D6-9B50F167D8B9}" destId="{A444900E-0076-4B1A-BC17-B35A2ECF1F33}" srcOrd="0" destOrd="0" presId="urn:microsoft.com/office/officeart/2005/8/layout/orgChart1"/>
+    <dgm:cxn modelId="{929339D4-3643-4749-9647-C96129F1528B}" srcId="{402F2858-01CB-44CE-82CD-EE007210A1B1}" destId="{9077FE6A-CBB5-4A51-B3E0-8E41638AA831}" srcOrd="1" destOrd="0" parTransId="{25C53C84-C4D2-4EF6-9FE0-7BF969088FD8}" sibTransId="{EBF2BF22-245F-4F16-8BA3-6D89D3767B2F}"/>
+    <dgm:cxn modelId="{66AF5C80-F57D-4537-B23A-89F08559477D}" type="presOf" srcId="{B5DCF512-1AB7-4CD0-9D3F-BE0581B2CB49}" destId="{E847BB21-2BE7-4387-85A1-738AFFD84E75}" srcOrd="0" destOrd="0" presId="urn:microsoft.com/office/officeart/2005/8/layout/orgChart1"/>
+    <dgm:cxn modelId="{063A70AC-85D8-4674-9BB2-A425BF885AB8}" type="presOf" srcId="{C848FE92-463D-470D-BF1D-04ADA610834C}" destId="{3E3AD66D-B7D7-4DCA-9EE3-EC4F50D31409}" srcOrd="0" destOrd="0" presId="urn:microsoft.com/office/officeart/2005/8/layout/orgChart1"/>
+    <dgm:cxn modelId="{56678D34-59CD-4095-9095-EFCC24DC4979}" type="presOf" srcId="{1F78CE57-8592-4FB8-B04D-E8D3187B18EE}" destId="{E05BE627-023E-46E4-990E-E656BE1AC623}" srcOrd="1" destOrd="0" presId="urn:microsoft.com/office/officeart/2005/8/layout/orgChart1"/>
+    <dgm:cxn modelId="{BEB37929-9D49-481D-8CDC-1207A4AF1659}" srcId="{70387467-9469-4206-8E37-05F43AA08A2A}" destId="{1F78CE57-8592-4FB8-B04D-E8D3187B18EE}" srcOrd="6" destOrd="0" parTransId="{4AFCAEF2-5B21-4364-AF0D-421C27B6CA7C}" sibTransId="{E4F7C61B-6C5B-4E6F-81B4-10F0BBC50CB1}"/>
+    <dgm:cxn modelId="{1792CA98-0F5C-44BF-AA4C-4EC9DD968ED6}" srcId="{C848FE92-463D-470D-BF1D-04ADA610834C}" destId="{B5DCF512-1AB7-4CD0-9D3F-BE0581B2CB49}" srcOrd="5" destOrd="0" parTransId="{57ACBF68-6D43-43F9-9CEA-15DE04FC1019}" sibTransId="{99E374DF-BF1C-4A17-8544-055EABD0C1F3}"/>
+    <dgm:cxn modelId="{EEB006D0-A595-4E62-8308-3519D9991061}" type="presOf" srcId="{B21F075C-07CF-4E94-8A08-FCC582F20775}" destId="{492BA640-7185-47A4-9297-C5663E3E3248}" srcOrd="0" destOrd="0" presId="urn:microsoft.com/office/officeart/2005/8/layout/orgChart1"/>
+    <dgm:cxn modelId="{C3DA0AE2-484C-41D8-BD16-7DA6C5288FB5}" type="presOf" srcId="{EDD26731-FE0D-4507-B02B-DFC75EEB244D}" destId="{D46E7BEF-C70C-4317-9836-5C7ACC38E3B3}" srcOrd="0" destOrd="0" presId="urn:microsoft.com/office/officeart/2005/8/layout/orgChart1"/>
+    <dgm:cxn modelId="{4CECFBFD-CFFB-467E-9664-8FABEEEF24B8}" srcId="{C848FE92-463D-470D-BF1D-04ADA610834C}" destId="{91038339-7E44-407D-8F41-830A9AC7139F}" srcOrd="3" destOrd="0" parTransId="{5C062E8D-7F59-4188-9E49-88730FD1D5F8}" sibTransId="{63641D8B-AA92-4836-8C70-7F744622D479}"/>
+    <dgm:cxn modelId="{BCB37436-C906-49F1-BAFD-22EB9000C62C}" type="presOf" srcId="{91038339-7E44-407D-8F41-830A9AC7139F}" destId="{75E2338A-6568-4ADE-AEE2-4765ECCACFF8}" srcOrd="1" destOrd="0" presId="urn:microsoft.com/office/officeart/2005/8/layout/orgChart1"/>
     <dgm:cxn modelId="{69FA9F9A-DCA1-418D-937E-49BF1CB29C88}" type="presOf" srcId="{5C062E8D-7F59-4188-9E49-88730FD1D5F8}" destId="{7D114837-346D-4A12-88C3-1553C609DED8}" srcOrd="0" destOrd="0" presId="urn:microsoft.com/office/officeart/2005/8/layout/orgChart1"/>
-    <dgm:cxn modelId="{C8D8E5F3-2910-4FA4-B99D-E0056DDEB9D0}" type="presOf" srcId="{E0AEC5A1-9217-4F7F-8CC9-B4E3DBAC8132}" destId="{4D4D5C94-49C5-4B67-BEF3-8F860D410F15}" srcOrd="1" destOrd="0" presId="urn:microsoft.com/office/officeart/2005/8/layout/orgChart1"/>
-    <dgm:cxn modelId="{205D6A29-9740-4666-BDF7-4679933CFDB4}" type="presOf" srcId="{C848FE92-463D-470D-BF1D-04ADA610834C}" destId="{3AA664D6-AB72-4048-9FD3-F61832C3F2AC}" srcOrd="1" destOrd="0" presId="urn:microsoft.com/office/officeart/2005/8/layout/orgChart1"/>
-    <dgm:cxn modelId="{2C0CD4D4-B048-4D76-B6CE-FF03D081B514}" type="presOf" srcId="{CB53A11A-061D-4AE2-AB7E-ECAB65D1D1CE}" destId="{C170A22D-0CFC-41E3-BFF2-C8043C638EF7}" srcOrd="1" destOrd="0" presId="urn:microsoft.com/office/officeart/2005/8/layout/orgChart1"/>
-    <dgm:cxn modelId="{49AFE0A2-0F37-4237-8D1F-7E81C74526A5}" srcId="{70387467-9469-4206-8E37-05F43AA08A2A}" destId="{B21F075C-07CF-4E94-8A08-FCC582F20775}" srcOrd="4" destOrd="0" parTransId="{9DEC245C-5EB8-4B55-9BFA-23D615C3DC8D}" sibTransId="{25A9CB95-2B4A-49A4-BB64-EF641A8617CC}"/>
-    <dgm:cxn modelId="{1B724CEF-C48D-4BBB-9D82-9D18410CADD4}" type="presOf" srcId="{9A84B3BF-D88B-4CB3-87E8-4F100CED8C27}" destId="{7EC0BC3D-ED4D-42E6-82F2-9672178A5531}" srcOrd="0" destOrd="0" presId="urn:microsoft.com/office/officeart/2005/8/layout/orgChart1"/>
-    <dgm:cxn modelId="{AF19BD81-7EFE-4928-B09E-D14F25BA44D8}" type="presOf" srcId="{BD80EE29-4101-461C-A2FA-251FF3AE40F5}" destId="{0FDF530A-5B68-46B1-8CFE-11FDA64DE391}" srcOrd="1" destOrd="0" presId="urn:microsoft.com/office/officeart/2005/8/layout/orgChart1"/>
-    <dgm:cxn modelId="{4CECFBFD-CFFB-467E-9664-8FABEEEF24B8}" srcId="{C848FE92-463D-470D-BF1D-04ADA610834C}" destId="{91038339-7E44-407D-8F41-830A9AC7139F}" srcOrd="3" destOrd="0" parTransId="{5C062E8D-7F59-4188-9E49-88730FD1D5F8}" sibTransId="{63641D8B-AA92-4836-8C70-7F744622D479}"/>
-    <dgm:cxn modelId="{8E3C4AA8-5518-4F10-928C-A2CD41D31302}" srcId="{1F78CE57-8592-4FB8-B04D-E8D3187B18EE}" destId="{BD80EE29-4101-461C-A2FA-251FF3AE40F5}" srcOrd="0" destOrd="0" parTransId="{85871013-2EE5-4C5F-9A07-B950065F6046}" sibTransId="{C35126B6-3E49-4C7A-A7B7-4B52DC261818}"/>
-    <dgm:cxn modelId="{9B3806F4-058B-4A2B-8663-38547B76530E}" type="presOf" srcId="{B2661689-1F1F-4E0F-A2E1-5887BA18094D}" destId="{E55EDA56-BBD3-4D8A-A274-B9F591143EBF}" srcOrd="0" destOrd="0" presId="urn:microsoft.com/office/officeart/2005/8/layout/orgChart1"/>
-    <dgm:cxn modelId="{BD8D81D1-9F24-483E-9785-174EE0FDF760}" type="presOf" srcId="{E73FA78A-4C4A-46B5-A42E-587D72142E36}" destId="{A38C7A00-0F57-448B-B395-46EC701BA310}" srcOrd="1" destOrd="0" presId="urn:microsoft.com/office/officeart/2005/8/layout/orgChart1"/>
-    <dgm:cxn modelId="{BEB37929-9D49-481D-8CDC-1207A4AF1659}" srcId="{70387467-9469-4206-8E37-05F43AA08A2A}" destId="{1F78CE57-8592-4FB8-B04D-E8D3187B18EE}" srcOrd="6" destOrd="0" parTransId="{4AFCAEF2-5B21-4364-AF0D-421C27B6CA7C}" sibTransId="{E4F7C61B-6C5B-4E6F-81B4-10F0BBC50CB1}"/>
-    <dgm:cxn modelId="{775B086A-D63E-405E-AFE0-964F62B70284}" srcId="{402F2858-01CB-44CE-82CD-EE007210A1B1}" destId="{70387467-9469-4206-8E37-05F43AA08A2A}" srcOrd="0" destOrd="0" parTransId="{CB45B893-CCF8-4274-A974-3FA00CE24CDE}" sibTransId="{063EE879-2B9F-488E-83A9-ED0FB91B5A5E}"/>
-    <dgm:cxn modelId="{B8EF7ECD-2B3B-4478-836E-AED454264EC9}" srcId="{DE4100C8-9BAD-414D-A8B3-EDB25C14EF90}" destId="{C9F7C635-5B03-445C-863A-6F6D6F55A527}" srcOrd="1" destOrd="0" parTransId="{B2661689-1F1F-4E0F-A2E1-5887BA18094D}" sibTransId="{E2822F3F-B40E-4FF9-BC8D-7D44CF939779}"/>
-    <dgm:cxn modelId="{9B1EB5DA-6FD3-4009-A71B-56F0453E7B21}" type="presOf" srcId="{6E9BC9EB-F429-40C4-AB41-3D32306E2060}" destId="{92C165B2-BEB5-4F74-94EE-FD279DB49152}" srcOrd="1" destOrd="0" presId="urn:microsoft.com/office/officeart/2005/8/layout/orgChart1"/>
-    <dgm:cxn modelId="{9C4FE5F9-3C93-499E-BA2F-350329153EF0}" type="presOf" srcId="{A2AF496C-1D11-4C11-8E9E-17B961189C21}" destId="{F69D23B4-AFE8-409C-83FF-061A8ECAD086}" srcOrd="0" destOrd="0" presId="urn:microsoft.com/office/officeart/2005/8/layout/orgChart1"/>
-    <dgm:cxn modelId="{01CE2FC8-FFF8-41C8-A513-54830B6B31F0}" type="presOf" srcId="{4AFCAEF2-5B21-4364-AF0D-421C27B6CA7C}" destId="{9949C934-C42B-450B-803C-7B8003F40FB8}" srcOrd="0" destOrd="0" presId="urn:microsoft.com/office/officeart/2005/8/layout/orgChart1"/>
-    <dgm:cxn modelId="{56678D34-59CD-4095-9095-EFCC24DC4979}" type="presOf" srcId="{1F78CE57-8592-4FB8-B04D-E8D3187B18EE}" destId="{E05BE627-023E-46E4-990E-E656BE1AC623}" srcOrd="1" destOrd="0" presId="urn:microsoft.com/office/officeart/2005/8/layout/orgChart1"/>
-    <dgm:cxn modelId="{063A70AC-85D8-4674-9BB2-A425BF885AB8}" type="presOf" srcId="{C848FE92-463D-470D-BF1D-04ADA610834C}" destId="{3E3AD66D-B7D7-4DCA-9EE3-EC4F50D31409}" srcOrd="0" destOrd="0" presId="urn:microsoft.com/office/officeart/2005/8/layout/orgChart1"/>
-    <dgm:cxn modelId="{BCB37436-C906-49F1-BAFD-22EB9000C62C}" type="presOf" srcId="{91038339-7E44-407D-8F41-830A9AC7139F}" destId="{75E2338A-6568-4ADE-AEE2-4765ECCACFF8}" srcOrd="1" destOrd="0" presId="urn:microsoft.com/office/officeart/2005/8/layout/orgChart1"/>
-    <dgm:cxn modelId="{EEB006D0-A595-4E62-8308-3519D9991061}" type="presOf" srcId="{B21F075C-07CF-4E94-8A08-FCC582F20775}" destId="{492BA640-7185-47A4-9297-C5663E3E3248}" srcOrd="0" destOrd="0" presId="urn:microsoft.com/office/officeart/2005/8/layout/orgChart1"/>
-    <dgm:cxn modelId="{5C8C1EDF-26F6-4925-A992-436DFB23B95F}" srcId="{C848FE92-463D-470D-BF1D-04ADA610834C}" destId="{8B70E0AE-105B-4655-8741-CDDE780F58D5}" srcOrd="0" destOrd="0" parTransId="{D8835952-A557-4A2A-9CE9-592B61ACC653}" sibTransId="{DA73697A-DD21-4731-8C3A-F840DE0D78DD}"/>
-    <dgm:cxn modelId="{8CFC2E95-9BDB-4643-B6AF-BEB34BFBDB52}" type="presOf" srcId="{2B8D4C78-FF64-4ACF-93A1-FF2950411183}" destId="{9DE9F66F-27C9-4DC2-B07D-7E6BBE00BC85}" srcOrd="0" destOrd="0" presId="urn:microsoft.com/office/officeart/2005/8/layout/orgChart1"/>
-    <dgm:cxn modelId="{1487DF9E-FB8E-44A8-89FA-3C1EE2988011}" type="presOf" srcId="{0E7DEADE-BF26-41B5-8328-486C5DB8DBAC}" destId="{DE1BA932-EB54-40AF-99CF-5C5119D5AFC2}" srcOrd="1" destOrd="0" presId="urn:microsoft.com/office/officeart/2005/8/layout/orgChart1"/>
-    <dgm:cxn modelId="{CFBE2095-859F-4DFA-91E8-12EC076594E2}" srcId="{CB53A11A-061D-4AE2-AB7E-ECAB65D1D1CE}" destId="{6E9BC9EB-F429-40C4-AB41-3D32306E2060}" srcOrd="0" destOrd="0" parTransId="{EDD26731-FE0D-4507-B02B-DFC75EEB244D}" sibTransId="{EF2A5223-B904-459B-8FB8-DFB722EB3654}"/>
-    <dgm:cxn modelId="{347A065A-E365-486E-8254-A65AEFF58C57}" type="presOf" srcId="{D93AFF9F-FC2A-430D-8A44-30757930CD97}" destId="{0A47EE92-B9C5-4742-9497-60986CBC5621}" srcOrd="1" destOrd="0" presId="urn:microsoft.com/office/officeart/2005/8/layout/orgChart1"/>
-    <dgm:cxn modelId="{2CE3F964-0644-44DA-AD07-FB7D4ACC3F78}" type="presOf" srcId="{893C8D60-FD51-4D36-BC40-F19AEA909325}" destId="{C003FAF0-1647-4685-8444-5FC3D138E987}" srcOrd="0" destOrd="0" presId="urn:microsoft.com/office/officeart/2005/8/layout/orgChart1"/>
+    <dgm:cxn modelId="{7B404FC7-0AA0-4B53-B1FA-53D12F6ADBF8}" srcId="{70387467-9469-4206-8E37-05F43AA08A2A}" destId="{DE4100C8-9BAD-414D-A8B3-EDB25C14EF90}" srcOrd="0" destOrd="0" parTransId="{07765CC6-0379-4A19-BB7B-26FA6EAF4C4E}" sibTransId="{36AA1A18-9698-4EB4-8451-D1C33571304D}"/>
+    <dgm:cxn modelId="{5E87B0D9-22EC-4CBE-9615-9880733CC80A}" type="presOf" srcId="{FBD7E154-CFF9-4603-A93A-9AF2E8FCB4D7}" destId="{303DDAE2-27BE-4D5F-B380-2F55F54A80C0}" srcOrd="0" destOrd="0" presId="urn:microsoft.com/office/officeart/2005/8/layout/orgChart1"/>
+    <dgm:cxn modelId="{53CA1CA2-0221-4D86-9D65-3EC480E8EE60}" type="presOf" srcId="{9077FE6A-CBB5-4A51-B3E0-8E41638AA831}" destId="{94382F0D-8693-42D1-A624-AEE4D694E906}" srcOrd="1" destOrd="0" presId="urn:microsoft.com/office/officeart/2005/8/layout/orgChart1"/>
     <dgm:cxn modelId="{33652C1B-47AC-403B-A9E6-BFE7C7637A50}" type="presOf" srcId="{E73FA78A-4C4A-46B5-A42E-587D72142E36}" destId="{BBE7B26F-7841-4591-92A4-A426F6588D0B}" srcOrd="0" destOrd="0" presId="urn:microsoft.com/office/officeart/2005/8/layout/orgChart1"/>
-    <dgm:cxn modelId="{1792CA98-0F5C-44BF-AA4C-4EC9DD968ED6}" srcId="{C848FE92-463D-470D-BF1D-04ADA610834C}" destId="{B5DCF512-1AB7-4CD0-9D3F-BE0581B2CB49}" srcOrd="5" destOrd="0" parTransId="{57ACBF68-6D43-43F9-9CEA-15DE04FC1019}" sibTransId="{99E374DF-BF1C-4A17-8544-055EABD0C1F3}"/>
-    <dgm:cxn modelId="{850213D9-5700-4D33-9E55-DDDB24C772ED}" type="presOf" srcId="{728F31A6-D1F3-4DEE-8A9B-9F51D17C553F}" destId="{4D8B1969-F22B-4A5B-994C-1CD8F886EC40}" srcOrd="0" destOrd="0" presId="urn:microsoft.com/office/officeart/2005/8/layout/orgChart1"/>
-    <dgm:cxn modelId="{D87FFB86-1B0A-4785-95BA-6A4A239209FD}" type="presOf" srcId="{9BDADB4E-6332-43C2-9DF5-DFD2D48F4CC3}" destId="{B1454F82-4F97-4669-9A4E-028ED468EEF1}" srcOrd="0" destOrd="0" presId="urn:microsoft.com/office/officeart/2005/8/layout/orgChart1"/>
-    <dgm:cxn modelId="{4E345769-B193-4484-9F98-38254BC93F15}" type="presOf" srcId="{DE4100C8-9BAD-414D-A8B3-EDB25C14EF90}" destId="{ADA5F25E-E5A7-4A74-ABAF-CED9575A8918}" srcOrd="0" destOrd="0" presId="urn:microsoft.com/office/officeart/2005/8/layout/orgChart1"/>
-    <dgm:cxn modelId="{8756457B-5084-49ED-9EED-68869B20BAF8}" type="presOf" srcId="{9DEC245C-5EB8-4B55-9BFA-23D615C3DC8D}" destId="{3CD0C661-C45E-415E-9492-7B4237B233EE}" srcOrd="0" destOrd="0" presId="urn:microsoft.com/office/officeart/2005/8/layout/orgChart1"/>
-    <dgm:cxn modelId="{E2FEB81D-441F-443A-8E0B-614086D71DEB}" type="presOf" srcId="{B21F075C-07CF-4E94-8A08-FCC582F20775}" destId="{1E26C50A-C283-4C1E-B27D-AF9692F99DDF}" srcOrd="1" destOrd="0" presId="urn:microsoft.com/office/officeart/2005/8/layout/orgChart1"/>
-    <dgm:cxn modelId="{DAB52814-9190-480B-8696-95F11AAFFC5F}" srcId="{70387467-9469-4206-8E37-05F43AA08A2A}" destId="{E73FA78A-4C4A-46B5-A42E-587D72142E36}" srcOrd="3" destOrd="0" parTransId="{07EF54CB-A086-4649-8EB1-0FC20D877F22}" sibTransId="{06DD3A08-A9B7-4CDF-B29A-1D6C1C07C491}"/>
-    <dgm:cxn modelId="{F62F681E-E9DA-45D9-BF6C-03FD4683270B}" type="presOf" srcId="{0E7DEADE-BF26-41B5-8328-486C5DB8DBAC}" destId="{1580DD9A-E07B-47E0-A6EF-9A43286CACDB}" srcOrd="0" destOrd="0" presId="urn:microsoft.com/office/officeart/2005/8/layout/orgChart1"/>
-    <dgm:cxn modelId="{5E87B0D9-22EC-4CBE-9615-9880733CC80A}" type="presOf" srcId="{FBD7E154-CFF9-4603-A93A-9AF2E8FCB4D7}" destId="{303DDAE2-27BE-4D5F-B380-2F55F54A80C0}" srcOrd="0" destOrd="0" presId="urn:microsoft.com/office/officeart/2005/8/layout/orgChart1"/>
-    <dgm:cxn modelId="{EFF6A4B2-F8F5-412A-8D6B-EC919C95398D}" type="presOf" srcId="{B5DCF512-1AB7-4CD0-9D3F-BE0581B2CB49}" destId="{0D9F12AB-C58C-43CE-842B-D1F6B81EF42C}" srcOrd="1" destOrd="0" presId="urn:microsoft.com/office/officeart/2005/8/layout/orgChart1"/>
-    <dgm:cxn modelId="{3C074AC2-EC28-4971-B743-99AD9662F1F0}" type="presOf" srcId="{72BEADBA-7002-4022-8823-1A071831A857}" destId="{EE1CF7FD-FFFB-48A0-BAE1-DA9FC25CBA32}" srcOrd="0" destOrd="0" presId="urn:microsoft.com/office/officeart/2005/8/layout/orgChart1"/>
-    <dgm:cxn modelId="{3E072829-EF6D-4033-8CF5-946D5CD87870}" type="presOf" srcId="{9A84B3BF-D88B-4CB3-87E8-4F100CED8C27}" destId="{8A4A9DD9-10DC-48FF-9EA8-06219AA420AE}" srcOrd="1" destOrd="0" presId="urn:microsoft.com/office/officeart/2005/8/layout/orgChart1"/>
-    <dgm:cxn modelId="{57B500DF-E857-4A3E-9657-56D23095AC32}" type="presOf" srcId="{E0AEC5A1-9217-4F7F-8CC9-B4E3DBAC8132}" destId="{0C714DD9-24C9-4E5B-B485-44A250CD8C35}" srcOrd="0" destOrd="0" presId="urn:microsoft.com/office/officeart/2005/8/layout/orgChart1"/>
-    <dgm:cxn modelId="{E146CBC5-D5FF-4063-82CB-467E195EC35C}" type="presOf" srcId="{3C33D1E7-53E9-4F48-98B0-B03D4A07F390}" destId="{2FDD7524-38F6-46AD-8AD8-E54C9C8D0A58}" srcOrd="1" destOrd="0" presId="urn:microsoft.com/office/officeart/2005/8/layout/orgChart1"/>
-    <dgm:cxn modelId="{9B920F71-206A-47E5-B26E-08ED36D82881}" srcId="{6E9BC9EB-F429-40C4-AB41-3D32306E2060}" destId="{2B8D4C78-FF64-4ACF-93A1-FF2950411183}" srcOrd="2" destOrd="0" parTransId="{00BBE172-4AAC-46CF-BB0B-819CB810D615}" sibTransId="{944FCFB1-9D54-42A8-BFE0-62D818A4C5F7}"/>
-    <dgm:cxn modelId="{FE8707F5-365A-42E1-884F-EED4EBDB86EC}" type="presOf" srcId="{D8835952-A557-4A2A-9CE9-592B61ACC653}" destId="{F64743E4-6F4F-4ACD-9A9E-383DC668EF91}" srcOrd="0" destOrd="0" presId="urn:microsoft.com/office/officeart/2005/8/layout/orgChart1"/>
-    <dgm:cxn modelId="{53CA1CA2-0221-4D86-9D65-3EC480E8EE60}" type="presOf" srcId="{9077FE6A-CBB5-4A51-B3E0-8E41638AA831}" destId="{94382F0D-8693-42D1-A624-AEE4D694E906}" srcOrd="1" destOrd="0" presId="urn:microsoft.com/office/officeart/2005/8/layout/orgChart1"/>
-    <dgm:cxn modelId="{94B3A22D-7F13-4E90-AD72-4C4DB7A8B194}" type="presOf" srcId="{57ACBF68-6D43-43F9-9CEA-15DE04FC1019}" destId="{4D202710-25BA-44D1-B3F0-58EFA03CBBAE}" srcOrd="0" destOrd="0" presId="urn:microsoft.com/office/officeart/2005/8/layout/orgChart1"/>
-    <dgm:cxn modelId="{DB740E3D-DA01-4423-8E08-DC430F5892AA}" type="presOf" srcId="{B7D72A91-0C7E-45B9-AACD-EB806607436E}" destId="{C6823A04-DDB7-4314-BEFD-6A30ADD7A6C7}" srcOrd="0" destOrd="0" presId="urn:microsoft.com/office/officeart/2005/8/layout/orgChart1"/>
-    <dgm:cxn modelId="{29890899-3C1B-4C10-86C4-DE1194BC923C}" type="presOf" srcId="{C9F7C635-5B03-445C-863A-6F6D6F55A527}" destId="{A24B6A51-1C15-4708-80C5-06E8A2353F31}" srcOrd="1" destOrd="0" presId="urn:microsoft.com/office/officeart/2005/8/layout/orgChart1"/>
-    <dgm:cxn modelId="{EBD5B7B4-FED5-4CE9-9F89-938630DE627D}" type="presOf" srcId="{1F78CE57-8592-4FB8-B04D-E8D3187B18EE}" destId="{3369F1D2-F051-43DD-9F81-DCE1DB8DD909}" srcOrd="0" destOrd="0" presId="urn:microsoft.com/office/officeart/2005/8/layout/orgChart1"/>
-    <dgm:cxn modelId="{45CDC0A3-334E-4BE4-9510-4198E2F81354}" type="presOf" srcId="{9077FE6A-CBB5-4A51-B3E0-8E41638AA831}" destId="{E48E1750-FD00-46D8-B773-5B48261A443A}" srcOrd="0" destOrd="0" presId="urn:microsoft.com/office/officeart/2005/8/layout/orgChart1"/>
-    <dgm:cxn modelId="{07893050-6BEF-4D16-9B7F-68801196BBD1}" type="presOf" srcId="{85871013-2EE5-4C5F-9A07-B950065F6046}" destId="{0D692004-6B64-409A-B340-6A8BEBCD083F}" srcOrd="0" destOrd="0" presId="urn:microsoft.com/office/officeart/2005/8/layout/orgChart1"/>
-    <dgm:cxn modelId="{A6D8989D-846A-471D-A315-C4A8D9533E01}" type="presOf" srcId="{07EF54CB-A086-4649-8EB1-0FC20D877F22}" destId="{71017FC9-5A4F-4D82-BC88-E649C7AC0B9F}" srcOrd="0" destOrd="0" presId="urn:microsoft.com/office/officeart/2005/8/layout/orgChart1"/>
-    <dgm:cxn modelId="{40243BB7-1CC6-4EC0-9E75-466D62E11041}" srcId="{C848FE92-463D-470D-BF1D-04ADA610834C}" destId="{D93AFF9F-FC2A-430D-8A44-30757930CD97}" srcOrd="6" destOrd="0" parTransId="{C9FCDA05-6AE7-4E3F-9782-92E7E3A0D1AE}" sibTransId="{E19D99CE-5663-49EC-BC54-63AA0B502EB2}"/>
-    <dgm:cxn modelId="{08008EAA-C5B4-4AE5-8CA6-F8DFF640F8F8}" srcId="{C848FE92-463D-470D-BF1D-04ADA610834C}" destId="{728F31A6-D1F3-4DEE-8A9B-9F51D17C553F}" srcOrd="1" destOrd="0" parTransId="{9BDADB4E-6332-43C2-9DF5-DFD2D48F4CC3}" sibTransId="{EC1A9083-FCD5-48A2-9551-579AFC9D1C20}"/>
-    <dgm:cxn modelId="{66AF5C80-F57D-4537-B23A-89F08559477D}" type="presOf" srcId="{B5DCF512-1AB7-4CD0-9D3F-BE0581B2CB49}" destId="{E847BB21-2BE7-4387-85A1-738AFFD84E75}" srcOrd="0" destOrd="0" presId="urn:microsoft.com/office/officeart/2005/8/layout/orgChart1"/>
-    <dgm:cxn modelId="{3F3BFF5D-3F9F-4D37-BE90-F07D83626B0C}" type="presOf" srcId="{C9F7C635-5B03-445C-863A-6F6D6F55A527}" destId="{C5D44253-2C4B-4687-BE85-E35CDA49FA38}" srcOrd="0" destOrd="0" presId="urn:microsoft.com/office/officeart/2005/8/layout/orgChart1"/>
     <dgm:cxn modelId="{2250C770-4FEE-495D-B3E2-9C60C843ED0D}" type="presParOf" srcId="{875BAD68-6674-44BE-ABFE-7F5E3F19A10D}" destId="{51C57184-965C-4989-8185-727E92B989DB}" srcOrd="0" destOrd="0" presId="urn:microsoft.com/office/officeart/2005/8/layout/orgChart1"/>
     <dgm:cxn modelId="{15D35C25-2D54-4554-AFAB-33BD52448A7F}" type="presParOf" srcId="{51C57184-965C-4989-8185-727E92B989DB}" destId="{C6139A40-6B44-412F-8EEC-0DDD3D0436F0}" srcOrd="0" destOrd="0" presId="urn:microsoft.com/office/officeart/2005/8/layout/orgChart1"/>
     <dgm:cxn modelId="{88CD2784-0394-4DEA-9DC6-1947823E006F}" type="presParOf" srcId="{C6139A40-6B44-412F-8EEC-0DDD3D0436F0}" destId="{6E110BFA-A299-4837-B09B-5069CD9CCA46}" srcOrd="0" destOrd="0" presId="urn:microsoft.com/office/officeart/2005/8/layout/orgChart1"/>
@@ -4151,8 +4151,8 @@
       </dsp:nvSpPr>
       <dsp:spPr>
         <a:xfrm>
-          <a:off x="2017587" y="1624191"/>
-          <a:ext cx="250051" cy="404499"/>
+          <a:off x="1984692" y="1693858"/>
+          <a:ext cx="250797" cy="405705"/>
         </a:xfrm>
         <a:custGeom>
           <a:avLst/>
@@ -4166,10 +4166,10 @@
                 <a:pt x="0" y="0"/>
               </a:moveTo>
               <a:lnTo>
-                <a:pt x="0" y="404499"/>
+                <a:pt x="0" y="405705"/>
               </a:lnTo>
               <a:lnTo>
-                <a:pt x="250051" y="404499"/>
+                <a:pt x="250797" y="405705"/>
               </a:lnTo>
             </a:path>
           </a:pathLst>
@@ -4210,8 +4210,8 @@
       </dsp:nvSpPr>
       <dsp:spPr>
         <a:xfrm>
-          <a:off x="2725236" y="1116550"/>
-          <a:ext cx="3352201" cy="195567"/>
+          <a:off x="2694450" y="1109658"/>
+          <a:ext cx="3382931" cy="271196"/>
         </a:xfrm>
         <a:custGeom>
           <a:avLst/>
@@ -4222,16 +4222,16 @@
           <a:pathLst>
             <a:path>
               <a:moveTo>
-                <a:pt x="3352201" y="0"/>
+                <a:pt x="3382931" y="0"/>
               </a:moveTo>
               <a:lnTo>
-                <a:pt x="3352201" y="130031"/>
+                <a:pt x="3382931" y="205465"/>
               </a:lnTo>
               <a:lnTo>
-                <a:pt x="0" y="130031"/>
+                <a:pt x="0" y="205465"/>
               </a:lnTo>
               <a:lnTo>
-                <a:pt x="0" y="195567"/>
+                <a:pt x="0" y="271196"/>
               </a:lnTo>
             </a:path>
           </a:pathLst>
@@ -4272,8 +4272,8 @@
       </dsp:nvSpPr>
       <dsp:spPr>
         <a:xfrm>
-          <a:off x="6077437" y="1116550"/>
-          <a:ext cx="5395297" cy="191522"/>
+          <a:off x="6077382" y="1109658"/>
+          <a:ext cx="5390640" cy="267139"/>
         </a:xfrm>
         <a:custGeom>
           <a:avLst/>
@@ -4287,13 +4287,13 @@
                 <a:pt x="0" y="0"/>
               </a:moveTo>
               <a:lnTo>
-                <a:pt x="0" y="125987"/>
+                <a:pt x="0" y="201408"/>
               </a:lnTo>
               <a:lnTo>
-                <a:pt x="5395297" y="125987"/>
+                <a:pt x="5390640" y="201408"/>
               </a:lnTo>
               <a:lnTo>
-                <a:pt x="5395297" y="191522"/>
+                <a:pt x="5390640" y="267139"/>
               </a:lnTo>
             </a:path>
           </a:pathLst>
@@ -4334,8 +4334,8 @@
       </dsp:nvSpPr>
       <dsp:spPr>
         <a:xfrm>
-          <a:off x="6077437" y="1116550"/>
-          <a:ext cx="4116478" cy="194568"/>
+          <a:off x="6077382" y="1109658"/>
+          <a:ext cx="4108008" cy="270194"/>
         </a:xfrm>
         <a:custGeom>
           <a:avLst/>
@@ -4349,13 +4349,13 @@
                 <a:pt x="0" y="0"/>
               </a:moveTo>
               <a:lnTo>
-                <a:pt x="0" y="129033"/>
+                <a:pt x="0" y="204463"/>
               </a:lnTo>
               <a:lnTo>
-                <a:pt x="4116478" y="129033"/>
+                <a:pt x="4108008" y="204463"/>
               </a:lnTo>
               <a:lnTo>
-                <a:pt x="4116478" y="194568"/>
+                <a:pt x="4108008" y="270194"/>
               </a:lnTo>
             </a:path>
           </a:pathLst>
@@ -4396,8 +4396,8 @@
       </dsp:nvSpPr>
       <dsp:spPr>
         <a:xfrm>
-          <a:off x="6077437" y="1116550"/>
-          <a:ext cx="2780926" cy="200779"/>
+          <a:off x="6077382" y="1109658"/>
+          <a:ext cx="2768476" cy="276423"/>
         </a:xfrm>
         <a:custGeom>
           <a:avLst/>
@@ -4411,13 +4411,13 @@
                 <a:pt x="0" y="0"/>
               </a:moveTo>
               <a:lnTo>
-                <a:pt x="0" y="135243"/>
+                <a:pt x="0" y="210692"/>
               </a:lnTo>
               <a:lnTo>
-                <a:pt x="2780926" y="135243"/>
+                <a:pt x="2768476" y="210692"/>
               </a:lnTo>
               <a:lnTo>
-                <a:pt x="2780926" y="200779"/>
+                <a:pt x="2768476" y="276423"/>
               </a:lnTo>
             </a:path>
           </a:pathLst>
@@ -4458,8 +4458,8 @@
       </dsp:nvSpPr>
       <dsp:spPr>
         <a:xfrm>
-          <a:off x="6439310" y="2030165"/>
-          <a:ext cx="423414" cy="1398731"/>
+          <a:off x="6419594" y="2142609"/>
+          <a:ext cx="424676" cy="1336318"/>
         </a:xfrm>
         <a:custGeom>
           <a:avLst/>
@@ -4473,10 +4473,10 @@
                 <a:pt x="0" y="0"/>
               </a:moveTo>
               <a:lnTo>
-                <a:pt x="0" y="1398731"/>
+                <a:pt x="0" y="1336318"/>
               </a:lnTo>
               <a:lnTo>
-                <a:pt x="423414" y="1398731"/>
+                <a:pt x="424676" y="1336318"/>
               </a:lnTo>
             </a:path>
           </a:pathLst>
@@ -4517,8 +4517,8 @@
       </dsp:nvSpPr>
       <dsp:spPr>
         <a:xfrm>
-          <a:off x="6439310" y="2030165"/>
-          <a:ext cx="411149" cy="375935"/>
+          <a:off x="6419594" y="2142609"/>
+          <a:ext cx="412375" cy="335488"/>
         </a:xfrm>
         <a:custGeom>
           <a:avLst/>
@@ -4532,10 +4532,10 @@
                 <a:pt x="0" y="0"/>
               </a:moveTo>
               <a:lnTo>
-                <a:pt x="0" y="375935"/>
+                <a:pt x="0" y="335488"/>
               </a:lnTo>
               <a:lnTo>
-                <a:pt x="411149" y="375935"/>
+                <a:pt x="412375" y="335488"/>
               </a:lnTo>
             </a:path>
           </a:pathLst>
@@ -4576,8 +4576,8 @@
       </dsp:nvSpPr>
       <dsp:spPr>
         <a:xfrm>
-          <a:off x="6439310" y="2030165"/>
-          <a:ext cx="425367" cy="915369"/>
+          <a:off x="6419594" y="2142609"/>
+          <a:ext cx="426635" cy="876530"/>
         </a:xfrm>
         <a:custGeom>
           <a:avLst/>
@@ -4591,10 +4591,10 @@
                 <a:pt x="0" y="0"/>
               </a:moveTo>
               <a:lnTo>
-                <a:pt x="0" y="915369"/>
+                <a:pt x="0" y="876530"/>
               </a:lnTo>
               <a:lnTo>
-                <a:pt x="425367" y="915369"/>
+                <a:pt x="426635" y="876530"/>
               </a:lnTo>
             </a:path>
           </a:pathLst>
@@ -4635,8 +4635,8 @@
       </dsp:nvSpPr>
       <dsp:spPr>
         <a:xfrm>
-          <a:off x="6985794" y="1615943"/>
-          <a:ext cx="91440" cy="102148"/>
+          <a:off x="6967843" y="1685585"/>
+          <a:ext cx="91440" cy="144019"/>
         </a:xfrm>
         <a:custGeom>
           <a:avLst/>
@@ -4650,13 +4650,13 @@
                 <a:pt x="45901" y="0"/>
               </a:moveTo>
               <a:lnTo>
-                <a:pt x="45901" y="36612"/>
+                <a:pt x="45901" y="78288"/>
               </a:lnTo>
               <a:lnTo>
-                <a:pt x="45720" y="36612"/>
+                <a:pt x="45720" y="78288"/>
               </a:lnTo>
               <a:lnTo>
-                <a:pt x="45720" y="102148"/>
+                <a:pt x="45720" y="144019"/>
               </a:lnTo>
             </a:path>
           </a:pathLst>
@@ -4697,8 +4697,8 @@
       </dsp:nvSpPr>
       <dsp:spPr>
         <a:xfrm>
-          <a:off x="6077437" y="1116550"/>
-          <a:ext cx="954257" cy="199115"/>
+          <a:off x="6077382" y="1109658"/>
+          <a:ext cx="936362" cy="274755"/>
         </a:xfrm>
         <a:custGeom>
           <a:avLst/>
@@ -4712,13 +4712,13 @@
                 <a:pt x="0" y="0"/>
               </a:moveTo>
               <a:lnTo>
-                <a:pt x="0" y="133580"/>
+                <a:pt x="0" y="209024"/>
               </a:lnTo>
               <a:lnTo>
-                <a:pt x="954257" y="133580"/>
+                <a:pt x="936362" y="209024"/>
               </a:lnTo>
               <a:lnTo>
-                <a:pt x="954257" y="199115"/>
+                <a:pt x="936362" y="274755"/>
               </a:lnTo>
             </a:path>
           </a:pathLst>
@@ -4759,8 +4759,8 @@
       </dsp:nvSpPr>
       <dsp:spPr>
         <a:xfrm>
-          <a:off x="3940675" y="2194475"/>
-          <a:ext cx="427171" cy="2859724"/>
+          <a:off x="3913512" y="2265842"/>
+          <a:ext cx="428445" cy="2868247"/>
         </a:xfrm>
         <a:custGeom>
           <a:avLst/>
@@ -4774,10 +4774,10 @@
                 <a:pt x="0" y="0"/>
               </a:moveTo>
               <a:lnTo>
-                <a:pt x="0" y="2859724"/>
+                <a:pt x="0" y="2868247"/>
               </a:lnTo>
               <a:lnTo>
-                <a:pt x="427171" y="2859724"/>
+                <a:pt x="428445" y="2868247"/>
               </a:lnTo>
             </a:path>
           </a:pathLst>
@@ -4818,8 +4818,8 @@
       </dsp:nvSpPr>
       <dsp:spPr>
         <a:xfrm>
-          <a:off x="3940675" y="2194475"/>
-          <a:ext cx="412647" cy="3638052"/>
+          <a:off x="3913512" y="2265842"/>
+          <a:ext cx="413877" cy="3648895"/>
         </a:xfrm>
         <a:custGeom>
           <a:avLst/>
@@ -4833,10 +4833,10 @@
                 <a:pt x="0" y="0"/>
               </a:moveTo>
               <a:lnTo>
-                <a:pt x="0" y="3638052"/>
+                <a:pt x="0" y="3648895"/>
               </a:lnTo>
               <a:lnTo>
-                <a:pt x="412647" y="3638052"/>
+                <a:pt x="413877" y="3648895"/>
               </a:lnTo>
             </a:path>
           </a:pathLst>
@@ -4877,8 +4877,8 @@
       </dsp:nvSpPr>
       <dsp:spPr>
         <a:xfrm>
-          <a:off x="3940675" y="2194475"/>
-          <a:ext cx="417041" cy="3244882"/>
+          <a:off x="3913512" y="2265842"/>
+          <a:ext cx="418284" cy="3254554"/>
         </a:xfrm>
         <a:custGeom>
           <a:avLst/>
@@ -4892,10 +4892,10 @@
                 <a:pt x="0" y="0"/>
               </a:moveTo>
               <a:lnTo>
-                <a:pt x="0" y="3244882"/>
+                <a:pt x="0" y="3254554"/>
               </a:lnTo>
               <a:lnTo>
-                <a:pt x="417041" y="3244882"/>
+                <a:pt x="418284" y="3254554"/>
               </a:lnTo>
             </a:path>
           </a:pathLst>
@@ -4936,8 +4936,8 @@
       </dsp:nvSpPr>
       <dsp:spPr>
         <a:xfrm>
-          <a:off x="3940675" y="2194475"/>
-          <a:ext cx="424263" cy="2403316"/>
+          <a:off x="3913512" y="2265842"/>
+          <a:ext cx="425527" cy="2410479"/>
         </a:xfrm>
         <a:custGeom>
           <a:avLst/>
@@ -4951,10 +4951,10 @@
                 <a:pt x="0" y="0"/>
               </a:moveTo>
               <a:lnTo>
-                <a:pt x="0" y="2403316"/>
+                <a:pt x="0" y="2410479"/>
               </a:lnTo>
               <a:lnTo>
-                <a:pt x="424263" y="2403316"/>
+                <a:pt x="425527" y="2410479"/>
               </a:lnTo>
             </a:path>
           </a:pathLst>
@@ -4995,8 +4995,8 @@
       </dsp:nvSpPr>
       <dsp:spPr>
         <a:xfrm>
-          <a:off x="3940675" y="2194475"/>
-          <a:ext cx="440747" cy="510278"/>
+          <a:off x="3913512" y="2265842"/>
+          <a:ext cx="442060" cy="511799"/>
         </a:xfrm>
         <a:custGeom>
           <a:avLst/>
@@ -5010,10 +5010,10 @@
                 <a:pt x="0" y="0"/>
               </a:moveTo>
               <a:lnTo>
-                <a:pt x="0" y="510278"/>
+                <a:pt x="0" y="511799"/>
               </a:lnTo>
               <a:lnTo>
-                <a:pt x="440747" y="510278"/>
+                <a:pt x="442060" y="511799"/>
               </a:lnTo>
             </a:path>
           </a:pathLst>
@@ -5054,8 +5054,8 @@
       </dsp:nvSpPr>
       <dsp:spPr>
         <a:xfrm>
-          <a:off x="3940675" y="2194475"/>
-          <a:ext cx="439873" cy="1041122"/>
+          <a:off x="3913512" y="2265842"/>
+          <a:ext cx="441184" cy="1044225"/>
         </a:xfrm>
         <a:custGeom>
           <a:avLst/>
@@ -5069,10 +5069,10 @@
                 <a:pt x="0" y="0"/>
               </a:moveTo>
               <a:lnTo>
-                <a:pt x="0" y="1041122"/>
+                <a:pt x="0" y="1044225"/>
               </a:lnTo>
               <a:lnTo>
-                <a:pt x="439873" y="1041122"/>
+                <a:pt x="441184" y="1044225"/>
               </a:lnTo>
             </a:path>
           </a:pathLst>
@@ -5113,8 +5113,8 @@
       </dsp:nvSpPr>
       <dsp:spPr>
         <a:xfrm>
-          <a:off x="3940675" y="2194475"/>
-          <a:ext cx="425530" cy="1715359"/>
+          <a:off x="3913512" y="2265842"/>
+          <a:ext cx="426798" cy="1720472"/>
         </a:xfrm>
         <a:custGeom>
           <a:avLst/>
@@ -5128,10 +5128,10 @@
                 <a:pt x="0" y="0"/>
               </a:moveTo>
               <a:lnTo>
-                <a:pt x="0" y="1715359"/>
+                <a:pt x="0" y="1720472"/>
               </a:lnTo>
               <a:lnTo>
-                <a:pt x="425530" y="1715359"/>
+                <a:pt x="426798" y="1720472"/>
               </a:lnTo>
             </a:path>
           </a:pathLst>
@@ -5172,8 +5172,8 @@
       </dsp:nvSpPr>
       <dsp:spPr>
         <a:xfrm>
-          <a:off x="4713917" y="1624925"/>
-          <a:ext cx="91440" cy="248754"/>
+          <a:off x="4689195" y="1694593"/>
+          <a:ext cx="91440" cy="249495"/>
         </a:xfrm>
         <a:custGeom>
           <a:avLst/>
@@ -5184,16 +5184,16 @@
           <a:pathLst>
             <a:path>
               <a:moveTo>
-                <a:pt x="46918" y="0"/>
+                <a:pt x="46921" y="0"/>
               </a:moveTo>
               <a:lnTo>
-                <a:pt x="46918" y="183218"/>
+                <a:pt x="46921" y="183764"/>
               </a:lnTo>
               <a:lnTo>
-                <a:pt x="45720" y="183218"/>
+                <a:pt x="45720" y="183764"/>
               </a:lnTo>
               <a:lnTo>
-                <a:pt x="45720" y="248754"/>
+                <a:pt x="45720" y="249495"/>
               </a:lnTo>
             </a:path>
           </a:pathLst>
@@ -5234,8 +5234,8 @@
       </dsp:nvSpPr>
       <dsp:spPr>
         <a:xfrm>
-          <a:off x="4760835" y="1116550"/>
-          <a:ext cx="1316601" cy="196300"/>
+          <a:off x="4736117" y="1109658"/>
+          <a:ext cx="1341265" cy="271931"/>
         </a:xfrm>
         <a:custGeom>
           <a:avLst/>
@@ -5246,16 +5246,16 @@
           <a:pathLst>
             <a:path>
               <a:moveTo>
-                <a:pt x="1316601" y="0"/>
+                <a:pt x="1341265" y="0"/>
               </a:moveTo>
               <a:lnTo>
-                <a:pt x="1316601" y="130765"/>
+                <a:pt x="1341265" y="206200"/>
               </a:lnTo>
               <a:lnTo>
-                <a:pt x="0" y="130765"/>
+                <a:pt x="0" y="206200"/>
               </a:lnTo>
               <a:lnTo>
-                <a:pt x="0" y="196300"/>
+                <a:pt x="0" y="271931"/>
               </a:lnTo>
             </a:path>
           </a:pathLst>
@@ -5296,8 +5296,8 @@
       </dsp:nvSpPr>
       <dsp:spPr>
         <a:xfrm>
-          <a:off x="170369" y="1612086"/>
-          <a:ext cx="140410" cy="1125413"/>
+          <a:off x="289855" y="1681716"/>
+          <a:ext cx="182443" cy="1112141"/>
         </a:xfrm>
         <a:custGeom>
           <a:avLst/>
@@ -5311,10 +5311,10 @@
                 <a:pt x="0" y="0"/>
               </a:moveTo>
               <a:lnTo>
-                <a:pt x="0" y="1125413"/>
+                <a:pt x="0" y="1112141"/>
               </a:lnTo>
               <a:lnTo>
-                <a:pt x="140410" y="1125413"/>
+                <a:pt x="182443" y="1112141"/>
               </a:lnTo>
             </a:path>
           </a:pathLst>
@@ -5355,8 +5355,8 @@
       </dsp:nvSpPr>
       <dsp:spPr>
         <a:xfrm>
-          <a:off x="170369" y="1612086"/>
-          <a:ext cx="156057" cy="414850"/>
+          <a:off x="289855" y="1681716"/>
+          <a:ext cx="198137" cy="424403"/>
         </a:xfrm>
         <a:custGeom>
           <a:avLst/>
@@ -5370,10 +5370,10 @@
                 <a:pt x="0" y="0"/>
               </a:moveTo>
               <a:lnTo>
-                <a:pt x="0" y="414850"/>
+                <a:pt x="0" y="424403"/>
               </a:lnTo>
               <a:lnTo>
-                <a:pt x="156057" y="414850"/>
+                <a:pt x="198137" y="424403"/>
               </a:lnTo>
             </a:path>
           </a:pathLst>
@@ -5414,8 +5414,8 @@
       </dsp:nvSpPr>
       <dsp:spPr>
         <a:xfrm>
-          <a:off x="851846" y="1116550"/>
-          <a:ext cx="5225591" cy="193710"/>
+          <a:off x="906999" y="1109658"/>
+          <a:ext cx="5170382" cy="269333"/>
         </a:xfrm>
         <a:custGeom>
           <a:avLst/>
@@ -5426,16 +5426,16 @@
           <a:pathLst>
             <a:path>
               <a:moveTo>
-                <a:pt x="5225591" y="0"/>
+                <a:pt x="5170382" y="0"/>
               </a:moveTo>
               <a:lnTo>
-                <a:pt x="5225591" y="128175"/>
+                <a:pt x="5170382" y="203602"/>
               </a:lnTo>
               <a:lnTo>
-                <a:pt x="0" y="128175"/>
+                <a:pt x="0" y="203602"/>
               </a:lnTo>
               <a:lnTo>
-                <a:pt x="0" y="193710"/>
+                <a:pt x="0" y="269333"/>
               </a:lnTo>
             </a:path>
           </a:pathLst>
@@ -5476,8 +5476,8 @@
       </dsp:nvSpPr>
       <dsp:spPr>
         <a:xfrm>
-          <a:off x="5126461" y="662008"/>
-          <a:ext cx="1901953" cy="454541"/>
+          <a:off x="5123571" y="653761"/>
+          <a:ext cx="1907622" cy="455896"/>
         </a:xfrm>
         <a:prstGeom prst="roundRect">
           <a:avLst/>
@@ -5547,8 +5547,8 @@
         </a:p>
       </dsp:txBody>
       <dsp:txXfrm>
-        <a:off x="5148650" y="684197"/>
-        <a:ext cx="1857575" cy="410163"/>
+        <a:off x="5145826" y="676016"/>
+        <a:ext cx="1863112" cy="411386"/>
       </dsp:txXfrm>
     </dsp:sp>
     <dsp:sp modelId="{ADA5F25E-E5A7-4A74-ABAF-CED9575A8918}">
@@ -5558,8 +5558,8 @@
       </dsp:nvSpPr>
       <dsp:spPr>
         <a:xfrm>
-          <a:off x="0" y="1310261"/>
-          <a:ext cx="1703692" cy="301825"/>
+          <a:off x="135569" y="1378991"/>
+          <a:ext cx="1542860" cy="302725"/>
         </a:xfrm>
         <a:prstGeom prst="roundRect">
           <a:avLst/>
@@ -5625,8 +5625,8 @@
         </a:p>
       </dsp:txBody>
       <dsp:txXfrm>
-        <a:off x="14734" y="1324995"/>
-        <a:ext cx="1674224" cy="272357"/>
+        <a:off x="150347" y="1393769"/>
+        <a:ext cx="1513304" cy="273169"/>
       </dsp:txXfrm>
     </dsp:sp>
     <dsp:sp modelId="{2C89911A-559B-4BFC-AA8C-BE3307F3F263}">
@@ -5636,8 +5636,8 @@
       </dsp:nvSpPr>
       <dsp:spPr>
         <a:xfrm>
-          <a:off x="326427" y="1833602"/>
-          <a:ext cx="1389128" cy="386669"/>
+          <a:off x="487993" y="1912210"/>
+          <a:ext cx="1393269" cy="387821"/>
         </a:xfrm>
         <a:prstGeom prst="roundRect">
           <a:avLst/>
@@ -5703,8 +5703,8 @@
         </a:p>
       </dsp:txBody>
       <dsp:txXfrm>
-        <a:off x="345303" y="1852478"/>
-        <a:ext cx="1351376" cy="348917"/>
+        <a:off x="506925" y="1931142"/>
+        <a:ext cx="1355405" cy="349957"/>
       </dsp:txXfrm>
     </dsp:sp>
     <dsp:sp modelId="{C5D44253-2C4B-4687-BE85-E35CDA49FA38}">
@@ -5714,8 +5714,8 @@
       </dsp:nvSpPr>
       <dsp:spPr>
         <a:xfrm>
-          <a:off x="310779" y="2353240"/>
-          <a:ext cx="1397167" cy="768519"/>
+          <a:off x="472299" y="2408453"/>
+          <a:ext cx="1401332" cy="770810"/>
         </a:xfrm>
         <a:prstGeom prst="roundRect">
           <a:avLst/>
@@ -5781,8 +5781,8 @@
         </a:p>
       </dsp:txBody>
       <dsp:txXfrm>
-        <a:off x="348295" y="2390756"/>
-        <a:ext cx="1322135" cy="693487"/>
+        <a:off x="509927" y="2446081"/>
+        <a:ext cx="1326076" cy="695554"/>
       </dsp:txXfrm>
     </dsp:sp>
     <dsp:sp modelId="{7EC0BC3D-ED4D-42E6-82F2-9672178A5531}">
@@ -5792,8 +5792,8 @@
       </dsp:nvSpPr>
       <dsp:spPr>
         <a:xfrm>
-          <a:off x="3710260" y="1312851"/>
-          <a:ext cx="2101150" cy="312073"/>
+          <a:off x="3682410" y="1381589"/>
+          <a:ext cx="2107413" cy="313004"/>
         </a:xfrm>
         <a:prstGeom prst="roundRect">
           <a:avLst/>
@@ -5859,8 +5859,8 @@
         </a:p>
       </dsp:txBody>
       <dsp:txXfrm>
-        <a:off x="3725494" y="1328085"/>
-        <a:ext cx="2070682" cy="281605"/>
+        <a:off x="3697690" y="1396869"/>
+        <a:ext cx="2076853" cy="282444"/>
       </dsp:txXfrm>
     </dsp:sp>
     <dsp:sp modelId="{3E3AD66D-B7D7-4DCA-9EE3-EC4F50D31409}">
@@ -5870,8 +5870,8 @@
       </dsp:nvSpPr>
       <dsp:spPr>
         <a:xfrm>
-          <a:off x="3735935" y="1873679"/>
-          <a:ext cx="2047405" cy="320796"/>
+          <a:off x="3708161" y="1944089"/>
+          <a:ext cx="2053507" cy="321752"/>
         </a:xfrm>
         <a:prstGeom prst="roundRect">
           <a:avLst/>
@@ -5941,8 +5941,8 @@
         </a:p>
       </dsp:txBody>
       <dsp:txXfrm>
-        <a:off x="3751595" y="1889339"/>
-        <a:ext cx="2016085" cy="289476"/>
+        <a:off x="3723868" y="1959796"/>
+        <a:ext cx="2022093" cy="290338"/>
       </dsp:txXfrm>
     </dsp:sp>
     <dsp:sp modelId="{DC67B31A-26AA-4189-8A22-1889CEF361A4}">
@@ -5952,8 +5952,8 @@
       </dsp:nvSpPr>
       <dsp:spPr>
         <a:xfrm>
-          <a:off x="4366205" y="3524993"/>
-          <a:ext cx="1613029" cy="769683"/>
+          <a:off x="4340311" y="3600325"/>
+          <a:ext cx="1617837" cy="771977"/>
         </a:xfrm>
         <a:prstGeom prst="roundRect">
           <a:avLst/>
@@ -6019,8 +6019,8 @@
         </a:p>
       </dsp:txBody>
       <dsp:txXfrm>
-        <a:off x="4403778" y="3562566"/>
-        <a:ext cx="1537883" cy="694537"/>
+        <a:off x="4377996" y="3638010"/>
+        <a:ext cx="1542467" cy="696607"/>
       </dsp:txXfrm>
     </dsp:sp>
     <dsp:sp modelId="{4D8B1969-F22B-4A5B-994C-1CD8F886EC40}">
@@ -6030,8 +6030,8 @@
       </dsp:nvSpPr>
       <dsp:spPr>
         <a:xfrm>
-          <a:off x="4380548" y="3018057"/>
-          <a:ext cx="1601969" cy="435081"/>
+          <a:off x="4354696" y="3091878"/>
+          <a:ext cx="1606744" cy="436377"/>
         </a:xfrm>
         <a:prstGeom prst="roundRect">
           <a:avLst/>
@@ -6097,8 +6097,8 @@
         </a:p>
       </dsp:txBody>
       <dsp:txXfrm>
-        <a:off x="4401787" y="3039296"/>
-        <a:ext cx="1559491" cy="392603"/>
+        <a:off x="4375998" y="3113180"/>
+        <a:ext cx="1564140" cy="393773"/>
       </dsp:txXfrm>
     </dsp:sp>
     <dsp:sp modelId="{0C714DD9-24C9-4E5B-B485-44A250CD8C35}">
@@ -6108,8 +6108,8 @@
       </dsp:nvSpPr>
       <dsp:spPr>
         <a:xfrm>
-          <a:off x="4381422" y="2478666"/>
-          <a:ext cx="1600227" cy="452176"/>
+          <a:off x="4355573" y="2550879"/>
+          <a:ext cx="1604997" cy="453524"/>
         </a:xfrm>
         <a:prstGeom prst="roundRect">
           <a:avLst/>
@@ -6175,8 +6175,8 @@
         </a:p>
       </dsp:txBody>
       <dsp:txXfrm>
-        <a:off x="4403495" y="2500739"/>
-        <a:ext cx="1556081" cy="408030"/>
+        <a:off x="4377712" y="2573018"/>
+        <a:ext cx="1560719" cy="409246"/>
       </dsp:txXfrm>
     </dsp:sp>
     <dsp:sp modelId="{BE05C31F-DF27-417A-9B03-58F2D293754F}">
@@ -6186,8 +6186,8 @@
       </dsp:nvSpPr>
       <dsp:spPr>
         <a:xfrm>
-          <a:off x="4364938" y="4391601"/>
-          <a:ext cx="1593924" cy="412380"/>
+          <a:off x="4339040" y="4469516"/>
+          <a:ext cx="1598674" cy="413609"/>
         </a:xfrm>
         <a:prstGeom prst="roundRect">
           <a:avLst/>
@@ -6253,8 +6253,8 @@
         </a:p>
       </dsp:txBody>
       <dsp:txXfrm>
-        <a:off x="4385069" y="4411732"/>
-        <a:ext cx="1553662" cy="372118"/>
+        <a:off x="4359231" y="4489707"/>
+        <a:ext cx="1558292" cy="373227"/>
       </dsp:txXfrm>
     </dsp:sp>
     <dsp:sp modelId="{1580DD9A-E07B-47E0-A6EF-9A43286CACDB}">
@@ -6264,8 +6264,8 @@
       </dsp:nvSpPr>
       <dsp:spPr>
         <a:xfrm>
-          <a:off x="4357717" y="5283321"/>
-          <a:ext cx="1614901" cy="312073"/>
+          <a:off x="4331797" y="5363894"/>
+          <a:ext cx="1619715" cy="313004"/>
         </a:xfrm>
         <a:prstGeom prst="roundRect">
           <a:avLst/>
@@ -6331,8 +6331,8 @@
         </a:p>
       </dsp:txBody>
       <dsp:txXfrm>
-        <a:off x="4372951" y="5298555"/>
-        <a:ext cx="1584433" cy="281605"/>
+        <a:off x="4347077" y="5379174"/>
+        <a:ext cx="1589155" cy="282444"/>
       </dsp:txXfrm>
     </dsp:sp>
     <dsp:sp modelId="{E847BB21-2BE7-4387-85A1-738AFFD84E75}">
@@ -6342,8 +6342,8 @@
       </dsp:nvSpPr>
       <dsp:spPr>
         <a:xfrm>
-          <a:off x="4353323" y="5676491"/>
-          <a:ext cx="1599859" cy="312073"/>
+          <a:off x="4327390" y="5758236"/>
+          <a:ext cx="1604628" cy="313004"/>
         </a:xfrm>
         <a:prstGeom prst="roundRect">
           <a:avLst/>
@@ -6409,8 +6409,8 @@
         </a:p>
       </dsp:txBody>
       <dsp:txXfrm>
-        <a:off x="4368557" y="5691725"/>
-        <a:ext cx="1569391" cy="281605"/>
+        <a:off x="4342670" y="5773516"/>
+        <a:ext cx="1574068" cy="282444"/>
       </dsp:txXfrm>
     </dsp:sp>
     <dsp:sp modelId="{630FB1FE-1568-4E6E-A0E0-457118C98AEE}">
@@ -6420,8 +6420,8 @@
       </dsp:nvSpPr>
       <dsp:spPr>
         <a:xfrm>
-          <a:off x="4367847" y="4898163"/>
-          <a:ext cx="1614383" cy="312073"/>
+          <a:off x="4341957" y="4977588"/>
+          <a:ext cx="1619195" cy="313004"/>
         </a:xfrm>
         <a:prstGeom prst="roundRect">
           <a:avLst/>
@@ -6491,8 +6491,8 @@
         </a:p>
       </dsp:txBody>
       <dsp:txXfrm>
-        <a:off x="4383081" y="4913397"/>
-        <a:ext cx="1583915" cy="281605"/>
+        <a:off x="4357237" y="4992868"/>
+        <a:ext cx="1588635" cy="282444"/>
       </dsp:txXfrm>
     </dsp:sp>
     <dsp:sp modelId="{BD9EEFF5-C9E2-40B4-8501-30865610934D}">
@@ -6502,8 +6502,8 @@
       </dsp:nvSpPr>
       <dsp:spPr>
         <a:xfrm>
-          <a:off x="5951875" y="1315666"/>
-          <a:ext cx="2159639" cy="300277"/>
+          <a:off x="5930707" y="1384413"/>
+          <a:ext cx="2166076" cy="301172"/>
         </a:xfrm>
         <a:prstGeom prst="roundRect">
           <a:avLst/>
@@ -6577,8 +6577,8 @@
         </a:p>
       </dsp:txBody>
       <dsp:txXfrm>
-        <a:off x="5966533" y="1330324"/>
-        <a:ext cx="2130323" cy="270961"/>
+        <a:off x="5945409" y="1399115"/>
+        <a:ext cx="2136672" cy="271768"/>
       </dsp:txXfrm>
     </dsp:sp>
     <dsp:sp modelId="{33A6DC25-4DEB-4F90-9E16-4D43C3569F99}">
@@ -6588,8 +6588,8 @@
       </dsp:nvSpPr>
       <dsp:spPr>
         <a:xfrm>
-          <a:off x="6291259" y="1718091"/>
-          <a:ext cx="1480510" cy="312073"/>
+          <a:off x="6271102" y="1829605"/>
+          <a:ext cx="1484922" cy="313004"/>
         </a:xfrm>
         <a:prstGeom prst="roundRect">
           <a:avLst/>
@@ -6655,8 +6655,8 @@
         </a:p>
       </dsp:txBody>
       <dsp:txXfrm>
-        <a:off x="6306493" y="1733325"/>
-        <a:ext cx="1450042" cy="281605"/>
+        <a:off x="6286382" y="1844885"/>
+        <a:ext cx="1454362" cy="282444"/>
       </dsp:txXfrm>
     </dsp:sp>
     <dsp:sp modelId="{C6823A04-DDB7-4314-BEFD-6A30ADD7A6C7}">
@@ -6666,8 +6666,8 @@
       </dsp:nvSpPr>
       <dsp:spPr>
         <a:xfrm>
-          <a:off x="6864677" y="2771082"/>
-          <a:ext cx="1379629" cy="348904"/>
+          <a:off x="6846230" y="2844167"/>
+          <a:ext cx="1383741" cy="349944"/>
         </a:xfrm>
         <a:prstGeom prst="roundRect">
           <a:avLst/>
@@ -6733,8 +6733,8 @@
         </a:p>
       </dsp:txBody>
       <dsp:txXfrm>
-        <a:off x="6881709" y="2788114"/>
-        <a:ext cx="1345565" cy="314840"/>
+        <a:off x="6863313" y="2861250"/>
+        <a:ext cx="1349575" cy="315778"/>
       </dsp:txXfrm>
     </dsp:sp>
     <dsp:sp modelId="{437B21D8-99D7-4F78-A576-12278DF24217}">
@@ -6744,8 +6744,8 @@
       </dsp:nvSpPr>
       <dsp:spPr>
         <a:xfrm>
-          <a:off x="6850459" y="2191071"/>
-          <a:ext cx="1392149" cy="430059"/>
+          <a:off x="6831969" y="2262427"/>
+          <a:ext cx="1396298" cy="431341"/>
         </a:xfrm>
         <a:prstGeom prst="roundRect">
           <a:avLst/>
@@ -6811,8 +6811,8 @@
         </a:p>
       </dsp:txBody>
       <dsp:txXfrm>
-        <a:off x="6871453" y="2212065"/>
-        <a:ext cx="1350161" cy="388071"/>
+        <a:off x="6853025" y="2283483"/>
+        <a:ext cx="1354186" cy="389229"/>
       </dsp:txXfrm>
     </dsp:sp>
     <dsp:sp modelId="{9DE9F66F-27C9-4DC2-B07D-7E6BBE00BC85}">
@@ -6822,8 +6822,8 @@
       </dsp:nvSpPr>
       <dsp:spPr>
         <a:xfrm>
-          <a:off x="6862724" y="3239911"/>
-          <a:ext cx="1363788" cy="377971"/>
+          <a:off x="6844270" y="3289378"/>
+          <a:ext cx="1367853" cy="379098"/>
         </a:xfrm>
         <a:prstGeom prst="roundRect">
           <a:avLst/>
@@ -6889,8 +6889,8 @@
         </a:p>
       </dsp:txBody>
       <dsp:txXfrm>
-        <a:off x="6881175" y="3258362"/>
-        <a:ext cx="1326886" cy="341069"/>
+        <a:off x="6862776" y="3307884"/>
+        <a:ext cx="1330841" cy="342086"/>
       </dsp:txXfrm>
     </dsp:sp>
     <dsp:sp modelId="{BBE7B26F-7841-4591-92A4-A426F6588D0B}">
@@ -6900,8 +6900,8 @@
       </dsp:nvSpPr>
       <dsp:spPr>
         <a:xfrm>
-          <a:off x="8211322" y="1317329"/>
-          <a:ext cx="1294083" cy="664414"/>
+          <a:off x="8196888" y="1386081"/>
+          <a:ext cx="1297940" cy="666395"/>
         </a:xfrm>
         <a:prstGeom prst="roundRect">
           <a:avLst/>
@@ -6971,8 +6971,8 @@
         </a:p>
       </dsp:txBody>
       <dsp:txXfrm>
-        <a:off x="8243756" y="1349763"/>
-        <a:ext cx="1229215" cy="599546"/>
+        <a:off x="8229419" y="1418612"/>
+        <a:ext cx="1232878" cy="601333"/>
       </dsp:txXfrm>
     </dsp:sp>
     <dsp:sp modelId="{492BA640-7185-47A4-9297-C5663E3E3248}">
@@ -6982,8 +6982,8 @@
       </dsp:nvSpPr>
       <dsp:spPr>
         <a:xfrm>
-          <a:off x="9614013" y="1311119"/>
-          <a:ext cx="1159804" cy="695572"/>
+          <a:off x="9603760" y="1379852"/>
+          <a:ext cx="1163261" cy="697645"/>
         </a:xfrm>
         <a:prstGeom prst="roundRect">
           <a:avLst/>
@@ -7053,8 +7053,8 @@
         </a:p>
       </dsp:txBody>
       <dsp:txXfrm>
-        <a:off x="9647968" y="1345074"/>
-        <a:ext cx="1091894" cy="627662"/>
+        <a:off x="9637816" y="1413908"/>
+        <a:ext cx="1095149" cy="629533"/>
       </dsp:txXfrm>
     </dsp:sp>
     <dsp:sp modelId="{EE1CF7FD-FFFB-48A0-BAE1-DA9FC25CBA32}">
@@ -7064,8 +7064,8 @@
       </dsp:nvSpPr>
       <dsp:spPr>
         <a:xfrm>
-          <a:off x="10909819" y="1308073"/>
-          <a:ext cx="1125831" cy="699332"/>
+          <a:off x="10903429" y="1376797"/>
+          <a:ext cx="1129187" cy="701417"/>
         </a:xfrm>
         <a:prstGeom prst="roundRect">
           <a:avLst/>
@@ -7131,8 +7131,8 @@
         </a:p>
       </dsp:txBody>
       <dsp:txXfrm>
-        <a:off x="10943958" y="1342212"/>
-        <a:ext cx="1057553" cy="631054"/>
+        <a:off x="10937669" y="1411037"/>
+        <a:ext cx="1060707" cy="632937"/>
       </dsp:txXfrm>
     </dsp:sp>
     <dsp:sp modelId="{3369F1D2-F051-43DD-9F81-DCE1DB8DD909}">
@@ -7142,8 +7142,8 @@
       </dsp:nvSpPr>
       <dsp:spPr>
         <a:xfrm>
-          <a:off x="1840675" y="1312117"/>
-          <a:ext cx="1769122" cy="312073"/>
+          <a:off x="1807253" y="1380854"/>
+          <a:ext cx="1774395" cy="313004"/>
         </a:xfrm>
         <a:prstGeom prst="roundRect">
           <a:avLst/>
@@ -7213,8 +7213,8 @@
         </a:p>
       </dsp:txBody>
       <dsp:txXfrm>
-        <a:off x="1855909" y="1327351"/>
-        <a:ext cx="1738654" cy="281605"/>
+        <a:off x="1822533" y="1396134"/>
+        <a:ext cx="1743835" cy="282444"/>
       </dsp:txXfrm>
     </dsp:sp>
     <dsp:sp modelId="{D382AD5D-81AD-4AC6-9E59-F29201543338}">
@@ -7224,8 +7224,8 @@
       </dsp:nvSpPr>
       <dsp:spPr>
         <a:xfrm rot="10800000" flipV="1">
-          <a:off x="2267639" y="1839073"/>
-          <a:ext cx="1252121" cy="379235"/>
+          <a:off x="2235489" y="1909380"/>
+          <a:ext cx="1255854" cy="380365"/>
         </a:xfrm>
         <a:prstGeom prst="roundRect">
           <a:avLst/>
@@ -7291,8 +7291,8 @@
         </a:p>
       </dsp:txBody>
       <dsp:txXfrm rot="-10800000">
-        <a:off x="2286152" y="1857586"/>
-        <a:ext cx="1215095" cy="342209"/>
+        <a:off x="2254057" y="1927948"/>
+        <a:ext cx="1218718" cy="343229"/>
       </dsp:txXfrm>
     </dsp:sp>
     <dsp:sp modelId="{E48E1750-FD00-46D8-B773-5B48261A443A}">
@@ -7302,8 +7302,8 @@
       </dsp:nvSpPr>
       <dsp:spPr>
         <a:xfrm>
-          <a:off x="2787235" y="697160"/>
-          <a:ext cx="1901953" cy="371474"/>
+          <a:off x="2777373" y="689018"/>
+          <a:ext cx="1907622" cy="372581"/>
         </a:xfrm>
         <a:prstGeom prst="roundRect">
           <a:avLst/>
@@ -7372,8 +7372,8 @@
         </a:p>
       </dsp:txBody>
       <dsp:txXfrm>
-        <a:off x="2805369" y="715294"/>
-        <a:ext cx="1865685" cy="335206"/>
+        <a:off x="2795561" y="707206"/>
+        <a:ext cx="1871246" cy="336205"/>
       </dsp:txXfrm>
     </dsp:sp>
   </dsp:spTree>
@@ -9691,7 +9691,7 @@
           <a:p>
             <a:fld id="{5E713CFB-EA3F-4FA9-B487-6657553D79E9}" type="datetimeFigureOut">
               <a:rPr lang="ro-RO" smtClean="0"/>
-              <a:t>28.03.2019</a:t>
+              <a:t>12.04.2019</a:t>
             </a:fld>
             <a:endParaRPr lang="ro-RO"/>
           </a:p>
@@ -9861,7 +9861,7 @@
           <a:p>
             <a:fld id="{5E713CFB-EA3F-4FA9-B487-6657553D79E9}" type="datetimeFigureOut">
               <a:rPr lang="ro-RO" smtClean="0"/>
-              <a:t>28.03.2019</a:t>
+              <a:t>12.04.2019</a:t>
             </a:fld>
             <a:endParaRPr lang="ro-RO"/>
           </a:p>
@@ -10041,7 +10041,7 @@
           <a:p>
             <a:fld id="{5E713CFB-EA3F-4FA9-B487-6657553D79E9}" type="datetimeFigureOut">
               <a:rPr lang="ro-RO" smtClean="0"/>
-              <a:t>28.03.2019</a:t>
+              <a:t>12.04.2019</a:t>
             </a:fld>
             <a:endParaRPr lang="ro-RO"/>
           </a:p>
@@ -10211,7 +10211,7 @@
           <a:p>
             <a:fld id="{5E713CFB-EA3F-4FA9-B487-6657553D79E9}" type="datetimeFigureOut">
               <a:rPr lang="ro-RO" smtClean="0"/>
-              <a:t>28.03.2019</a:t>
+              <a:t>12.04.2019</a:t>
             </a:fld>
             <a:endParaRPr lang="ro-RO"/>
           </a:p>
@@ -10457,7 +10457,7 @@
           <a:p>
             <a:fld id="{5E713CFB-EA3F-4FA9-B487-6657553D79E9}" type="datetimeFigureOut">
               <a:rPr lang="ro-RO" smtClean="0"/>
-              <a:t>28.03.2019</a:t>
+              <a:t>12.04.2019</a:t>
             </a:fld>
             <a:endParaRPr lang="ro-RO"/>
           </a:p>
@@ -10689,7 +10689,7 @@
           <a:p>
             <a:fld id="{5E713CFB-EA3F-4FA9-B487-6657553D79E9}" type="datetimeFigureOut">
               <a:rPr lang="ro-RO" smtClean="0"/>
-              <a:t>28.03.2019</a:t>
+              <a:t>12.04.2019</a:t>
             </a:fld>
             <a:endParaRPr lang="ro-RO"/>
           </a:p>
@@ -11056,7 +11056,7 @@
           <a:p>
             <a:fld id="{5E713CFB-EA3F-4FA9-B487-6657553D79E9}" type="datetimeFigureOut">
               <a:rPr lang="ro-RO" smtClean="0"/>
-              <a:t>28.03.2019</a:t>
+              <a:t>12.04.2019</a:t>
             </a:fld>
             <a:endParaRPr lang="ro-RO"/>
           </a:p>
@@ -11174,7 +11174,7 @@
           <a:p>
             <a:fld id="{5E713CFB-EA3F-4FA9-B487-6657553D79E9}" type="datetimeFigureOut">
               <a:rPr lang="ro-RO" smtClean="0"/>
-              <a:t>28.03.2019</a:t>
+              <a:t>12.04.2019</a:t>
             </a:fld>
             <a:endParaRPr lang="ro-RO"/>
           </a:p>
@@ -11269,7 +11269,7 @@
           <a:p>
             <a:fld id="{5E713CFB-EA3F-4FA9-B487-6657553D79E9}" type="datetimeFigureOut">
               <a:rPr lang="ro-RO" smtClean="0"/>
-              <a:t>28.03.2019</a:t>
+              <a:t>12.04.2019</a:t>
             </a:fld>
             <a:endParaRPr lang="ro-RO"/>
           </a:p>
@@ -11546,7 +11546,7 @@
           <a:p>
             <a:fld id="{5E713CFB-EA3F-4FA9-B487-6657553D79E9}" type="datetimeFigureOut">
               <a:rPr lang="ro-RO" smtClean="0"/>
-              <a:t>28.03.2019</a:t>
+              <a:t>12.04.2019</a:t>
             </a:fld>
             <a:endParaRPr lang="ro-RO"/>
           </a:p>
@@ -11799,7 +11799,7 @@
           <a:p>
             <a:fld id="{5E713CFB-EA3F-4FA9-B487-6657553D79E9}" type="datetimeFigureOut">
               <a:rPr lang="ro-RO" smtClean="0"/>
-              <a:t>28.03.2019</a:t>
+              <a:t>12.04.2019</a:t>
             </a:fld>
             <a:endParaRPr lang="ro-RO"/>
           </a:p>
@@ -12012,7 +12012,7 @@
           <a:p>
             <a:fld id="{5E713CFB-EA3F-4FA9-B487-6657553D79E9}" type="datetimeFigureOut">
               <a:rPr lang="ro-RO" smtClean="0"/>
-              <a:t>28.03.2019</a:t>
+              <a:t>12.04.2019</a:t>
             </a:fld>
             <a:endParaRPr lang="ro-RO"/>
           </a:p>
@@ -12435,7 +12435,7 @@
           <p:nvPr>
             <p:extLst>
               <p:ext uri="{D42A27DB-BD31-4B8C-83A1-F6EECF244321}">
-                <p14:modId xmlns:p14="http://schemas.microsoft.com/office/powerpoint/2010/main" val="560069510"/>
+                <p14:modId xmlns:p14="http://schemas.microsoft.com/office/powerpoint/2010/main" val="3434204689"/>
               </p:ext>
             </p:extLst>
           </p:nvPr>

</xml_diff>